<commit_message>
added pres and sources for my lightning talk
</commit_message>
<xml_diff>
--- a/Java21-Presentation.pptx
+++ b/Java21-Presentation.pptx
@@ -633,7 +633,7 @@
           <a:p>
             <a:fld id="{97338A82-0D20-3D4A-B4B7-58B5112FF922}" type="slidenum">
               <a:rPr lang="en-US" smtClean="0"/>
-              <a:t>5</a:t>
+              <a:t>4</a:t>
             </a:fld>
             <a:endParaRPr lang="en-US"/>
           </a:p>
@@ -642,7 +642,7 @@
     </p:spTree>
     <p:extLst>
       <p:ext uri="{BB962C8B-B14F-4D97-AF65-F5344CB8AC3E}">
-        <p14:creationId xmlns:p14="http://schemas.microsoft.com/office/powerpoint/2010/main" val="67489716"/>
+        <p14:creationId xmlns:p14="http://schemas.microsoft.com/office/powerpoint/2010/main" val="2057420498"/>
       </p:ext>
     </p:extLst>
   </p:cSld>
@@ -696,16 +696,6 @@
           <a:bodyPr/>
           <a:lstStyle/>
           <a:p>
-            <a:r>
-              <a:rPr lang="en-GB" sz="1800" b="0" i="0" u="none" strike="noStrike" dirty="0">
-                <a:solidFill>
-                  <a:srgbClr val="000000"/>
-                </a:solidFill>
-                <a:effectLst/>
-                <a:latin typeface="Arial" panose="020B0604020202020204" pitchFamily="34" charset="0"/>
-              </a:rPr>
-              <a:t>Long Term Commercial Support</a:t>
-            </a:r>
             <a:endParaRPr lang="en-US" dirty="0"/>
           </a:p>
         </p:txBody>
@@ -727,7 +717,7 @@
           <a:p>
             <a:fld id="{97338A82-0D20-3D4A-B4B7-58B5112FF922}" type="slidenum">
               <a:rPr lang="en-US" smtClean="0"/>
-              <a:t>6</a:t>
+              <a:t>5</a:t>
             </a:fld>
             <a:endParaRPr lang="en-US"/>
           </a:p>
@@ -736,7 +726,7 @@
     </p:spTree>
     <p:extLst>
       <p:ext uri="{BB962C8B-B14F-4D97-AF65-F5344CB8AC3E}">
-        <p14:creationId xmlns:p14="http://schemas.microsoft.com/office/powerpoint/2010/main" val="2277200684"/>
+        <p14:creationId xmlns:p14="http://schemas.microsoft.com/office/powerpoint/2010/main" val="67489716"/>
       </p:ext>
     </p:extLst>
   </p:cSld>
@@ -791,21 +781,16 @@
           <a:lstStyle/>
           <a:p>
             <a:r>
-              <a:rPr lang="en-US" dirty="0"/>
-              <a:t>33.3 % - Preview</a:t>
+              <a:rPr lang="en-GB" sz="1800" b="0" i="0" u="none" strike="noStrike" dirty="0">
+                <a:solidFill>
+                  <a:srgbClr val="000000"/>
+                </a:solidFill>
+                <a:effectLst/>
+                <a:latin typeface="Arial" panose="020B0604020202020204" pitchFamily="34" charset="0"/>
+              </a:rPr>
+              <a:t>Long Term Commercial Support</a:t>
             </a:r>
-          </a:p>
-          <a:p>
-            <a:r>
-              <a:rPr lang="en-US" dirty="0"/>
-              <a:t>13.3 % - Deprecations</a:t>
-            </a:r>
-          </a:p>
-          <a:p>
-            <a:r>
-              <a:rPr lang="en-US" dirty="0"/>
-              <a:t>56.6% - Valuable deliveries</a:t>
-            </a:r>
+            <a:endParaRPr lang="en-US" dirty="0"/>
           </a:p>
         </p:txBody>
       </p:sp>
@@ -826,7 +811,7 @@
           <a:p>
             <a:fld id="{97338A82-0D20-3D4A-B4B7-58B5112FF922}" type="slidenum">
               <a:rPr lang="en-US" smtClean="0"/>
-              <a:t>7</a:t>
+              <a:t>6</a:t>
             </a:fld>
             <a:endParaRPr lang="en-US"/>
           </a:p>
@@ -835,7 +820,7 @@
     </p:spTree>
     <p:extLst>
       <p:ext uri="{BB962C8B-B14F-4D97-AF65-F5344CB8AC3E}">
-        <p14:creationId xmlns:p14="http://schemas.microsoft.com/office/powerpoint/2010/main" val="1910730536"/>
+        <p14:creationId xmlns:p14="http://schemas.microsoft.com/office/powerpoint/2010/main" val="2277200684"/>
       </p:ext>
     </p:extLst>
   </p:cSld>
@@ -891,19 +876,19 @@
           <a:p>
             <a:r>
               <a:rPr lang="en-US" dirty="0"/>
-              <a:t>The Java compiler automatically imports STR in any Java class.</a:t>
+              <a:t>33.3 % - Preview</a:t>
             </a:r>
           </a:p>
           <a:p>
             <a:r>
               <a:rPr lang="en-US" dirty="0"/>
-              <a:t>STR is a processor, similar to a Function(String) -&gt; String</a:t>
+              <a:t>13.3 % - Deprecations</a:t>
             </a:r>
           </a:p>
           <a:p>
             <a:r>
               <a:rPr lang="en-US" dirty="0"/>
-              <a:t>To create </a:t>
+              <a:t>56.6% - Valuable deliveries</a:t>
             </a:r>
           </a:p>
         </p:txBody>
@@ -925,7 +910,7 @@
           <a:p>
             <a:fld id="{97338A82-0D20-3D4A-B4B7-58B5112FF922}" type="slidenum">
               <a:rPr lang="en-US" smtClean="0"/>
-              <a:t>8</a:t>
+              <a:t>7</a:t>
             </a:fld>
             <a:endParaRPr lang="en-US"/>
           </a:p>
@@ -934,7 +919,7 @@
     </p:spTree>
     <p:extLst>
       <p:ext uri="{BB962C8B-B14F-4D97-AF65-F5344CB8AC3E}">
-        <p14:creationId xmlns:p14="http://schemas.microsoft.com/office/powerpoint/2010/main" val="3207804677"/>
+        <p14:creationId xmlns:p14="http://schemas.microsoft.com/office/powerpoint/2010/main" val="1910730536"/>
       </p:ext>
     </p:extLst>
   </p:cSld>
@@ -988,7 +973,22 @@
           <a:bodyPr/>
           <a:lstStyle/>
           <a:p>
-            <a:endParaRPr lang="en-US" dirty="0"/>
+            <a:r>
+              <a:rPr lang="en-US" dirty="0"/>
+              <a:t>The Java compiler automatically imports STR in any Java class.</a:t>
+            </a:r>
+          </a:p>
+          <a:p>
+            <a:r>
+              <a:rPr lang="en-US" dirty="0"/>
+              <a:t>STR is a processor, similar to a Function(String) -&gt; String</a:t>
+            </a:r>
+          </a:p>
+          <a:p>
+            <a:r>
+              <a:rPr lang="en-US" dirty="0"/>
+              <a:t>To create </a:t>
+            </a:r>
           </a:p>
         </p:txBody>
       </p:sp>
@@ -1009,7 +1009,7 @@
           <a:p>
             <a:fld id="{97338A82-0D20-3D4A-B4B7-58B5112FF922}" type="slidenum">
               <a:rPr lang="en-US" smtClean="0"/>
-              <a:t>10</a:t>
+              <a:t>8</a:t>
             </a:fld>
             <a:endParaRPr lang="en-US"/>
           </a:p>
@@ -1018,7 +1018,7 @@
     </p:spTree>
     <p:extLst>
       <p:ext uri="{BB962C8B-B14F-4D97-AF65-F5344CB8AC3E}">
-        <p14:creationId xmlns:p14="http://schemas.microsoft.com/office/powerpoint/2010/main" val="2302287201"/>
+        <p14:creationId xmlns:p14="http://schemas.microsoft.com/office/powerpoint/2010/main" val="3207804677"/>
       </p:ext>
     </p:extLst>
   </p:cSld>
@@ -1093,6 +1093,90 @@
           <a:p>
             <a:fld id="{97338A82-0D20-3D4A-B4B7-58B5112FF922}" type="slidenum">
               <a:rPr lang="en-US" smtClean="0"/>
+              <a:t>10</a:t>
+            </a:fld>
+            <a:endParaRPr lang="en-US"/>
+          </a:p>
+        </p:txBody>
+      </p:sp>
+    </p:spTree>
+    <p:extLst>
+      <p:ext uri="{BB962C8B-B14F-4D97-AF65-F5344CB8AC3E}">
+        <p14:creationId xmlns:p14="http://schemas.microsoft.com/office/powerpoint/2010/main" val="2302287201"/>
+      </p:ext>
+    </p:extLst>
+  </p:cSld>
+  <p:clrMapOvr>
+    <a:masterClrMapping/>
+  </p:clrMapOvr>
+</p:notes>
+</file>
+
+<file path=ppt/notesSlides/notesSlide8.xml><?xml version="1.0" encoding="utf-8"?>
+<p:notes xmlns:a="http://schemas.openxmlformats.org/drawingml/2006/main" xmlns:r="http://schemas.openxmlformats.org/officeDocument/2006/relationships" xmlns:p="http://schemas.openxmlformats.org/presentationml/2006/main">
+  <p:cSld>
+    <p:spTree>
+      <p:nvGrpSpPr>
+        <p:cNvPr id="1" name=""/>
+        <p:cNvGrpSpPr/>
+        <p:nvPr/>
+      </p:nvGrpSpPr>
+      <p:grpSpPr>
+        <a:xfrm>
+          <a:off x="0" y="0"/>
+          <a:ext cx="0" cy="0"/>
+          <a:chOff x="0" y="0"/>
+          <a:chExt cx="0" cy="0"/>
+        </a:xfrm>
+      </p:grpSpPr>
+      <p:sp>
+        <p:nvSpPr>
+          <p:cNvPr id="2" name="Slide Image Placeholder 1"/>
+          <p:cNvSpPr>
+            <a:spLocks noGrp="1" noRot="1" noChangeAspect="1"/>
+          </p:cNvSpPr>
+          <p:nvPr>
+            <p:ph type="sldImg"/>
+          </p:nvPr>
+        </p:nvSpPr>
+        <p:spPr/>
+      </p:sp>
+      <p:sp>
+        <p:nvSpPr>
+          <p:cNvPr id="3" name="Notes Placeholder 2"/>
+          <p:cNvSpPr>
+            <a:spLocks noGrp="1"/>
+          </p:cNvSpPr>
+          <p:nvPr>
+            <p:ph type="body" idx="1"/>
+          </p:nvPr>
+        </p:nvSpPr>
+        <p:spPr/>
+        <p:txBody>
+          <a:bodyPr/>
+          <a:lstStyle/>
+          <a:p>
+            <a:endParaRPr lang="en-US" dirty="0"/>
+          </a:p>
+        </p:txBody>
+      </p:sp>
+      <p:sp>
+        <p:nvSpPr>
+          <p:cNvPr id="4" name="Slide Number Placeholder 3"/>
+          <p:cNvSpPr>
+            <a:spLocks noGrp="1"/>
+          </p:cNvSpPr>
+          <p:nvPr>
+            <p:ph type="sldNum" sz="quarter" idx="5"/>
+          </p:nvPr>
+        </p:nvSpPr>
+        <p:spPr/>
+        <p:txBody>
+          <a:bodyPr/>
+          <a:lstStyle/>
+          <a:p>
+            <a:fld id="{97338A82-0D20-3D4A-B4B7-58B5112FF922}" type="slidenum">
+              <a:rPr lang="en-US" smtClean="0"/>
               <a:t>15</a:t>
             </a:fld>
             <a:endParaRPr lang="en-US"/>
@@ -1112,7 +1196,7 @@
 </p:notes>
 </file>
 
-<file path=ppt/notesSlides/notesSlide8.xml><?xml version="1.0" encoding="utf-8"?>
+<file path=ppt/notesSlides/notesSlide9.xml><?xml version="1.0" encoding="utf-8"?>
 <p:notes xmlns:a="http://schemas.openxmlformats.org/drawingml/2006/main" xmlns:r="http://schemas.openxmlformats.org/officeDocument/2006/relationships" xmlns:p="http://schemas.openxmlformats.org/presentationml/2006/main">
   <p:cSld>
     <p:spTree>
@@ -4537,7 +4621,7 @@
             </a:br>
             <a:r>
               <a:rPr lang="en-US" sz="4400" b="1" dirty="0"/>
-              <a:t>Java 21 &amp; Maven 4</a:t>
+              <a:t>Maven 4 &amp; Java 21</a:t>
             </a:r>
           </a:p>
         </p:txBody>
@@ -13074,13 +13158,13 @@
         </p:nvSpPr>
         <p:spPr>
           <a:xfrm>
-            <a:off x="1045028" y="3017522"/>
-            <a:ext cx="9941319" cy="3124658"/>
+            <a:off x="1045028" y="3122023"/>
+            <a:ext cx="9941319" cy="3020155"/>
           </a:xfrm>
         </p:spPr>
         <p:txBody>
           <a:bodyPr anchor="ctr">
-            <a:normAutofit/>
+            <a:normAutofit fontScale="92500" lnSpcReduction="20000"/>
           </a:bodyPr>
           <a:lstStyle/>
           <a:p>
@@ -13129,9 +13213,21 @@
             <a:endParaRPr lang="en-US" sz="2400" dirty="0"/>
           </a:p>
           <a:p>
-            <a:pPr marL="0" indent="0">
-              <a:buNone/>
-            </a:pPr>
+            <a:r>
+              <a:rPr lang="en-US" sz="2400" dirty="0">
+                <a:hlinkClick r:id="rId8"/>
+              </a:rPr>
+              <a:t>https://github.com/iuliana/jdk21-parent-project</a:t>
+            </a:r>
+            <a:endParaRPr lang="en-US" sz="2400" dirty="0"/>
+          </a:p>
+          <a:p>
+            <a:r>
+              <a:rPr lang="en-US" sz="2400" dirty="0">
+                <a:hlinkClick r:id="rId9"/>
+              </a:rPr>
+              <a:t>https://maven.apache.org/docs/history.html</a:t>
+            </a:r>
             <a:endParaRPr lang="en-US" sz="2400" dirty="0"/>
           </a:p>
           <a:p>
@@ -17105,7 +17201,7 @@
         </p:spPr>
         <p:txBody>
           <a:bodyPr>
-            <a:normAutofit lnSpcReduction="10000"/>
+            <a:normAutofit fontScale="92500" lnSpcReduction="10000"/>
           </a:bodyPr>
           <a:lstStyle/>
           <a:p>
@@ -17215,6 +17311,20 @@
                 </a:solidFill>
               </a:rPr>
               <a:t>Under development: remote caching, keep build results remote, use them speed up things locally.</a:t>
+            </a:r>
+          </a:p>
+          <a:p>
+            <a:pPr>
+              <a:buFont typeface="Wingdings" pitchFamily="2" charset="2"/>
+              <a:buChar char="Ø"/>
+            </a:pPr>
+            <a:r>
+              <a:rPr lang="en-US" sz="4000" dirty="0">
+                <a:solidFill>
+                  <a:srgbClr val="FF0000"/>
+                </a:solidFill>
+              </a:rPr>
+              <a:t>No official release date for a GA.</a:t>
             </a:r>
           </a:p>
           <a:p>

</xml_diff>

<commit_message>
reorganizing examples and adding text explaining them
</commit_message>
<xml_diff>
--- a/Java21-Presentation.pptx
+++ b/Java21-Presentation.pptx
@@ -215,7 +215,7 @@
           <a:p>
             <a:fld id="{7DCE309A-7A60-DC46-A116-E07ABADAD367}" type="datetimeFigureOut">
               <a:rPr lang="en-US" smtClean="0"/>
-              <a:t>11/3/23</a:t>
+              <a:t>11/7/23</a:t>
             </a:fld>
             <a:endParaRPr lang="en-US"/>
           </a:p>
@@ -1661,102 +1661,10 @@
               <a:buFont typeface="Arial" panose="020B0604020202020204" pitchFamily="34" charset="0"/>
               <a:buChar char="•"/>
             </a:pPr>
-            <a:r>
-              <a:rPr lang="en-US" dirty="0"/>
-              <a:t>Java’s alternative to String interpolation</a:t>
-            </a:r>
-          </a:p>
-          <a:p>
-            <a:pPr rtl="0" fontAlgn="base">
-              <a:lnSpc>
-                <a:spcPct val="170000"/>
-              </a:lnSpc>
-              <a:spcBef>
-                <a:spcPts val="0"/>
-              </a:spcBef>
-              <a:spcAft>
-                <a:spcPts val="0"/>
-              </a:spcAft>
-              <a:buFont typeface="Arial" panose="020B0604020202020204" pitchFamily="34" charset="0"/>
-              <a:buChar char="•"/>
-            </a:pPr>
-            <a:r>
-              <a:rPr lang="en-US" dirty="0"/>
-              <a:t>Drawbacks: </a:t>
-            </a:r>
-            <a:r>
-              <a:rPr lang="en-GB" b="0" i="0" dirty="0">
-                <a:effectLst/>
-                <a:latin typeface="-apple-system"/>
-              </a:rPr>
-              <a:t>replacing the result of the interpolation would create an invalid overall String literal </a:t>
-            </a:r>
-          </a:p>
-          <a:p>
-            <a:pPr rtl="0" fontAlgn="base">
-              <a:lnSpc>
-                <a:spcPct val="170000"/>
-              </a:lnSpc>
-              <a:spcBef>
-                <a:spcPts val="0"/>
-              </a:spcBef>
-              <a:spcAft>
-                <a:spcPts val="0"/>
-              </a:spcAft>
-              <a:buFont typeface="Arial" panose="020B0604020202020204" pitchFamily="34" charset="0"/>
-              <a:buChar char="•"/>
-            </a:pPr>
-            <a:r>
-              <a:rPr lang="en-GB" b="0" i="0" dirty="0">
-                <a:effectLst/>
-                <a:latin typeface="-apple-system"/>
-              </a:rPr>
-              <a:t> without validation </a:t>
-            </a:r>
-          </a:p>
-          <a:p>
-            <a:pPr rtl="0" fontAlgn="base">
-              <a:lnSpc>
-                <a:spcPct val="170000"/>
-              </a:lnSpc>
-              <a:spcBef>
-                <a:spcPts val="0"/>
-              </a:spcBef>
-              <a:spcAft>
-                <a:spcPts val="0"/>
-              </a:spcAft>
-              <a:buFont typeface="Arial" panose="020B0604020202020204" pitchFamily="34" charset="0"/>
-              <a:buChar char="•"/>
-            </a:pPr>
-            <a:r>
-              <a:rPr lang="en-GB" b="0" i="0" dirty="0">
-                <a:effectLst/>
-                <a:latin typeface="-apple-system"/>
-              </a:rPr>
-              <a:t>    SQL injections</a:t>
-            </a:r>
-          </a:p>
-          <a:p>
-            <a:pPr rtl="0" fontAlgn="base">
-              <a:lnSpc>
-                <a:spcPct val="170000"/>
-              </a:lnSpc>
-              <a:spcBef>
-                <a:spcPts val="0"/>
-              </a:spcBef>
-              <a:spcAft>
-                <a:spcPts val="0"/>
-              </a:spcAft>
-              <a:buFont typeface="Arial" panose="020B0604020202020204" pitchFamily="34" charset="0"/>
-              <a:buChar char="•"/>
-            </a:pPr>
-            <a:r>
-              <a:rPr lang="en-GB" b="0" i="0" dirty="0">
-                <a:effectLst/>
-                <a:latin typeface="-apple-system"/>
-              </a:rPr>
-              <a:t>     Invalid JSON, etc</a:t>
-            </a:r>
+            <a:endParaRPr lang="en-GB" b="0" i="0" dirty="0">
+              <a:effectLst/>
+              <a:latin typeface="-apple-system"/>
+            </a:endParaRPr>
           </a:p>
         </p:txBody>
       </p:sp>
@@ -1840,242 +1748,6 @@
           <a:bodyPr/>
           <a:lstStyle/>
           <a:p>
-            <a:r>
-              <a:rPr lang="en-US" dirty="0"/>
-              <a:t>The Java compiler automatically imports STR (</a:t>
-            </a:r>
-            <a:r>
-              <a:rPr lang="en-GB" dirty="0"/>
-              <a:t>public</a:t>
-            </a:r>
-            <a:r>
-              <a:rPr lang="en-GB" b="0" i="0" dirty="0">
-                <a:solidFill>
-                  <a:srgbClr val="000000"/>
-                </a:solidFill>
-                <a:effectLst/>
-                <a:latin typeface="DejaVu Sans" panose="020B0609030804020204" pitchFamily="49" charset="0"/>
-              </a:rPr>
-              <a:t> </a:t>
-            </a:r>
-            <a:r>
-              <a:rPr lang="en-GB" dirty="0"/>
-              <a:t>static</a:t>
-            </a:r>
-            <a:r>
-              <a:rPr lang="en-GB" b="0" i="0" dirty="0">
-                <a:solidFill>
-                  <a:srgbClr val="000000"/>
-                </a:solidFill>
-                <a:effectLst/>
-                <a:latin typeface="DejaVu Sans" panose="020B0609030804020204" pitchFamily="49" charset="0"/>
-              </a:rPr>
-              <a:t> </a:t>
-            </a:r>
-            <a:r>
-              <a:rPr lang="en-GB" dirty="0"/>
-              <a:t>final</a:t>
-            </a:r>
-            <a:r>
-              <a:rPr lang="en-GB" b="0" i="0" dirty="0">
-                <a:solidFill>
-                  <a:srgbClr val="000000"/>
-                </a:solidFill>
-                <a:effectLst/>
-                <a:latin typeface="DejaVu Sans" panose="020B0609030804020204" pitchFamily="49" charset="0"/>
-              </a:rPr>
-              <a:t> field </a:t>
-            </a:r>
-            <a:r>
-              <a:rPr lang="en-US" dirty="0"/>
-              <a:t>)  in any Java source file.</a:t>
-            </a:r>
-          </a:p>
-          <a:p>
-            <a:r>
-              <a:rPr lang="en-US" dirty="0"/>
-              <a:t>STR is an instance of a  processor, similar to a Function(String) -&gt; String</a:t>
-            </a:r>
-          </a:p>
-          <a:p>
-            <a:r>
-              <a:rPr lang="en-US" dirty="0"/>
-              <a:t>Java did not have for a long time a way to embed variables in strings to be resolved at runtime.</a:t>
-            </a:r>
-          </a:p>
-          <a:p>
-            <a:r>
-              <a:rPr lang="en-US" dirty="0"/>
-              <a:t>Expected to replace older ways of formatting strings: concatenation, </a:t>
-            </a:r>
-            <a:r>
-              <a:rPr lang="en-US" dirty="0" err="1"/>
-              <a:t>StringBuilder,String.format</a:t>
-            </a:r>
-            <a:r>
-              <a:rPr lang="en-US" dirty="0"/>
-              <a:t>(), </a:t>
-            </a:r>
-            <a:r>
-              <a:rPr lang="en-US" dirty="0" err="1"/>
-              <a:t>MessageFormat</a:t>
-            </a:r>
-            <a:r>
-              <a:rPr lang="en-US" dirty="0"/>
-              <a:t> class. </a:t>
-            </a:r>
-            <a:r>
-              <a:rPr lang="en-GB" b="0" i="0" dirty="0">
-                <a:solidFill>
-                  <a:srgbClr val="404040"/>
-                </a:solidFill>
-                <a:effectLst/>
-                <a:latin typeface="-apple-system"/>
-              </a:rPr>
-              <a:t>Either they create code hard to read or they are just too verbose for a simple task.</a:t>
-            </a:r>
-          </a:p>
-          <a:p>
-            <a:r>
-              <a:rPr lang="en-GB" b="0" i="0" dirty="0">
-                <a:solidFill>
-                  <a:srgbClr val="404040"/>
-                </a:solidFill>
-                <a:effectLst/>
-                <a:latin typeface="-apple-system"/>
-              </a:rPr>
-              <a:t>It works with multi-line strings too. If provides clarity</a:t>
-            </a:r>
-          </a:p>
-          <a:p>
-            <a:r>
-              <a:rPr lang="en-GB" b="0" i="0" dirty="0">
-                <a:solidFill>
-                  <a:srgbClr val="404040"/>
-                </a:solidFill>
-                <a:effectLst/>
-                <a:latin typeface="-apple-system"/>
-              </a:rPr>
-              <a:t>=&gt; </a:t>
-            </a:r>
-            <a:r>
-              <a:rPr lang="en-GB" b="0" i="0" dirty="0">
-                <a:solidFill>
-                  <a:srgbClr val="000000"/>
-                </a:solidFill>
-                <a:effectLst/>
-                <a:latin typeface="DejaVu Sans" panose="020B0609030804020204" pitchFamily="49" charset="0"/>
-              </a:rPr>
-              <a:t>coupling literal text with embedded expressions and </a:t>
-            </a:r>
-            <a:r>
-              <a:rPr lang="en-GB" b="0" i="1" dirty="0">
-                <a:solidFill>
-                  <a:srgbClr val="000000"/>
-                </a:solidFill>
-                <a:effectLst/>
-                <a:latin typeface="DejaVu Sans" panose="020B0609030804020204" pitchFamily="49" charset="0"/>
-              </a:rPr>
-              <a:t>template processors</a:t>
-            </a:r>
-            <a:r>
-              <a:rPr lang="en-GB" b="0" i="0" dirty="0">
-                <a:solidFill>
-                  <a:srgbClr val="000000"/>
-                </a:solidFill>
-                <a:effectLst/>
-                <a:latin typeface="DejaVu Sans" panose="020B0609030804020204" pitchFamily="49" charset="0"/>
-              </a:rPr>
-              <a:t> to produce specialized results.</a:t>
-            </a:r>
-          </a:p>
-          <a:p>
-            <a:r>
-              <a:rPr lang="en-GB" b="0" i="0" dirty="0">
-                <a:solidFill>
-                  <a:srgbClr val="000000"/>
-                </a:solidFill>
-                <a:effectLst/>
-                <a:latin typeface="DejaVu Sans" panose="020B0609030804020204" pitchFamily="49" charset="0"/>
-              </a:rPr>
-              <a:t>String interpolation is dangerous because the resulted strings might need to be validated or secured, especially when interacting with other systems – such as SQL databases.</a:t>
-            </a:r>
-          </a:p>
-          <a:p>
-            <a:r>
-              <a:rPr lang="en-GB" b="0" i="0" dirty="0">
-                <a:solidFill>
-                  <a:srgbClr val="000000"/>
-                </a:solidFill>
-                <a:effectLst/>
-                <a:latin typeface="DejaVu Sans" panose="020B0609030804020204" pitchFamily="49" charset="0"/>
-              </a:rPr>
-              <a:t>Another example -&gt; a JSON string can easily be broken by interpolation.</a:t>
-            </a:r>
-          </a:p>
-          <a:p>
-            <a:endParaRPr lang="en-GB" b="0" i="0" dirty="0">
-              <a:solidFill>
-                <a:srgbClr val="000000"/>
-              </a:solidFill>
-              <a:effectLst/>
-              <a:latin typeface="DejaVu Sans" panose="020B0609030804020204" pitchFamily="49" charset="0"/>
-            </a:endParaRPr>
-          </a:p>
-          <a:p>
-            <a:r>
-              <a:rPr lang="en-GB" b="0" i="1" dirty="0">
-                <a:solidFill>
-                  <a:srgbClr val="000000"/>
-                </a:solidFill>
-                <a:effectLst/>
-                <a:latin typeface="DejaVu Sans" panose="020B0609030804020204" pitchFamily="49" charset="0"/>
-              </a:rPr>
-              <a:t>Template expressions</a:t>
-            </a:r>
-            <a:r>
-              <a:rPr lang="en-GB" b="0" i="0" dirty="0">
-                <a:solidFill>
-                  <a:srgbClr val="000000"/>
-                </a:solidFill>
-                <a:effectLst/>
-                <a:latin typeface="DejaVu Sans" panose="020B0609030804020204" pitchFamily="49" charset="0"/>
-              </a:rPr>
-              <a:t> are a new kind of expression in the Java programming language. Template expressions can perform string interpolation but are also programmable in a way that helps developers compose strings safely and efficiently.</a:t>
-            </a:r>
-          </a:p>
-          <a:p>
-            <a:r>
-              <a:rPr lang="en-GB" b="0" i="0" dirty="0">
-                <a:solidFill>
-                  <a:srgbClr val="000000"/>
-                </a:solidFill>
-                <a:effectLst/>
-                <a:latin typeface="DejaVu Sans" panose="020B0609030804020204" pitchFamily="49" charset="0"/>
-              </a:rPr>
-              <a:t>Template processor + “.” + embedded expression</a:t>
-            </a:r>
-          </a:p>
-          <a:p>
-            <a:endParaRPr lang="en-GB" b="0" i="0" dirty="0">
-              <a:solidFill>
-                <a:srgbClr val="000000"/>
-              </a:solidFill>
-              <a:effectLst/>
-              <a:latin typeface="DejaVu Sans" panose="020B0609030804020204" pitchFamily="49" charset="0"/>
-            </a:endParaRPr>
-          </a:p>
-          <a:p>
-            <a:r>
-              <a:rPr lang="en-GB" b="0" i="0" dirty="0">
-                <a:solidFill>
-                  <a:srgbClr val="000000"/>
-                </a:solidFill>
-                <a:effectLst/>
-                <a:latin typeface="DejaVu Sans" panose="020B0609030804020204" pitchFamily="49" charset="0"/>
-              </a:rPr>
-              <a:t>Other FMT = STR +  interprets format specifiers , RAW (STR deferred). </a:t>
-            </a:r>
             <a:endParaRPr lang="en-US" dirty="0"/>
           </a:p>
         </p:txBody>
@@ -2160,242 +1832,6 @@
           <a:bodyPr/>
           <a:lstStyle/>
           <a:p>
-            <a:r>
-              <a:rPr lang="en-US" dirty="0"/>
-              <a:t>The Java compiler automatically imports STR (</a:t>
-            </a:r>
-            <a:r>
-              <a:rPr lang="en-GB" dirty="0"/>
-              <a:t>public</a:t>
-            </a:r>
-            <a:r>
-              <a:rPr lang="en-GB" b="0" i="0" dirty="0">
-                <a:solidFill>
-                  <a:srgbClr val="000000"/>
-                </a:solidFill>
-                <a:effectLst/>
-                <a:latin typeface="DejaVu Sans" panose="020B0609030804020204" pitchFamily="49" charset="0"/>
-              </a:rPr>
-              <a:t> </a:t>
-            </a:r>
-            <a:r>
-              <a:rPr lang="en-GB" dirty="0"/>
-              <a:t>static</a:t>
-            </a:r>
-            <a:r>
-              <a:rPr lang="en-GB" b="0" i="0" dirty="0">
-                <a:solidFill>
-                  <a:srgbClr val="000000"/>
-                </a:solidFill>
-                <a:effectLst/>
-                <a:latin typeface="DejaVu Sans" panose="020B0609030804020204" pitchFamily="49" charset="0"/>
-              </a:rPr>
-              <a:t> </a:t>
-            </a:r>
-            <a:r>
-              <a:rPr lang="en-GB" dirty="0"/>
-              <a:t>final</a:t>
-            </a:r>
-            <a:r>
-              <a:rPr lang="en-GB" b="0" i="0" dirty="0">
-                <a:solidFill>
-                  <a:srgbClr val="000000"/>
-                </a:solidFill>
-                <a:effectLst/>
-                <a:latin typeface="DejaVu Sans" panose="020B0609030804020204" pitchFamily="49" charset="0"/>
-              </a:rPr>
-              <a:t> field </a:t>
-            </a:r>
-            <a:r>
-              <a:rPr lang="en-US" dirty="0"/>
-              <a:t>)  in any Java source file.</a:t>
-            </a:r>
-          </a:p>
-          <a:p>
-            <a:r>
-              <a:rPr lang="en-US" dirty="0"/>
-              <a:t>STR is an instance of a  processor, similar to a Function(String) -&gt; String</a:t>
-            </a:r>
-          </a:p>
-          <a:p>
-            <a:r>
-              <a:rPr lang="en-US" dirty="0"/>
-              <a:t>Java did not have for a long time a way to embed variables in strings to be resolved at runtime.</a:t>
-            </a:r>
-          </a:p>
-          <a:p>
-            <a:r>
-              <a:rPr lang="en-US" dirty="0"/>
-              <a:t>Expected to replace older ways of formatting strings: concatenation, </a:t>
-            </a:r>
-            <a:r>
-              <a:rPr lang="en-US" dirty="0" err="1"/>
-              <a:t>StringBuilder,String.format</a:t>
-            </a:r>
-            <a:r>
-              <a:rPr lang="en-US" dirty="0"/>
-              <a:t>(), </a:t>
-            </a:r>
-            <a:r>
-              <a:rPr lang="en-US" dirty="0" err="1"/>
-              <a:t>MessageFormat</a:t>
-            </a:r>
-            <a:r>
-              <a:rPr lang="en-US" dirty="0"/>
-              <a:t> class. </a:t>
-            </a:r>
-            <a:r>
-              <a:rPr lang="en-GB" b="0" i="0" dirty="0">
-                <a:solidFill>
-                  <a:srgbClr val="404040"/>
-                </a:solidFill>
-                <a:effectLst/>
-                <a:latin typeface="-apple-system"/>
-              </a:rPr>
-              <a:t>Either they create code hard to read or they are just too verbose for a simple task.</a:t>
-            </a:r>
-          </a:p>
-          <a:p>
-            <a:r>
-              <a:rPr lang="en-GB" b="0" i="0" dirty="0">
-                <a:solidFill>
-                  <a:srgbClr val="404040"/>
-                </a:solidFill>
-                <a:effectLst/>
-                <a:latin typeface="-apple-system"/>
-              </a:rPr>
-              <a:t>It works with multi-line strings too. If provides clarity</a:t>
-            </a:r>
-          </a:p>
-          <a:p>
-            <a:r>
-              <a:rPr lang="en-GB" b="0" i="0" dirty="0">
-                <a:solidFill>
-                  <a:srgbClr val="404040"/>
-                </a:solidFill>
-                <a:effectLst/>
-                <a:latin typeface="-apple-system"/>
-              </a:rPr>
-              <a:t>=&gt; </a:t>
-            </a:r>
-            <a:r>
-              <a:rPr lang="en-GB" b="0" i="0" dirty="0">
-                <a:solidFill>
-                  <a:srgbClr val="000000"/>
-                </a:solidFill>
-                <a:effectLst/>
-                <a:latin typeface="DejaVu Sans" panose="020B0609030804020204" pitchFamily="49" charset="0"/>
-              </a:rPr>
-              <a:t>coupling literal text with embedded expressions and </a:t>
-            </a:r>
-            <a:r>
-              <a:rPr lang="en-GB" b="0" i="1" dirty="0">
-                <a:solidFill>
-                  <a:srgbClr val="000000"/>
-                </a:solidFill>
-                <a:effectLst/>
-                <a:latin typeface="DejaVu Sans" panose="020B0609030804020204" pitchFamily="49" charset="0"/>
-              </a:rPr>
-              <a:t>template processors</a:t>
-            </a:r>
-            <a:r>
-              <a:rPr lang="en-GB" b="0" i="0" dirty="0">
-                <a:solidFill>
-                  <a:srgbClr val="000000"/>
-                </a:solidFill>
-                <a:effectLst/>
-                <a:latin typeface="DejaVu Sans" panose="020B0609030804020204" pitchFamily="49" charset="0"/>
-              </a:rPr>
-              <a:t> to produce specialized results.</a:t>
-            </a:r>
-          </a:p>
-          <a:p>
-            <a:r>
-              <a:rPr lang="en-GB" b="0" i="0" dirty="0">
-                <a:solidFill>
-                  <a:srgbClr val="000000"/>
-                </a:solidFill>
-                <a:effectLst/>
-                <a:latin typeface="DejaVu Sans" panose="020B0609030804020204" pitchFamily="49" charset="0"/>
-              </a:rPr>
-              <a:t>String interpolation is dangerous because the resulted strings might need to be validated or secured, especially when interacting with other systems – such as SQL databases.</a:t>
-            </a:r>
-          </a:p>
-          <a:p>
-            <a:r>
-              <a:rPr lang="en-GB" b="0" i="0" dirty="0">
-                <a:solidFill>
-                  <a:srgbClr val="000000"/>
-                </a:solidFill>
-                <a:effectLst/>
-                <a:latin typeface="DejaVu Sans" panose="020B0609030804020204" pitchFamily="49" charset="0"/>
-              </a:rPr>
-              <a:t>Another example -&gt; a JSON string can easily be broken by interpolation.</a:t>
-            </a:r>
-          </a:p>
-          <a:p>
-            <a:endParaRPr lang="en-GB" b="0" i="0" dirty="0">
-              <a:solidFill>
-                <a:srgbClr val="000000"/>
-              </a:solidFill>
-              <a:effectLst/>
-              <a:latin typeface="DejaVu Sans" panose="020B0609030804020204" pitchFamily="49" charset="0"/>
-            </a:endParaRPr>
-          </a:p>
-          <a:p>
-            <a:r>
-              <a:rPr lang="en-GB" b="0" i="1" dirty="0">
-                <a:solidFill>
-                  <a:srgbClr val="000000"/>
-                </a:solidFill>
-                <a:effectLst/>
-                <a:latin typeface="DejaVu Sans" panose="020B0609030804020204" pitchFamily="49" charset="0"/>
-              </a:rPr>
-              <a:t>Template expressions</a:t>
-            </a:r>
-            <a:r>
-              <a:rPr lang="en-GB" b="0" i="0" dirty="0">
-                <a:solidFill>
-                  <a:srgbClr val="000000"/>
-                </a:solidFill>
-                <a:effectLst/>
-                <a:latin typeface="DejaVu Sans" panose="020B0609030804020204" pitchFamily="49" charset="0"/>
-              </a:rPr>
-              <a:t> are a new kind of expression in the Java programming language. Template expressions can perform string interpolation but are also programmable in a way that helps developers compose strings safely and efficiently.</a:t>
-            </a:r>
-          </a:p>
-          <a:p>
-            <a:r>
-              <a:rPr lang="en-GB" b="0" i="0" dirty="0">
-                <a:solidFill>
-                  <a:srgbClr val="000000"/>
-                </a:solidFill>
-                <a:effectLst/>
-                <a:latin typeface="DejaVu Sans" panose="020B0609030804020204" pitchFamily="49" charset="0"/>
-              </a:rPr>
-              <a:t>Template processor + “.” + embedded expression</a:t>
-            </a:r>
-          </a:p>
-          <a:p>
-            <a:endParaRPr lang="en-GB" b="0" i="0" dirty="0">
-              <a:solidFill>
-                <a:srgbClr val="000000"/>
-              </a:solidFill>
-              <a:effectLst/>
-              <a:latin typeface="DejaVu Sans" panose="020B0609030804020204" pitchFamily="49" charset="0"/>
-            </a:endParaRPr>
-          </a:p>
-          <a:p>
-            <a:r>
-              <a:rPr lang="en-GB" b="0" i="0" dirty="0">
-                <a:solidFill>
-                  <a:srgbClr val="000000"/>
-                </a:solidFill>
-                <a:effectLst/>
-                <a:latin typeface="DejaVu Sans" panose="020B0609030804020204" pitchFamily="49" charset="0"/>
-              </a:rPr>
-              <a:t>Other FMT = STF +  interprets format specifiers , RAW (STR deferred). </a:t>
-            </a:r>
             <a:endParaRPr lang="en-US" dirty="0"/>
           </a:p>
         </p:txBody>
@@ -2679,7 +2115,7 @@
           <a:p>
             <a:fld id="{00B59761-C2A7-844A-B0A4-477EF3BF3F07}" type="datetimeFigureOut">
               <a:rPr lang="en-US" smtClean="0"/>
-              <a:t>11/3/23</a:t>
+              <a:t>11/7/23</a:t>
             </a:fld>
             <a:endParaRPr lang="en-US"/>
           </a:p>
@@ -2879,7 +2315,7 @@
           <a:p>
             <a:fld id="{00B59761-C2A7-844A-B0A4-477EF3BF3F07}" type="datetimeFigureOut">
               <a:rPr lang="en-US" smtClean="0"/>
-              <a:t>11/3/23</a:t>
+              <a:t>11/7/23</a:t>
             </a:fld>
             <a:endParaRPr lang="en-US"/>
           </a:p>
@@ -3089,7 +2525,7 @@
           <a:p>
             <a:fld id="{00B59761-C2A7-844A-B0A4-477EF3BF3F07}" type="datetimeFigureOut">
               <a:rPr lang="en-US" smtClean="0"/>
-              <a:t>11/3/23</a:t>
+              <a:t>11/7/23</a:t>
             </a:fld>
             <a:endParaRPr lang="en-US"/>
           </a:p>
@@ -3289,7 +2725,7 @@
           <a:p>
             <a:fld id="{00B59761-C2A7-844A-B0A4-477EF3BF3F07}" type="datetimeFigureOut">
               <a:rPr lang="en-US" smtClean="0"/>
-              <a:t>11/3/23</a:t>
+              <a:t>11/7/23</a:t>
             </a:fld>
             <a:endParaRPr lang="en-US"/>
           </a:p>
@@ -3565,7 +3001,7 @@
           <a:p>
             <a:fld id="{00B59761-C2A7-844A-B0A4-477EF3BF3F07}" type="datetimeFigureOut">
               <a:rPr lang="en-US" smtClean="0"/>
-              <a:t>11/3/23</a:t>
+              <a:t>11/7/23</a:t>
             </a:fld>
             <a:endParaRPr lang="en-US"/>
           </a:p>
@@ -3833,7 +3269,7 @@
           <a:p>
             <a:fld id="{00B59761-C2A7-844A-B0A4-477EF3BF3F07}" type="datetimeFigureOut">
               <a:rPr lang="en-US" smtClean="0"/>
-              <a:t>11/3/23</a:t>
+              <a:t>11/7/23</a:t>
             </a:fld>
             <a:endParaRPr lang="en-US"/>
           </a:p>
@@ -4248,7 +3684,7 @@
           <a:p>
             <a:fld id="{00B59761-C2A7-844A-B0A4-477EF3BF3F07}" type="datetimeFigureOut">
               <a:rPr lang="en-US" smtClean="0"/>
-              <a:t>11/3/23</a:t>
+              <a:t>11/7/23</a:t>
             </a:fld>
             <a:endParaRPr lang="en-US"/>
           </a:p>
@@ -4390,7 +3826,7 @@
           <a:p>
             <a:fld id="{00B59761-C2A7-844A-B0A4-477EF3BF3F07}" type="datetimeFigureOut">
               <a:rPr lang="en-US" smtClean="0"/>
-              <a:t>11/3/23</a:t>
+              <a:t>11/7/23</a:t>
             </a:fld>
             <a:endParaRPr lang="en-US"/>
           </a:p>
@@ -4503,7 +3939,7 @@
           <a:p>
             <a:fld id="{00B59761-C2A7-844A-B0A4-477EF3BF3F07}" type="datetimeFigureOut">
               <a:rPr lang="en-US" smtClean="0"/>
-              <a:t>11/3/23</a:t>
+              <a:t>11/7/23</a:t>
             </a:fld>
             <a:endParaRPr lang="en-US"/>
           </a:p>
@@ -4816,7 +4252,7 @@
           <a:p>
             <a:fld id="{00B59761-C2A7-844A-B0A4-477EF3BF3F07}" type="datetimeFigureOut">
               <a:rPr lang="en-US" smtClean="0"/>
-              <a:t>11/3/23</a:t>
+              <a:t>11/7/23</a:t>
             </a:fld>
             <a:endParaRPr lang="en-US"/>
           </a:p>
@@ -5105,7 +4541,7 @@
           <a:p>
             <a:fld id="{00B59761-C2A7-844A-B0A4-477EF3BF3F07}" type="datetimeFigureOut">
               <a:rPr lang="en-US" smtClean="0"/>
-              <a:t>11/3/23</a:t>
+              <a:t>11/7/23</a:t>
             </a:fld>
             <a:endParaRPr lang="en-US"/>
           </a:p>
@@ -5348,7 +4784,7 @@
           <a:p>
             <a:fld id="{00B59761-C2A7-844A-B0A4-477EF3BF3F07}" type="datetimeFigureOut">
               <a:rPr lang="en-US" smtClean="0"/>
-              <a:t>11/3/23</a:t>
+              <a:t>11/7/23</a:t>
             </a:fld>
             <a:endParaRPr lang="en-US"/>
           </a:p>
@@ -24933,7 +24369,7 @@
             </a:pPr>
             <a:r>
               <a:rPr lang="en-US" dirty="0"/>
-              <a:t>Other languages</a:t>
+              <a:t>String interpolation in other languages</a:t>
             </a:r>
           </a:p>
           <a:p>

</xml_diff>

<commit_message>
Added more details for Java 21 pieces
</commit_message>
<xml_diff>
--- a/Java21-Presentation.pptx
+++ b/Java21-Presentation.pptx
@@ -5,7 +5,7 @@
     <p:sldMasterId id="2147483648" r:id="rId1"/>
   </p:sldMasterIdLst>
   <p:notesMasterIdLst>
-    <p:notesMasterId r:id="rId21"/>
+    <p:notesMasterId r:id="rId22"/>
   </p:notesMasterIdLst>
   <p:sldIdLst>
     <p:sldId id="256" r:id="rId2"/>
@@ -20,13 +20,14 @@
     <p:sldId id="276" r:id="rId11"/>
     <p:sldId id="267" r:id="rId12"/>
     <p:sldId id="269" r:id="rId13"/>
-    <p:sldId id="270" r:id="rId14"/>
-    <p:sldId id="271" r:id="rId15"/>
-    <p:sldId id="272" r:id="rId16"/>
-    <p:sldId id="275" r:id="rId17"/>
-    <p:sldId id="274" r:id="rId18"/>
-    <p:sldId id="264" r:id="rId19"/>
-    <p:sldId id="265" r:id="rId20"/>
+    <p:sldId id="278" r:id="rId14"/>
+    <p:sldId id="270" r:id="rId15"/>
+    <p:sldId id="271" r:id="rId16"/>
+    <p:sldId id="272" r:id="rId17"/>
+    <p:sldId id="275" r:id="rId18"/>
+    <p:sldId id="274" r:id="rId19"/>
+    <p:sldId id="264" r:id="rId20"/>
+    <p:sldId id="265" r:id="rId21"/>
   </p:sldIdLst>
   <p:sldSz cx="12192000" cy="6858000"/>
   <p:notesSz cx="6858000" cy="9144000"/>
@@ -215,7 +216,7 @@
           <a:p>
             <a:fld id="{7DCE309A-7A60-DC46-A116-E07ABADAD367}" type="datetimeFigureOut">
               <a:rPr lang="en-US" smtClean="0"/>
-              <a:t>11/7/23</a:t>
+              <a:t>11/8/23</a:t>
             </a:fld>
             <a:endParaRPr lang="en-US"/>
           </a:p>
@@ -622,39 +623,6 @@
                 <a:effectLst/>
                 <a:latin typeface="DejaVu Sans" panose="020B0609030804020204" pitchFamily="49" charset="0"/>
               </a:rPr>
-              <a:t>to maintain separate </a:t>
-            </a:r>
-            <a:r>
-              <a:rPr lang="en-GB" b="0" i="0" u="none" strike="noStrike" dirty="0">
-                <a:solidFill>
-                  <a:srgbClr val="437291"/>
-                </a:solidFill>
-                <a:effectLst/>
-                <a:latin typeface="DejaVu Sans" panose="020B0609030804020204" pitchFamily="49" charset="0"/>
-                <a:hlinkClick r:id="rId3"/>
-              </a:rPr>
-              <a:t>generations</a:t>
-            </a:r>
-            <a:r>
-              <a:rPr lang="en-GB" b="0" i="0" dirty="0">
-                <a:solidFill>
-                  <a:srgbClr val="000000"/>
-                </a:solidFill>
-                <a:effectLst/>
-                <a:latin typeface="DejaVu Sans" panose="020B0609030804020204" pitchFamily="49" charset="0"/>
-              </a:rPr>
-              <a:t> for young and old objects. This will allow ZGC to collect young objects — which tend to die young — more frequently.</a:t>
-            </a:r>
-          </a:p>
-          <a:p>
-            <a:r>
-              <a:rPr lang="en-GB" b="0" i="0" dirty="0">
-                <a:solidFill>
-                  <a:srgbClr val="000000"/>
-                </a:solidFill>
-                <a:effectLst/>
-                <a:latin typeface="DejaVu Sans" panose="020B0609030804020204" pitchFamily="49" charset="0"/>
-              </a:rPr>
               <a:t>NUMA= </a:t>
             </a:r>
             <a:r>
@@ -667,140 +635,6 @@
               </a:rPr>
               <a:t>Non-Uniform Memory Access</a:t>
             </a:r>
-          </a:p>
-          <a:p>
-            <a:pPr marL="0" marR="0" lvl="0" indent="0" algn="l" defTabSz="914400" rtl="0" eaLnBrk="1" fontAlgn="auto" latinLnBrk="0" hangingPunct="1">
-              <a:lnSpc>
-                <a:spcPct val="100000"/>
-              </a:lnSpc>
-              <a:spcBef>
-                <a:spcPts val="0"/>
-              </a:spcBef>
-              <a:spcAft>
-                <a:spcPts val="0"/>
-              </a:spcAft>
-              <a:buClrTx/>
-              <a:buSzTx/>
-              <a:buFontTx/>
-              <a:buNone/>
-              <a:tabLst/>
-              <a:defRPr/>
-            </a:pPr>
-            <a:r>
-              <a:rPr lang="en-GB" b="0" i="0" dirty="0">
-                <a:solidFill>
-                  <a:srgbClr val="000000"/>
-                </a:solidFill>
-                <a:effectLst/>
-                <a:latin typeface="DejaVu Sans" panose="020B0609030804020204" pitchFamily="49" charset="0"/>
-              </a:rPr>
-              <a:t>Lower garbage collection CPU overhead.</a:t>
-            </a:r>
-          </a:p>
-          <a:p>
-            <a:pPr marL="171450" marR="0" lvl="0" indent="-171450" algn="l" defTabSz="914400" rtl="0" eaLnBrk="1" fontAlgn="auto" latinLnBrk="0" hangingPunct="1">
-              <a:lnSpc>
-                <a:spcPct val="100000"/>
-              </a:lnSpc>
-              <a:spcBef>
-                <a:spcPts val="0"/>
-              </a:spcBef>
-              <a:spcAft>
-                <a:spcPts val="0"/>
-              </a:spcAft>
-              <a:buClrTx/>
-              <a:buSzTx/>
-              <a:buFont typeface="Wingdings" pitchFamily="2" charset="2"/>
-              <a:buChar char="è"/>
-              <a:tabLst/>
-              <a:defRPr/>
-            </a:pPr>
-            <a:r>
-              <a:rPr lang="en-GB" b="0" i="0" dirty="0">
-                <a:solidFill>
-                  <a:srgbClr val="000000"/>
-                </a:solidFill>
-                <a:effectLst/>
-                <a:latin typeface="DejaVu Sans" panose="020B0609030804020204" pitchFamily="49" charset="0"/>
-              </a:rPr>
-              <a:t>Pause times should not exceed 1 millisecond,</a:t>
-            </a:r>
-          </a:p>
-          <a:p>
-            <a:pPr marL="171450" marR="0" lvl="0" indent="-171450" algn="l" defTabSz="914400" rtl="0" eaLnBrk="1" fontAlgn="auto" latinLnBrk="0" hangingPunct="1">
-              <a:lnSpc>
-                <a:spcPct val="100000"/>
-              </a:lnSpc>
-              <a:spcBef>
-                <a:spcPts val="0"/>
-              </a:spcBef>
-              <a:spcAft>
-                <a:spcPts val="0"/>
-              </a:spcAft>
-              <a:buClrTx/>
-              <a:buSzTx/>
-              <a:buFont typeface="Wingdings" pitchFamily="2" charset="2"/>
-              <a:buChar char="è"/>
-              <a:tabLst/>
-              <a:defRPr/>
-            </a:pPr>
-            <a:r>
-              <a:rPr lang="en-GB" b="0" i="0" dirty="0">
-                <a:solidFill>
-                  <a:srgbClr val="333333"/>
-                </a:solidFill>
-                <a:effectLst/>
-                <a:latin typeface="Bitstream Vera Sans"/>
-              </a:rPr>
-              <a:t>At its core, ZGC is a </a:t>
-            </a:r>
-            <a:r>
-              <a:rPr lang="en-GB" b="1" i="0" dirty="0">
-                <a:solidFill>
-                  <a:srgbClr val="333333"/>
-                </a:solidFill>
-                <a:effectLst/>
-                <a:latin typeface="Bitstream Vera Sans"/>
-              </a:rPr>
-              <a:t>concurrent</a:t>
-            </a:r>
-            <a:r>
-              <a:rPr lang="en-GB" b="0" i="0" dirty="0">
-                <a:solidFill>
-                  <a:srgbClr val="333333"/>
-                </a:solidFill>
-                <a:effectLst/>
-                <a:latin typeface="Bitstream Vera Sans"/>
-              </a:rPr>
-              <a:t> garbage collector, meaning all heavy lifting work is done while </a:t>
-            </a:r>
-            <a:r>
-              <a:rPr lang="en-GB" b="1" i="0" dirty="0">
-                <a:solidFill>
-                  <a:srgbClr val="333333"/>
-                </a:solidFill>
-                <a:effectLst/>
-                <a:latin typeface="Bitstream Vera Sans"/>
-              </a:rPr>
-              <a:t>Java threads continue to execute</a:t>
-            </a:r>
-            <a:r>
-              <a:rPr lang="en-GB" b="0" i="0" dirty="0">
-                <a:solidFill>
-                  <a:srgbClr val="333333"/>
-                </a:solidFill>
-                <a:effectLst/>
-                <a:latin typeface="Bitstream Vera Sans"/>
-              </a:rPr>
-              <a:t>.</a:t>
-            </a:r>
-            <a:endParaRPr lang="en-GB" b="0" i="0" dirty="0">
-              <a:solidFill>
-                <a:srgbClr val="000000"/>
-              </a:solidFill>
-              <a:effectLst/>
-              <a:latin typeface="DejaVu Sans" panose="020B0609030804020204" pitchFamily="49" charset="0"/>
-            </a:endParaRPr>
           </a:p>
           <a:p>
             <a:pPr marL="171450" marR="0" lvl="0" indent="-171450" algn="l" defTabSz="914400" rtl="0" eaLnBrk="1" fontAlgn="auto" latinLnBrk="0" hangingPunct="1">
@@ -837,64 +671,6 @@
               <a:effectLst/>
               <a:latin typeface="DejaVu Sans" panose="020B0609030804020204" pitchFamily="49" charset="0"/>
             </a:endParaRPr>
-          </a:p>
-          <a:p>
-            <a:pPr marL="171450" marR="0" lvl="0" indent="-171450" algn="l" defTabSz="914400" rtl="0" eaLnBrk="1" fontAlgn="auto" latinLnBrk="0" hangingPunct="1">
-              <a:lnSpc>
-                <a:spcPct val="100000"/>
-              </a:lnSpc>
-              <a:spcBef>
-                <a:spcPts val="0"/>
-              </a:spcBef>
-              <a:spcAft>
-                <a:spcPts val="0"/>
-              </a:spcAft>
-              <a:buClrTx/>
-              <a:buSzTx/>
-              <a:buFont typeface="Wingdings" pitchFamily="2" charset="2"/>
-              <a:buChar char="è"/>
-              <a:tabLst/>
-              <a:defRPr/>
-            </a:pPr>
-            <a:r>
-              <a:rPr lang="en-GB" b="0" i="0" dirty="0">
-                <a:solidFill>
-                  <a:srgbClr val="444444"/>
-                </a:solidFill>
-                <a:effectLst/>
-                <a:latin typeface="Bitstream Vera Sans"/>
-              </a:rPr>
-              <a:t>Starting from JDK 17, ZGC dynamically scales up and down the number of concurrent GC threads.</a:t>
-            </a:r>
-          </a:p>
-          <a:p>
-            <a:pPr marL="171450" marR="0" lvl="0" indent="-171450" algn="l" defTabSz="914400" rtl="0" eaLnBrk="1" fontAlgn="auto" latinLnBrk="0" hangingPunct="1">
-              <a:lnSpc>
-                <a:spcPct val="100000"/>
-              </a:lnSpc>
-              <a:spcBef>
-                <a:spcPts val="0"/>
-              </a:spcBef>
-              <a:spcAft>
-                <a:spcPts val="0"/>
-              </a:spcAft>
-              <a:buClrTx/>
-              <a:buSzTx/>
-              <a:buFont typeface="Wingdings" pitchFamily="2" charset="2"/>
-              <a:buChar char="è"/>
-              <a:tabLst/>
-              <a:defRPr/>
-            </a:pPr>
-            <a:r>
-              <a:rPr lang="en-GB" b="0" i="0" dirty="0">
-                <a:solidFill>
-                  <a:srgbClr val="444444"/>
-                </a:solidFill>
-                <a:effectLst/>
-                <a:latin typeface="Bitstream Vera Sans"/>
-              </a:rPr>
-              <a:t>The log is way richer in details</a:t>
-            </a:r>
           </a:p>
           <a:p>
             <a:pPr marL="171450" marR="0" lvl="0" indent="-171450" algn="l" defTabSz="914400" rtl="0" eaLnBrk="1" fontAlgn="auto" latinLnBrk="0" hangingPunct="1">
@@ -1026,6 +802,109 @@
           <a:bodyPr/>
           <a:lstStyle/>
           <a:p>
+            <a:r>
+              <a:rPr lang="en-GB" b="0" i="0" dirty="0">
+                <a:solidFill>
+                  <a:srgbClr val="000000"/>
+                </a:solidFill>
+                <a:effectLst/>
+                <a:latin typeface="DejaVu Sans" panose="020B0609030804020204" pitchFamily="49" charset="0"/>
+              </a:rPr>
+              <a:t>NUMA= </a:t>
+            </a:r>
+            <a:r>
+              <a:rPr lang="en-GB" b="1" i="0" dirty="0">
+                <a:solidFill>
+                  <a:srgbClr val="222222"/>
+                </a:solidFill>
+                <a:effectLst/>
+                <a:latin typeface="Merriweather" panose="020F0502020204030204" pitchFamily="34" charset="0"/>
+              </a:rPr>
+              <a:t>Non-Uniform Memory Access</a:t>
+            </a:r>
+          </a:p>
+          <a:p>
+            <a:pPr marL="171450" marR="0" lvl="0" indent="-171450" algn="l" defTabSz="914400" rtl="0" eaLnBrk="1" fontAlgn="auto" latinLnBrk="0" hangingPunct="1">
+              <a:lnSpc>
+                <a:spcPct val="100000"/>
+              </a:lnSpc>
+              <a:spcBef>
+                <a:spcPts val="0"/>
+              </a:spcBef>
+              <a:spcAft>
+                <a:spcPts val="0"/>
+              </a:spcAft>
+              <a:buClrTx/>
+              <a:buSzTx/>
+              <a:buFont typeface="Wingdings" pitchFamily="2" charset="2"/>
+              <a:buChar char="è"/>
+              <a:tabLst/>
+              <a:defRPr/>
+            </a:pPr>
+            <a:r>
+              <a:rPr lang="en-GB" b="0" i="0" dirty="0">
+                <a:solidFill>
+                  <a:srgbClr val="444444"/>
+                </a:solidFill>
+                <a:effectLst/>
+                <a:latin typeface="Bitstream Vera Sans"/>
+              </a:rPr>
+              <a:t>"Zettabyte File System”</a:t>
+            </a:r>
+            <a:endParaRPr lang="en-GB" b="0" i="0" dirty="0">
+              <a:solidFill>
+                <a:srgbClr val="000000"/>
+              </a:solidFill>
+              <a:effectLst/>
+              <a:latin typeface="DejaVu Sans" panose="020B0609030804020204" pitchFamily="49" charset="0"/>
+            </a:endParaRPr>
+          </a:p>
+          <a:p>
+            <a:pPr marL="171450" marR="0" lvl="0" indent="-171450" algn="l" defTabSz="914400" rtl="0" eaLnBrk="1" fontAlgn="auto" latinLnBrk="0" hangingPunct="1">
+              <a:lnSpc>
+                <a:spcPct val="100000"/>
+              </a:lnSpc>
+              <a:spcBef>
+                <a:spcPts val="0"/>
+              </a:spcBef>
+              <a:spcAft>
+                <a:spcPts val="0"/>
+              </a:spcAft>
+              <a:buClrTx/>
+              <a:buSzTx/>
+              <a:buFont typeface="Wingdings" pitchFamily="2" charset="2"/>
+              <a:buChar char="è"/>
+              <a:tabLst/>
+              <a:defRPr/>
+            </a:pPr>
+            <a:r>
+              <a:rPr lang="en-GB" dirty="0">
+                <a:solidFill>
+                  <a:srgbClr val="080808"/>
+                </a:solidFill>
+                <a:effectLst/>
+              </a:rPr>
+              <a:t>(Non-generational ZGC uses multi-mapped memory to reduce the overhead of load barriers.)</a:t>
+            </a:r>
+          </a:p>
+          <a:p>
+            <a:pPr marL="171450" marR="0" lvl="0" indent="-171450" algn="l" defTabSz="914400" rtl="0" eaLnBrk="1" fontAlgn="auto" latinLnBrk="0" hangingPunct="1">
+              <a:lnSpc>
+                <a:spcPct val="100000"/>
+              </a:lnSpc>
+              <a:spcBef>
+                <a:spcPts val="0"/>
+              </a:spcBef>
+              <a:spcAft>
+                <a:spcPts val="0"/>
+              </a:spcAft>
+              <a:buClrTx/>
+              <a:buSzTx/>
+              <a:buFont typeface="Wingdings" pitchFamily="2" charset="2"/>
+              <a:buChar char="è"/>
+              <a:tabLst/>
+              <a:defRPr/>
+            </a:pPr>
             <a:endParaRPr lang="en-US" dirty="0"/>
           </a:p>
         </p:txBody>
@@ -1047,7 +926,7 @@
           <a:p>
             <a:fld id="{97338A82-0D20-3D4A-B4B7-58B5112FF922}" type="slidenum">
               <a:rPr lang="en-US" smtClean="0"/>
-              <a:t>17</a:t>
+              <a:t>13</a:t>
             </a:fld>
             <a:endParaRPr lang="en-US"/>
           </a:p>
@@ -1056,7 +935,7 @@
     </p:spTree>
     <p:extLst>
       <p:ext uri="{BB962C8B-B14F-4D97-AF65-F5344CB8AC3E}">
-        <p14:creationId xmlns:p14="http://schemas.microsoft.com/office/powerpoint/2010/main" val="907419315"/>
+        <p14:creationId xmlns:p14="http://schemas.microsoft.com/office/powerpoint/2010/main" val="890224173"/>
       </p:ext>
     </p:extLst>
   </p:cSld>
@@ -1110,7 +989,7 @@
           <a:bodyPr/>
           <a:lstStyle/>
           <a:p>
-            <a:endParaRPr lang="en-US"/>
+            <a:endParaRPr lang="en-US" dirty="0"/>
           </a:p>
         </p:txBody>
       </p:sp>
@@ -1131,7 +1010,91 @@
           <a:p>
             <a:fld id="{97338A82-0D20-3D4A-B4B7-58B5112FF922}" type="slidenum">
               <a:rPr lang="en-US" smtClean="0"/>
-              <a:t>19</a:t>
+              <a:t>18</a:t>
+            </a:fld>
+            <a:endParaRPr lang="en-US"/>
+          </a:p>
+        </p:txBody>
+      </p:sp>
+    </p:spTree>
+    <p:extLst>
+      <p:ext uri="{BB962C8B-B14F-4D97-AF65-F5344CB8AC3E}">
+        <p14:creationId xmlns:p14="http://schemas.microsoft.com/office/powerpoint/2010/main" val="907419315"/>
+      </p:ext>
+    </p:extLst>
+  </p:cSld>
+  <p:clrMapOvr>
+    <a:masterClrMapping/>
+  </p:clrMapOvr>
+</p:notes>
+</file>
+
+<file path=ppt/notesSlides/notesSlide13.xml><?xml version="1.0" encoding="utf-8"?>
+<p:notes xmlns:a="http://schemas.openxmlformats.org/drawingml/2006/main" xmlns:r="http://schemas.openxmlformats.org/officeDocument/2006/relationships" xmlns:p="http://schemas.openxmlformats.org/presentationml/2006/main">
+  <p:cSld>
+    <p:spTree>
+      <p:nvGrpSpPr>
+        <p:cNvPr id="1" name=""/>
+        <p:cNvGrpSpPr/>
+        <p:nvPr/>
+      </p:nvGrpSpPr>
+      <p:grpSpPr>
+        <a:xfrm>
+          <a:off x="0" y="0"/>
+          <a:ext cx="0" cy="0"/>
+          <a:chOff x="0" y="0"/>
+          <a:chExt cx="0" cy="0"/>
+        </a:xfrm>
+      </p:grpSpPr>
+      <p:sp>
+        <p:nvSpPr>
+          <p:cNvPr id="2" name="Slide Image Placeholder 1"/>
+          <p:cNvSpPr>
+            <a:spLocks noGrp="1" noRot="1" noChangeAspect="1"/>
+          </p:cNvSpPr>
+          <p:nvPr>
+            <p:ph type="sldImg"/>
+          </p:nvPr>
+        </p:nvSpPr>
+        <p:spPr/>
+      </p:sp>
+      <p:sp>
+        <p:nvSpPr>
+          <p:cNvPr id="3" name="Notes Placeholder 2"/>
+          <p:cNvSpPr>
+            <a:spLocks noGrp="1"/>
+          </p:cNvSpPr>
+          <p:nvPr>
+            <p:ph type="body" idx="1"/>
+          </p:nvPr>
+        </p:nvSpPr>
+        <p:spPr/>
+        <p:txBody>
+          <a:bodyPr/>
+          <a:lstStyle/>
+          <a:p>
+            <a:endParaRPr lang="en-US"/>
+          </a:p>
+        </p:txBody>
+      </p:sp>
+      <p:sp>
+        <p:nvSpPr>
+          <p:cNvPr id="4" name="Slide Number Placeholder 3"/>
+          <p:cNvSpPr>
+            <a:spLocks noGrp="1"/>
+          </p:cNvSpPr>
+          <p:nvPr>
+            <p:ph type="sldNum" sz="quarter" idx="5"/>
+          </p:nvPr>
+        </p:nvSpPr>
+        <p:spPr/>
+        <p:txBody>
+          <a:bodyPr/>
+          <a:lstStyle/>
+          <a:p>
+            <a:fld id="{97338A82-0D20-3D4A-B4B7-58B5112FF922}" type="slidenum">
+              <a:rPr lang="en-US" smtClean="0"/>
+              <a:t>20</a:t>
             </a:fld>
             <a:endParaRPr lang="en-US"/>
           </a:p>
@@ -2115,7 +2078,7 @@
           <a:p>
             <a:fld id="{00B59761-C2A7-844A-B0A4-477EF3BF3F07}" type="datetimeFigureOut">
               <a:rPr lang="en-US" smtClean="0"/>
-              <a:t>11/7/23</a:t>
+              <a:t>11/8/23</a:t>
             </a:fld>
             <a:endParaRPr lang="en-US"/>
           </a:p>
@@ -2315,7 +2278,7 @@
           <a:p>
             <a:fld id="{00B59761-C2A7-844A-B0A4-477EF3BF3F07}" type="datetimeFigureOut">
               <a:rPr lang="en-US" smtClean="0"/>
-              <a:t>11/7/23</a:t>
+              <a:t>11/8/23</a:t>
             </a:fld>
             <a:endParaRPr lang="en-US"/>
           </a:p>
@@ -2525,7 +2488,7 @@
           <a:p>
             <a:fld id="{00B59761-C2A7-844A-B0A4-477EF3BF3F07}" type="datetimeFigureOut">
               <a:rPr lang="en-US" smtClean="0"/>
-              <a:t>11/7/23</a:t>
+              <a:t>11/8/23</a:t>
             </a:fld>
             <a:endParaRPr lang="en-US"/>
           </a:p>
@@ -2725,7 +2688,7 @@
           <a:p>
             <a:fld id="{00B59761-C2A7-844A-B0A4-477EF3BF3F07}" type="datetimeFigureOut">
               <a:rPr lang="en-US" smtClean="0"/>
-              <a:t>11/7/23</a:t>
+              <a:t>11/8/23</a:t>
             </a:fld>
             <a:endParaRPr lang="en-US"/>
           </a:p>
@@ -3001,7 +2964,7 @@
           <a:p>
             <a:fld id="{00B59761-C2A7-844A-B0A4-477EF3BF3F07}" type="datetimeFigureOut">
               <a:rPr lang="en-US" smtClean="0"/>
-              <a:t>11/7/23</a:t>
+              <a:t>11/8/23</a:t>
             </a:fld>
             <a:endParaRPr lang="en-US"/>
           </a:p>
@@ -3269,7 +3232,7 @@
           <a:p>
             <a:fld id="{00B59761-C2A7-844A-B0A4-477EF3BF3F07}" type="datetimeFigureOut">
               <a:rPr lang="en-US" smtClean="0"/>
-              <a:t>11/7/23</a:t>
+              <a:t>11/8/23</a:t>
             </a:fld>
             <a:endParaRPr lang="en-US"/>
           </a:p>
@@ -3684,7 +3647,7 @@
           <a:p>
             <a:fld id="{00B59761-C2A7-844A-B0A4-477EF3BF3F07}" type="datetimeFigureOut">
               <a:rPr lang="en-US" smtClean="0"/>
-              <a:t>11/7/23</a:t>
+              <a:t>11/8/23</a:t>
             </a:fld>
             <a:endParaRPr lang="en-US"/>
           </a:p>
@@ -3826,7 +3789,7 @@
           <a:p>
             <a:fld id="{00B59761-C2A7-844A-B0A4-477EF3BF3F07}" type="datetimeFigureOut">
               <a:rPr lang="en-US" smtClean="0"/>
-              <a:t>11/7/23</a:t>
+              <a:t>11/8/23</a:t>
             </a:fld>
             <a:endParaRPr lang="en-US"/>
           </a:p>
@@ -3939,7 +3902,7 @@
           <a:p>
             <a:fld id="{00B59761-C2A7-844A-B0A4-477EF3BF3F07}" type="datetimeFigureOut">
               <a:rPr lang="en-US" smtClean="0"/>
-              <a:t>11/7/23</a:t>
+              <a:t>11/8/23</a:t>
             </a:fld>
             <a:endParaRPr lang="en-US"/>
           </a:p>
@@ -4252,7 +4215,7 @@
           <a:p>
             <a:fld id="{00B59761-C2A7-844A-B0A4-477EF3BF3F07}" type="datetimeFigureOut">
               <a:rPr lang="en-US" smtClean="0"/>
-              <a:t>11/7/23</a:t>
+              <a:t>11/8/23</a:t>
             </a:fld>
             <a:endParaRPr lang="en-US"/>
           </a:p>
@@ -4541,7 +4504,7 @@
           <a:p>
             <a:fld id="{00B59761-C2A7-844A-B0A4-477EF3BF3F07}" type="datetimeFigureOut">
               <a:rPr lang="en-US" smtClean="0"/>
-              <a:t>11/7/23</a:t>
+              <a:t>11/8/23</a:t>
             </a:fld>
             <a:endParaRPr lang="en-US"/>
           </a:p>
@@ -4784,7 +4747,7 @@
           <a:p>
             <a:fld id="{00B59761-C2A7-844A-B0A4-477EF3BF3F07}" type="datetimeFigureOut">
               <a:rPr lang="en-US" smtClean="0"/>
-              <a:t>11/7/23</a:t>
+              <a:t>11/8/23</a:t>
             </a:fld>
             <a:endParaRPr lang="en-US"/>
           </a:p>
@@ -7137,7 +7100,7 @@
         <p:spPr/>
         <p:txBody>
           <a:bodyPr>
-            <a:normAutofit fontScale="85000" lnSpcReduction="20000"/>
+            <a:normAutofit fontScale="77500" lnSpcReduction="20000"/>
           </a:bodyPr>
           <a:lstStyle/>
           <a:p>
@@ -7250,7 +7213,27 @@
                 <a:effectLst/>
                 <a:cs typeface="Calibri" panose="020F0502020204030204" pitchFamily="34" charset="0"/>
               </a:rPr>
-              <a:t>ZGC intends to provide stop-the-world phases as short as possible. </a:t>
+              <a:t>ZGC intends to provide stop-the-world phases as short as possible. (1 </a:t>
+            </a:r>
+            <a:r>
+              <a:rPr lang="en-GB" b="0" i="0" dirty="0" err="1">
+                <a:solidFill>
+                  <a:srgbClr val="000000"/>
+                </a:solidFill>
+                <a:effectLst/>
+                <a:cs typeface="Calibri" panose="020F0502020204030204" pitchFamily="34" charset="0"/>
+              </a:rPr>
+              <a:t>ms</a:t>
+            </a:r>
+            <a:r>
+              <a:rPr lang="en-GB" b="0" i="0" dirty="0">
+                <a:solidFill>
+                  <a:srgbClr val="000000"/>
+                </a:solidFill>
+                <a:effectLst/>
+                <a:cs typeface="Calibri" panose="020F0502020204030204" pitchFamily="34" charset="0"/>
+              </a:rPr>
+              <a:t>)</a:t>
             </a:r>
           </a:p>
           <a:p>
@@ -7384,6 +7367,38 @@
                 <a:cs typeface="Calibri" panose="020F0502020204030204" pitchFamily="34" charset="0"/>
               </a:rPr>
               <a:t>Uses a dynamic number of threads, and the max can be configured explicitly.</a:t>
+            </a:r>
+          </a:p>
+          <a:p>
+            <a:r>
+              <a:rPr lang="en-GB" dirty="0">
+                <a:solidFill>
+                  <a:srgbClr val="000000"/>
+                </a:solidFill>
+                <a:latin typeface="Calibri" panose="020F0502020204030204" pitchFamily="34" charset="0"/>
+                <a:cs typeface="Calibri" panose="020F0502020204030204" pitchFamily="34" charset="0"/>
+              </a:rPr>
+              <a:t>Uses a dynamic number of </a:t>
+            </a:r>
+            <a:r>
+              <a:rPr lang="en-GB" dirty="0" err="1">
+                <a:solidFill>
+                  <a:srgbClr val="000000"/>
+                </a:solidFill>
+                <a:latin typeface="Calibri" panose="020F0502020204030204" pitchFamily="34" charset="0"/>
+                <a:cs typeface="Calibri" panose="020F0502020204030204" pitchFamily="34" charset="0"/>
+              </a:rPr>
+              <a:t>ZPages</a:t>
+            </a:r>
+            <a:r>
+              <a:rPr lang="en-GB" dirty="0">
+                <a:solidFill>
+                  <a:srgbClr val="000000"/>
+                </a:solidFill>
+                <a:latin typeface="Calibri" panose="020F0502020204030204" pitchFamily="34" charset="0"/>
+                <a:cs typeface="Calibri" panose="020F0502020204030204" pitchFamily="34" charset="0"/>
+              </a:rPr>
+              <a:t> (memory regions of various size)</a:t>
             </a:r>
           </a:p>
           <a:p>
@@ -7473,6 +7488,297 @@
 </file>
 
 <file path=ppt/slides/slide13.xml><?xml version="1.0" encoding="utf-8"?>
+<p:sld xmlns:a="http://schemas.openxmlformats.org/drawingml/2006/main" xmlns:r="http://schemas.openxmlformats.org/officeDocument/2006/relationships" xmlns:p="http://schemas.openxmlformats.org/presentationml/2006/main">
+  <p:cSld>
+    <p:spTree>
+      <p:nvGrpSpPr>
+        <p:cNvPr id="1" name=""/>
+        <p:cNvGrpSpPr/>
+        <p:nvPr/>
+      </p:nvGrpSpPr>
+      <p:grpSpPr>
+        <a:xfrm>
+          <a:off x="0" y="0"/>
+          <a:ext cx="0" cy="0"/>
+          <a:chOff x="0" y="0"/>
+          <a:chExt cx="0" cy="0"/>
+        </a:xfrm>
+      </p:grpSpPr>
+      <p:sp>
+        <p:nvSpPr>
+          <p:cNvPr id="2" name="Title 1">
+            <a:extLst>
+              <a:ext uri="{FF2B5EF4-FFF2-40B4-BE49-F238E27FC236}">
+                <a16:creationId xmlns:a16="http://schemas.microsoft.com/office/drawing/2014/main" id="{0154882C-1B36-7E2E-9F7A-AF86CFA42D4E}"/>
+              </a:ext>
+            </a:extLst>
+          </p:cNvPr>
+          <p:cNvSpPr>
+            <a:spLocks noGrp="1"/>
+          </p:cNvSpPr>
+          <p:nvPr>
+            <p:ph type="title"/>
+          </p:nvPr>
+        </p:nvSpPr>
+        <p:spPr/>
+        <p:txBody>
+          <a:bodyPr/>
+          <a:lstStyle/>
+          <a:p>
+            <a:r>
+              <a:rPr lang="en-US" b="1" dirty="0">
+                <a:latin typeface="Calibri" panose="020F0502020204030204" pitchFamily="34" charset="0"/>
+                <a:cs typeface="Calibri" panose="020F0502020204030204" pitchFamily="34" charset="0"/>
+              </a:rPr>
+              <a:t>ZGC</a:t>
+            </a:r>
+          </a:p>
+        </p:txBody>
+      </p:sp>
+      <p:pic>
+        <p:nvPicPr>
+          <p:cNvPr id="5" name="Content Placeholder 4" descr="Diagram of a diagram of a generation&#10;&#10;Description automatically generated with medium confidence">
+            <a:extLst>
+              <a:ext uri="{FF2B5EF4-FFF2-40B4-BE49-F238E27FC236}">
+                <a16:creationId xmlns:a16="http://schemas.microsoft.com/office/drawing/2014/main" id="{E3428E1F-3235-4B37-6E82-C9664B800651}"/>
+              </a:ext>
+            </a:extLst>
+          </p:cNvPr>
+          <p:cNvPicPr>
+            <a:picLocks noGrp="1" noChangeAspect="1"/>
+          </p:cNvPicPr>
+          <p:nvPr>
+            <p:ph idx="1"/>
+          </p:nvPr>
+        </p:nvPicPr>
+        <p:blipFill>
+          <a:blip r:embed="rId3"/>
+          <a:stretch>
+            <a:fillRect/>
+          </a:stretch>
+        </p:blipFill>
+        <p:spPr>
+          <a:xfrm>
+            <a:off x="5317435" y="624419"/>
+            <a:ext cx="6223183" cy="2312111"/>
+          </a:xfrm>
+        </p:spPr>
+      </p:pic>
+      <p:pic>
+        <p:nvPicPr>
+          <p:cNvPr id="7" name="Picture 6" descr="A close-up of a crossword puzzle&#10;&#10;Description automatically generated">
+            <a:extLst>
+              <a:ext uri="{FF2B5EF4-FFF2-40B4-BE49-F238E27FC236}">
+                <a16:creationId xmlns:a16="http://schemas.microsoft.com/office/drawing/2014/main" id="{18780FF6-5A82-986F-D1A7-0E98780EA94B}"/>
+              </a:ext>
+            </a:extLst>
+          </p:cNvPr>
+          <p:cNvPicPr>
+            <a:picLocks noChangeAspect="1"/>
+          </p:cNvPicPr>
+          <p:nvPr/>
+        </p:nvPicPr>
+        <p:blipFill>
+          <a:blip r:embed="rId4"/>
+          <a:stretch>
+            <a:fillRect/>
+          </a:stretch>
+        </p:blipFill>
+        <p:spPr>
+          <a:xfrm>
+            <a:off x="366378" y="2936530"/>
+            <a:ext cx="5729622" cy="3404152"/>
+          </a:xfrm>
+          <a:prstGeom prst="rect">
+            <a:avLst/>
+          </a:prstGeom>
+        </p:spPr>
+      </p:pic>
+      <p:pic>
+        <p:nvPicPr>
+          <p:cNvPr id="9" name="Picture 8" descr="A screenshot of a game&#10;&#10;Description automatically generated">
+            <a:extLst>
+              <a:ext uri="{FF2B5EF4-FFF2-40B4-BE49-F238E27FC236}">
+                <a16:creationId xmlns:a16="http://schemas.microsoft.com/office/drawing/2014/main" id="{4BCFF7AB-D9B1-1821-DE40-06AD8BD14C59}"/>
+              </a:ext>
+            </a:extLst>
+          </p:cNvPr>
+          <p:cNvPicPr>
+            <a:picLocks noChangeAspect="1"/>
+          </p:cNvPicPr>
+          <p:nvPr/>
+        </p:nvPicPr>
+        <p:blipFill>
+          <a:blip r:embed="rId5"/>
+          <a:stretch>
+            <a:fillRect/>
+          </a:stretch>
+        </p:blipFill>
+        <p:spPr>
+          <a:xfrm>
+            <a:off x="6508013" y="3022199"/>
+            <a:ext cx="5339430" cy="3378343"/>
+          </a:xfrm>
+          <a:prstGeom prst="rect">
+            <a:avLst/>
+          </a:prstGeom>
+        </p:spPr>
+      </p:pic>
+      <p:sp>
+        <p:nvSpPr>
+          <p:cNvPr id="10" name="TextBox 9">
+            <a:extLst>
+              <a:ext uri="{FF2B5EF4-FFF2-40B4-BE49-F238E27FC236}">
+                <a16:creationId xmlns:a16="http://schemas.microsoft.com/office/drawing/2014/main" id="{67243E09-B82A-3137-3563-86032DB768B2}"/>
+              </a:ext>
+            </a:extLst>
+          </p:cNvPr>
+          <p:cNvSpPr txBox="1"/>
+          <p:nvPr/>
+        </p:nvSpPr>
+        <p:spPr>
+          <a:xfrm>
+            <a:off x="7581531" y="612734"/>
+            <a:ext cx="4265912" cy="646331"/>
+          </a:xfrm>
+          <a:prstGeom prst="rect">
+            <a:avLst/>
+          </a:prstGeom>
+          <a:noFill/>
+        </p:spPr>
+        <p:txBody>
+          <a:bodyPr wrap="square" rtlCol="0">
+            <a:spAutoFit/>
+          </a:bodyPr>
+          <a:lstStyle/>
+          <a:p>
+            <a:r>
+              <a:rPr lang="en-GB" dirty="0">
+                <a:solidFill>
+                  <a:srgbClr val="0033B3"/>
+                </a:solidFill>
+                <a:effectLst/>
+              </a:rPr>
+              <a:t>Old style GC heap allocation (before Java 8)</a:t>
+            </a:r>
+            <a:endParaRPr lang="en-GB" dirty="0">
+              <a:solidFill>
+                <a:srgbClr val="080808"/>
+              </a:solidFill>
+              <a:effectLst/>
+            </a:endParaRPr>
+          </a:p>
+          <a:p>
+            <a:endParaRPr lang="en-US" dirty="0"/>
+          </a:p>
+        </p:txBody>
+      </p:sp>
+      <p:sp>
+        <p:nvSpPr>
+          <p:cNvPr id="11" name="TextBox 10">
+            <a:extLst>
+              <a:ext uri="{FF2B5EF4-FFF2-40B4-BE49-F238E27FC236}">
+                <a16:creationId xmlns:a16="http://schemas.microsoft.com/office/drawing/2014/main" id="{391396A4-4FCF-BC3E-56E4-FF6E86679C59}"/>
+              </a:ext>
+            </a:extLst>
+          </p:cNvPr>
+          <p:cNvSpPr txBox="1"/>
+          <p:nvPr/>
+        </p:nvSpPr>
+        <p:spPr>
+          <a:xfrm>
+            <a:off x="591009" y="6169709"/>
+            <a:ext cx="4265912" cy="369332"/>
+          </a:xfrm>
+          <a:prstGeom prst="rect">
+            <a:avLst/>
+          </a:prstGeom>
+          <a:noFill/>
+        </p:spPr>
+        <p:txBody>
+          <a:bodyPr wrap="square" rtlCol="0">
+            <a:spAutoFit/>
+          </a:bodyPr>
+          <a:lstStyle/>
+          <a:p>
+            <a:r>
+              <a:rPr lang="en-GB" dirty="0">
+                <a:solidFill>
+                  <a:srgbClr val="0033B3"/>
+                </a:solidFill>
+                <a:effectLst/>
+              </a:rPr>
+              <a:t>G1GC heap allocation (starting with Java 8)</a:t>
+            </a:r>
+            <a:endParaRPr lang="en-GB" dirty="0">
+              <a:solidFill>
+                <a:srgbClr val="080808"/>
+              </a:solidFill>
+              <a:effectLst/>
+            </a:endParaRPr>
+          </a:p>
+        </p:txBody>
+      </p:sp>
+      <p:sp>
+        <p:nvSpPr>
+          <p:cNvPr id="12" name="TextBox 11">
+            <a:extLst>
+              <a:ext uri="{FF2B5EF4-FFF2-40B4-BE49-F238E27FC236}">
+                <a16:creationId xmlns:a16="http://schemas.microsoft.com/office/drawing/2014/main" id="{5086CE6C-F116-C7D0-BAD3-B7DBB12553E8}"/>
+              </a:ext>
+            </a:extLst>
+          </p:cNvPr>
+          <p:cNvSpPr txBox="1"/>
+          <p:nvPr/>
+        </p:nvSpPr>
+        <p:spPr>
+          <a:xfrm>
+            <a:off x="7044772" y="6406440"/>
+            <a:ext cx="4265912" cy="369332"/>
+          </a:xfrm>
+          <a:prstGeom prst="rect">
+            <a:avLst/>
+          </a:prstGeom>
+          <a:noFill/>
+        </p:spPr>
+        <p:txBody>
+          <a:bodyPr wrap="square" rtlCol="0">
+            <a:spAutoFit/>
+          </a:bodyPr>
+          <a:lstStyle/>
+          <a:p>
+            <a:r>
+              <a:rPr lang="en-GB" dirty="0">
+                <a:solidFill>
+                  <a:srgbClr val="0033B3"/>
+                </a:solidFill>
+                <a:effectLst/>
+              </a:rPr>
+              <a:t>ZGC heap allocation (starting with Java 11)</a:t>
+            </a:r>
+            <a:endParaRPr lang="en-GB" dirty="0">
+              <a:solidFill>
+                <a:srgbClr val="080808"/>
+              </a:solidFill>
+              <a:effectLst/>
+            </a:endParaRPr>
+          </a:p>
+        </p:txBody>
+      </p:sp>
+    </p:spTree>
+    <p:extLst>
+      <p:ext uri="{BB962C8B-B14F-4D97-AF65-F5344CB8AC3E}">
+        <p14:creationId xmlns:p14="http://schemas.microsoft.com/office/powerpoint/2010/main" val="3576318688"/>
+      </p:ext>
+    </p:extLst>
+  </p:cSld>
+  <p:clrMapOvr>
+    <a:masterClrMapping/>
+  </p:clrMapOvr>
+</p:sld>
+</file>
+
+<file path=ppt/slides/slide14.xml><?xml version="1.0" encoding="utf-8"?>
 <p:sld xmlns:a="http://schemas.openxmlformats.org/drawingml/2006/main" xmlns:r="http://schemas.openxmlformats.org/officeDocument/2006/relationships" xmlns:p="http://schemas.openxmlformats.org/presentationml/2006/main">
   <p:cSld>
     <p:bg>
@@ -8217,7 +8523,7 @@
 </p:sld>
 </file>
 
-<file path=ppt/slides/slide14.xml><?xml version="1.0" encoding="utf-8"?>
+<file path=ppt/slides/slide15.xml><?xml version="1.0" encoding="utf-8"?>
 <p:sld xmlns:a="http://schemas.openxmlformats.org/drawingml/2006/main" xmlns:r="http://schemas.openxmlformats.org/officeDocument/2006/relationships" xmlns:p="http://schemas.openxmlformats.org/presentationml/2006/main">
   <p:cSld>
     <p:spTree>
@@ -8307,7 +8613,7 @@
 </p:sld>
 </file>
 
-<file path=ppt/slides/slide15.xml><?xml version="1.0" encoding="utf-8"?>
+<file path=ppt/slides/slide16.xml><?xml version="1.0" encoding="utf-8"?>
 <p:sld xmlns:a="http://schemas.openxmlformats.org/drawingml/2006/main" xmlns:r="http://schemas.openxmlformats.org/officeDocument/2006/relationships" xmlns:p="http://schemas.openxmlformats.org/presentationml/2006/main">
   <p:cSld>
     <p:bg>
@@ -12038,7 +12344,7 @@
 </p:sld>
 </file>
 
-<file path=ppt/slides/slide16.xml><?xml version="1.0" encoding="utf-8"?>
+<file path=ppt/slides/slide17.xml><?xml version="1.0" encoding="utf-8"?>
 <p:sld xmlns:a="http://schemas.openxmlformats.org/drawingml/2006/main" xmlns:r="http://schemas.openxmlformats.org/officeDocument/2006/relationships" xmlns:p="http://schemas.openxmlformats.org/presentationml/2006/main">
   <p:cSld>
     <p:bg>
@@ -12894,7 +13200,7 @@
 </p:sld>
 </file>
 
-<file path=ppt/slides/slide17.xml><?xml version="1.0" encoding="utf-8"?>
+<file path=ppt/slides/slide18.xml><?xml version="1.0" encoding="utf-8"?>
 <p:sld xmlns:a="http://schemas.openxmlformats.org/drawingml/2006/main" xmlns:r="http://schemas.openxmlformats.org/officeDocument/2006/relationships" xmlns:p="http://schemas.openxmlformats.org/presentationml/2006/main">
   <p:cSld>
     <p:bg>
@@ -14162,7 +14468,7 @@
 </p:sld>
 </file>
 
-<file path=ppt/slides/slide18.xml><?xml version="1.0" encoding="utf-8"?>
+<file path=ppt/slides/slide19.xml><?xml version="1.0" encoding="utf-8"?>
 <p:sld xmlns:a="http://schemas.openxmlformats.org/drawingml/2006/main" xmlns:r="http://schemas.openxmlformats.org/officeDocument/2006/relationships" xmlns:p="http://schemas.openxmlformats.org/presentationml/2006/main">
   <p:cSld>
     <p:bg>
@@ -14599,7 +14905,1364 @@
 </p:sld>
 </file>
 
-<file path=ppt/slides/slide19.xml><?xml version="1.0" encoding="utf-8"?>
+<file path=ppt/slides/slide2.xml><?xml version="1.0" encoding="utf-8"?>
+<p:sld xmlns:a="http://schemas.openxmlformats.org/drawingml/2006/main" xmlns:r="http://schemas.openxmlformats.org/officeDocument/2006/relationships" xmlns:p="http://schemas.openxmlformats.org/presentationml/2006/main">
+  <p:cSld>
+    <p:bg>
+      <p:bgPr>
+        <a:solidFill>
+          <a:schemeClr val="bg1"/>
+        </a:solidFill>
+        <a:effectLst/>
+      </p:bgPr>
+    </p:bg>
+    <p:spTree>
+      <p:nvGrpSpPr>
+        <p:cNvPr id="1" name=""/>
+        <p:cNvGrpSpPr/>
+        <p:nvPr/>
+      </p:nvGrpSpPr>
+      <p:grpSpPr>
+        <a:xfrm>
+          <a:off x="0" y="0"/>
+          <a:ext cx="0" cy="0"/>
+          <a:chOff x="0" y="0"/>
+          <a:chExt cx="0" cy="0"/>
+        </a:xfrm>
+      </p:grpSpPr>
+      <p:sp useBgFill="1">
+        <p:nvSpPr>
+          <p:cNvPr id="8" name="Rectangle 7">
+            <a:extLst>
+              <a:ext uri="{FF2B5EF4-FFF2-40B4-BE49-F238E27FC236}">
+                <a16:creationId xmlns:a16="http://schemas.microsoft.com/office/drawing/2014/main" id="{B20EED73-1494-4E89-869B-E501A02B2408}"/>
+              </a:ext>
+              <a:ext uri="{C183D7F6-B498-43B3-948B-1728B52AA6E4}">
+                <adec:decorative xmlns:adec="http://schemas.microsoft.com/office/drawing/2017/decorative" val="1"/>
+              </a:ext>
+            </a:extLst>
+          </p:cNvPr>
+          <p:cNvSpPr>
+            <a:spLocks noGrp="1" noRot="1" noChangeAspect="1" noMove="1" noResize="1" noEditPoints="1" noAdjustHandles="1" noChangeArrowheads="1" noChangeShapeType="1" noTextEdit="1"/>
+          </p:cNvSpPr>
+          <p:nvPr>
+            <p:extLst>
+              <p:ext uri="{386F3935-93C4-4BCD-93E2-E3B085C9AB24}">
+                <p16:designElem xmlns:p16="http://schemas.microsoft.com/office/powerpoint/2015/main" val="1"/>
+              </p:ext>
+            </p:extLst>
+          </p:nvPr>
+        </p:nvSpPr>
+        <p:spPr>
+          <a:xfrm>
+            <a:off x="0" y="0"/>
+            <a:ext cx="12188952" cy="6858000"/>
+          </a:xfrm>
+          <a:prstGeom prst="rect">
+            <a:avLst/>
+          </a:prstGeom>
+          <a:ln>
+            <a:noFill/>
+          </a:ln>
+        </p:spPr>
+        <p:style>
+          <a:lnRef idx="2">
+            <a:schemeClr val="accent1">
+              <a:shade val="50000"/>
+            </a:schemeClr>
+          </a:lnRef>
+          <a:fillRef idx="1">
+            <a:schemeClr val="accent1"/>
+          </a:fillRef>
+          <a:effectRef idx="0">
+            <a:schemeClr val="accent1"/>
+          </a:effectRef>
+          <a:fontRef idx="minor">
+            <a:schemeClr val="lt1"/>
+          </a:fontRef>
+        </p:style>
+        <p:txBody>
+          <a:bodyPr rtlCol="0" anchor="ctr"/>
+          <a:lstStyle/>
+          <a:p>
+            <a:pPr algn="ctr"/>
+            <a:endParaRPr lang="en-US"/>
+          </a:p>
+        </p:txBody>
+      </p:sp>
+      <p:sp>
+        <p:nvSpPr>
+          <p:cNvPr id="10" name="Freeform: Shape 9">
+            <a:extLst>
+              <a:ext uri="{FF2B5EF4-FFF2-40B4-BE49-F238E27FC236}">
+                <a16:creationId xmlns:a16="http://schemas.microsoft.com/office/drawing/2014/main" id="{E9D7A3A2-205A-4FD7-89D2-24FA8A54EA12}"/>
+              </a:ext>
+              <a:ext uri="{C183D7F6-B498-43B3-948B-1728B52AA6E4}">
+                <adec:decorative xmlns:adec="http://schemas.microsoft.com/office/drawing/2017/decorative" val="1"/>
+              </a:ext>
+            </a:extLst>
+          </p:cNvPr>
+          <p:cNvSpPr>
+            <a:spLocks noGrp="1" noRot="1" noChangeAspect="1" noMove="1" noResize="1" noEditPoints="1" noAdjustHandles="1" noChangeArrowheads="1" noChangeShapeType="1" noTextEdit="1"/>
+          </p:cNvSpPr>
+          <p:nvPr>
+            <p:extLst>
+              <p:ext uri="{386F3935-93C4-4BCD-93E2-E3B085C9AB24}">
+                <p16:designElem xmlns:p16="http://schemas.microsoft.com/office/powerpoint/2015/main" val="1"/>
+              </p:ext>
+            </p:extLst>
+          </p:nvPr>
+        </p:nvSpPr>
+        <p:spPr>
+          <a:xfrm>
+            <a:off x="814934" y="0"/>
+            <a:ext cx="11377066" cy="4001047"/>
+          </a:xfrm>
+          <a:custGeom>
+            <a:avLst/>
+            <a:gdLst>
+              <a:gd name="connsiteX0" fmla="*/ 914840 w 11377066"/>
+              <a:gd name="connsiteY0" fmla="*/ 0 h 3343806"/>
+              <a:gd name="connsiteX1" fmla="*/ 11365513 w 11377066"/>
+              <a:gd name="connsiteY1" fmla="*/ 0 h 3343806"/>
+              <a:gd name="connsiteX2" fmla="*/ 11365513 w 11377066"/>
+              <a:gd name="connsiteY2" fmla="*/ 846735 h 3343806"/>
+              <a:gd name="connsiteX3" fmla="*/ 11050704 w 11377066"/>
+              <a:gd name="connsiteY3" fmla="*/ 1046017 h 3343806"/>
+              <a:gd name="connsiteX4" fmla="*/ 11195112 w 11377066"/>
+              <a:gd name="connsiteY4" fmla="*/ 1103780 h 3343806"/>
+              <a:gd name="connsiteX5" fmla="*/ 10553944 w 11377066"/>
+              <a:gd name="connsiteY5" fmla="*/ 1441695 h 3343806"/>
+              <a:gd name="connsiteX6" fmla="*/ 11148902 w 11377066"/>
+              <a:gd name="connsiteY6" fmla="*/ 1383932 h 3343806"/>
+              <a:gd name="connsiteX7" fmla="*/ 11117132 w 11377066"/>
+              <a:gd name="connsiteY7" fmla="*/ 1430142 h 3343806"/>
+              <a:gd name="connsiteX8" fmla="*/ 11085363 w 11377066"/>
+              <a:gd name="connsiteY8" fmla="*/ 1476352 h 3343806"/>
+              <a:gd name="connsiteX9" fmla="*/ 11365513 w 11377066"/>
+              <a:gd name="connsiteY9" fmla="*/ 1447471 h 3343806"/>
+              <a:gd name="connsiteX10" fmla="*/ 11365513 w 11377066"/>
+              <a:gd name="connsiteY10" fmla="*/ 1496569 h 3343806"/>
+              <a:gd name="connsiteX11" fmla="*/ 11278869 w 11377066"/>
+              <a:gd name="connsiteY11" fmla="*/ 1554332 h 3343806"/>
+              <a:gd name="connsiteX12" fmla="*/ 11365513 w 11377066"/>
+              <a:gd name="connsiteY12" fmla="*/ 1539891 h 3343806"/>
+              <a:gd name="connsiteX13" fmla="*/ 11377066 w 11377066"/>
+              <a:gd name="connsiteY13" fmla="*/ 1539891 h 3343806"/>
+              <a:gd name="connsiteX14" fmla="*/ 11377066 w 11377066"/>
+              <a:gd name="connsiteY14" fmla="*/ 1765167 h 3343806"/>
+              <a:gd name="connsiteX15" fmla="*/ 4624577 w 11377066"/>
+              <a:gd name="connsiteY15" fmla="*/ 3342096 h 3343806"/>
+              <a:gd name="connsiteX16" fmla="*/ 4000738 w 11377066"/>
+              <a:gd name="connsiteY16" fmla="*/ 3313214 h 3343806"/>
+              <a:gd name="connsiteX17" fmla="*/ 3853443 w 11377066"/>
+              <a:gd name="connsiteY17" fmla="*/ 3217905 h 3343806"/>
+              <a:gd name="connsiteX18" fmla="*/ 4003625 w 11377066"/>
+              <a:gd name="connsiteY18" fmla="*/ 3171695 h 3343806"/>
+              <a:gd name="connsiteX19" fmla="*/ 4465729 w 11377066"/>
+              <a:gd name="connsiteY19" fmla="*/ 3024399 h 3343806"/>
+              <a:gd name="connsiteX20" fmla="*/ 4015179 w 11377066"/>
+              <a:gd name="connsiteY20" fmla="*/ 3047505 h 3343806"/>
+              <a:gd name="connsiteX21" fmla="*/ 4656346 w 11377066"/>
+              <a:gd name="connsiteY21" fmla="*/ 2926202 h 3343806"/>
+              <a:gd name="connsiteX22" fmla="*/ 4841188 w 11377066"/>
+              <a:gd name="connsiteY22" fmla="*/ 2862663 h 3343806"/>
+              <a:gd name="connsiteX23" fmla="*/ 4659236 w 11377066"/>
+              <a:gd name="connsiteY23" fmla="*/ 2836670 h 3343806"/>
+              <a:gd name="connsiteX24" fmla="*/ 3778351 w 11377066"/>
+              <a:gd name="connsiteY24" fmla="*/ 2914650 h 3343806"/>
+              <a:gd name="connsiteX25" fmla="*/ 3694595 w 11377066"/>
+              <a:gd name="connsiteY25" fmla="*/ 2923314 h 3343806"/>
+              <a:gd name="connsiteX26" fmla="*/ 3119852 w 11377066"/>
+              <a:gd name="connsiteY26" fmla="*/ 2862663 h 3343806"/>
+              <a:gd name="connsiteX27" fmla="*/ 3440437 w 11377066"/>
+              <a:gd name="connsiteY27" fmla="*/ 2799124 h 3343806"/>
+              <a:gd name="connsiteX28" fmla="*/ 3070753 w 11377066"/>
+              <a:gd name="connsiteY28" fmla="*/ 2761578 h 3343806"/>
+              <a:gd name="connsiteX29" fmla="*/ 2623091 w 11377066"/>
+              <a:gd name="connsiteY29" fmla="*/ 2726920 h 3343806"/>
+              <a:gd name="connsiteX30" fmla="*/ 2160987 w 11377066"/>
+              <a:gd name="connsiteY30" fmla="*/ 2611394 h 3343806"/>
+              <a:gd name="connsiteX31" fmla="*/ 1837515 w 11377066"/>
+              <a:gd name="connsiteY31" fmla="*/ 2573848 h 3343806"/>
+              <a:gd name="connsiteX32" fmla="*/ 1869284 w 11377066"/>
+              <a:gd name="connsiteY32" fmla="*/ 2472763 h 3343806"/>
+              <a:gd name="connsiteX33" fmla="*/ 1808633 w 11377066"/>
+              <a:gd name="connsiteY33" fmla="*/ 2386119 h 3343806"/>
+              <a:gd name="connsiteX34" fmla="*/ 2354493 w 11377066"/>
+              <a:gd name="connsiteY34" fmla="*/ 2342797 h 3343806"/>
+              <a:gd name="connsiteX35" fmla="*/ 2146546 w 11377066"/>
+              <a:gd name="connsiteY35" fmla="*/ 2328356 h 3343806"/>
+              <a:gd name="connsiteX36" fmla="*/ 2054126 w 11377066"/>
+              <a:gd name="connsiteY36" fmla="*/ 2285034 h 3343806"/>
+              <a:gd name="connsiteX37" fmla="*/ 2132106 w 11377066"/>
+              <a:gd name="connsiteY37" fmla="*/ 2238823 h 3343806"/>
+              <a:gd name="connsiteX38" fmla="*/ 2478684 w 11377066"/>
+              <a:gd name="connsiteY38" fmla="*/ 2085751 h 3343806"/>
+              <a:gd name="connsiteX39" fmla="*/ 1511154 w 11377066"/>
+              <a:gd name="connsiteY39" fmla="*/ 2094416 h 3343806"/>
+              <a:gd name="connsiteX40" fmla="*/ 1638232 w 11377066"/>
+              <a:gd name="connsiteY40" fmla="*/ 2042429 h 3343806"/>
+              <a:gd name="connsiteX41" fmla="*/ 2972556 w 11377066"/>
+              <a:gd name="connsiteY41" fmla="*/ 1718957 h 3343806"/>
+              <a:gd name="connsiteX42" fmla="*/ 3238266 w 11377066"/>
+              <a:gd name="connsiteY42" fmla="*/ 1678523 h 3343806"/>
+              <a:gd name="connsiteX43" fmla="*/ 2522005 w 11377066"/>
+              <a:gd name="connsiteY43" fmla="*/ 1664082 h 3343806"/>
+              <a:gd name="connsiteX44" fmla="*/ 1421621 w 11377066"/>
+              <a:gd name="connsiteY44" fmla="*/ 1522563 h 3343806"/>
+              <a:gd name="connsiteX45" fmla="*/ 1525595 w 11377066"/>
+              <a:gd name="connsiteY45" fmla="*/ 1392596 h 3343806"/>
+              <a:gd name="connsiteX46" fmla="*/ 982623 w 11377066"/>
+              <a:gd name="connsiteY46" fmla="*/ 1415701 h 3343806"/>
+              <a:gd name="connsiteX47" fmla="*/ 1231003 w 11377066"/>
+              <a:gd name="connsiteY47" fmla="*/ 1314616 h 3343806"/>
+              <a:gd name="connsiteX48" fmla="*/ 1025945 w 11377066"/>
+              <a:gd name="connsiteY48" fmla="*/ 1297287 h 3343806"/>
+              <a:gd name="connsiteX49" fmla="*/ 841104 w 11377066"/>
+              <a:gd name="connsiteY49" fmla="*/ 1225083 h 3343806"/>
+              <a:gd name="connsiteX50" fmla="*/ 1612239 w 11377066"/>
+              <a:gd name="connsiteY50" fmla="*/ 1112445 h 3343806"/>
+              <a:gd name="connsiteX51" fmla="*/ 1814409 w 11377066"/>
+              <a:gd name="connsiteY51" fmla="*/ 1008471 h 3343806"/>
+              <a:gd name="connsiteX52" fmla="*/ 1932824 w 11377066"/>
+              <a:gd name="connsiteY52" fmla="*/ 979590 h 3343806"/>
+              <a:gd name="connsiteX53" fmla="*/ 2083007 w 11377066"/>
+              <a:gd name="connsiteY53" fmla="*/ 936268 h 3343806"/>
+              <a:gd name="connsiteX54" fmla="*/ 1947265 w 11377066"/>
+              <a:gd name="connsiteY54" fmla="*/ 924715 h 3343806"/>
+              <a:gd name="connsiteX55" fmla="*/ 1271438 w 11377066"/>
+              <a:gd name="connsiteY55" fmla="*/ 895834 h 3343806"/>
+              <a:gd name="connsiteX56" fmla="*/ 659150 w 11377066"/>
+              <a:gd name="connsiteY56" fmla="*/ 907386 h 3343806"/>
+              <a:gd name="connsiteX57" fmla="*/ 780453 w 11377066"/>
+              <a:gd name="connsiteY57" fmla="*/ 846735 h 3343806"/>
+              <a:gd name="connsiteX58" fmla="*/ 841104 w 11377066"/>
+              <a:gd name="connsiteY58" fmla="*/ 788972 h 3343806"/>
+              <a:gd name="connsiteX59" fmla="*/ 448316 w 11377066"/>
+              <a:gd name="connsiteY59" fmla="*/ 659006 h 3343806"/>
+              <a:gd name="connsiteX60" fmla="*/ 910419 w 11377066"/>
+              <a:gd name="connsiteY60" fmla="*/ 569473 h 3343806"/>
+              <a:gd name="connsiteX61" fmla="*/ 604275 w 11377066"/>
+              <a:gd name="connsiteY61" fmla="*/ 514598 h 3343806"/>
+              <a:gd name="connsiteX62" fmla="*/ 15093 w 11377066"/>
+              <a:gd name="connsiteY62" fmla="*/ 352862 h 3343806"/>
+              <a:gd name="connsiteX63" fmla="*/ 430987 w 11377066"/>
+              <a:gd name="connsiteY63" fmla="*/ 136251 h 3343806"/>
+              <a:gd name="connsiteX64" fmla="*/ 874092 w 11377066"/>
+              <a:gd name="connsiteY64" fmla="*/ 17656 h 3343806"/>
+            </a:gdLst>
+            <a:ahLst/>
+            <a:cxnLst>
+              <a:cxn ang="0">
+                <a:pos x="connsiteX0" y="connsiteY0"/>
+              </a:cxn>
+              <a:cxn ang="0">
+                <a:pos x="connsiteX1" y="connsiteY1"/>
+              </a:cxn>
+              <a:cxn ang="0">
+                <a:pos x="connsiteX2" y="connsiteY2"/>
+              </a:cxn>
+              <a:cxn ang="0">
+                <a:pos x="connsiteX3" y="connsiteY3"/>
+              </a:cxn>
+              <a:cxn ang="0">
+                <a:pos x="connsiteX4" y="connsiteY4"/>
+              </a:cxn>
+              <a:cxn ang="0">
+                <a:pos x="connsiteX5" y="connsiteY5"/>
+              </a:cxn>
+              <a:cxn ang="0">
+                <a:pos x="connsiteX6" y="connsiteY6"/>
+              </a:cxn>
+              <a:cxn ang="0">
+                <a:pos x="connsiteX7" y="connsiteY7"/>
+              </a:cxn>
+              <a:cxn ang="0">
+                <a:pos x="connsiteX8" y="connsiteY8"/>
+              </a:cxn>
+              <a:cxn ang="0">
+                <a:pos x="connsiteX9" y="connsiteY9"/>
+              </a:cxn>
+              <a:cxn ang="0">
+                <a:pos x="connsiteX10" y="connsiteY10"/>
+              </a:cxn>
+              <a:cxn ang="0">
+                <a:pos x="connsiteX11" y="connsiteY11"/>
+              </a:cxn>
+              <a:cxn ang="0">
+                <a:pos x="connsiteX12" y="connsiteY12"/>
+              </a:cxn>
+              <a:cxn ang="0">
+                <a:pos x="connsiteX13" y="connsiteY13"/>
+              </a:cxn>
+              <a:cxn ang="0">
+                <a:pos x="connsiteX14" y="connsiteY14"/>
+              </a:cxn>
+              <a:cxn ang="0">
+                <a:pos x="connsiteX15" y="connsiteY15"/>
+              </a:cxn>
+              <a:cxn ang="0">
+                <a:pos x="connsiteX16" y="connsiteY16"/>
+              </a:cxn>
+              <a:cxn ang="0">
+                <a:pos x="connsiteX17" y="connsiteY17"/>
+              </a:cxn>
+              <a:cxn ang="0">
+                <a:pos x="connsiteX18" y="connsiteY18"/>
+              </a:cxn>
+              <a:cxn ang="0">
+                <a:pos x="connsiteX19" y="connsiteY19"/>
+              </a:cxn>
+              <a:cxn ang="0">
+                <a:pos x="connsiteX20" y="connsiteY20"/>
+              </a:cxn>
+              <a:cxn ang="0">
+                <a:pos x="connsiteX21" y="connsiteY21"/>
+              </a:cxn>
+              <a:cxn ang="0">
+                <a:pos x="connsiteX22" y="connsiteY22"/>
+              </a:cxn>
+              <a:cxn ang="0">
+                <a:pos x="connsiteX23" y="connsiteY23"/>
+              </a:cxn>
+              <a:cxn ang="0">
+                <a:pos x="connsiteX24" y="connsiteY24"/>
+              </a:cxn>
+              <a:cxn ang="0">
+                <a:pos x="connsiteX25" y="connsiteY25"/>
+              </a:cxn>
+              <a:cxn ang="0">
+                <a:pos x="connsiteX26" y="connsiteY26"/>
+              </a:cxn>
+              <a:cxn ang="0">
+                <a:pos x="connsiteX27" y="connsiteY27"/>
+              </a:cxn>
+              <a:cxn ang="0">
+                <a:pos x="connsiteX28" y="connsiteY28"/>
+              </a:cxn>
+              <a:cxn ang="0">
+                <a:pos x="connsiteX29" y="connsiteY29"/>
+              </a:cxn>
+              <a:cxn ang="0">
+                <a:pos x="connsiteX30" y="connsiteY30"/>
+              </a:cxn>
+              <a:cxn ang="0">
+                <a:pos x="connsiteX31" y="connsiteY31"/>
+              </a:cxn>
+              <a:cxn ang="0">
+                <a:pos x="connsiteX32" y="connsiteY32"/>
+              </a:cxn>
+              <a:cxn ang="0">
+                <a:pos x="connsiteX33" y="connsiteY33"/>
+              </a:cxn>
+              <a:cxn ang="0">
+                <a:pos x="connsiteX34" y="connsiteY34"/>
+              </a:cxn>
+              <a:cxn ang="0">
+                <a:pos x="connsiteX35" y="connsiteY35"/>
+              </a:cxn>
+              <a:cxn ang="0">
+                <a:pos x="connsiteX36" y="connsiteY36"/>
+              </a:cxn>
+              <a:cxn ang="0">
+                <a:pos x="connsiteX37" y="connsiteY37"/>
+              </a:cxn>
+              <a:cxn ang="0">
+                <a:pos x="connsiteX38" y="connsiteY38"/>
+              </a:cxn>
+              <a:cxn ang="0">
+                <a:pos x="connsiteX39" y="connsiteY39"/>
+              </a:cxn>
+              <a:cxn ang="0">
+                <a:pos x="connsiteX40" y="connsiteY40"/>
+              </a:cxn>
+              <a:cxn ang="0">
+                <a:pos x="connsiteX41" y="connsiteY41"/>
+              </a:cxn>
+              <a:cxn ang="0">
+                <a:pos x="connsiteX42" y="connsiteY42"/>
+              </a:cxn>
+              <a:cxn ang="0">
+                <a:pos x="connsiteX43" y="connsiteY43"/>
+              </a:cxn>
+              <a:cxn ang="0">
+                <a:pos x="connsiteX44" y="connsiteY44"/>
+              </a:cxn>
+              <a:cxn ang="0">
+                <a:pos x="connsiteX45" y="connsiteY45"/>
+              </a:cxn>
+              <a:cxn ang="0">
+                <a:pos x="connsiteX46" y="connsiteY46"/>
+              </a:cxn>
+              <a:cxn ang="0">
+                <a:pos x="connsiteX47" y="connsiteY47"/>
+              </a:cxn>
+              <a:cxn ang="0">
+                <a:pos x="connsiteX48" y="connsiteY48"/>
+              </a:cxn>
+              <a:cxn ang="0">
+                <a:pos x="connsiteX49" y="connsiteY49"/>
+              </a:cxn>
+              <a:cxn ang="0">
+                <a:pos x="connsiteX50" y="connsiteY50"/>
+              </a:cxn>
+              <a:cxn ang="0">
+                <a:pos x="connsiteX51" y="connsiteY51"/>
+              </a:cxn>
+              <a:cxn ang="0">
+                <a:pos x="connsiteX52" y="connsiteY52"/>
+              </a:cxn>
+              <a:cxn ang="0">
+                <a:pos x="connsiteX53" y="connsiteY53"/>
+              </a:cxn>
+              <a:cxn ang="0">
+                <a:pos x="connsiteX54" y="connsiteY54"/>
+              </a:cxn>
+              <a:cxn ang="0">
+                <a:pos x="connsiteX55" y="connsiteY55"/>
+              </a:cxn>
+              <a:cxn ang="0">
+                <a:pos x="connsiteX56" y="connsiteY56"/>
+              </a:cxn>
+              <a:cxn ang="0">
+                <a:pos x="connsiteX57" y="connsiteY57"/>
+              </a:cxn>
+              <a:cxn ang="0">
+                <a:pos x="connsiteX58" y="connsiteY58"/>
+              </a:cxn>
+              <a:cxn ang="0">
+                <a:pos x="connsiteX59" y="connsiteY59"/>
+              </a:cxn>
+              <a:cxn ang="0">
+                <a:pos x="connsiteX60" y="connsiteY60"/>
+              </a:cxn>
+              <a:cxn ang="0">
+                <a:pos x="connsiteX61" y="connsiteY61"/>
+              </a:cxn>
+              <a:cxn ang="0">
+                <a:pos x="connsiteX62" y="connsiteY62"/>
+              </a:cxn>
+              <a:cxn ang="0">
+                <a:pos x="connsiteX63" y="connsiteY63"/>
+              </a:cxn>
+              <a:cxn ang="0">
+                <a:pos x="connsiteX64" y="connsiteY64"/>
+              </a:cxn>
+            </a:cxnLst>
+            <a:rect l="l" t="t" r="r" b="b"/>
+            <a:pathLst>
+              <a:path w="11377066" h="3343806">
+                <a:moveTo>
+                  <a:pt x="914840" y="0"/>
+                </a:moveTo>
+                <a:lnTo>
+                  <a:pt x="11365513" y="0"/>
+                </a:lnTo>
+                <a:lnTo>
+                  <a:pt x="11365513" y="846735"/>
+                </a:lnTo>
+                <a:cubicBezTo>
+                  <a:pt x="11273092" y="924715"/>
+                  <a:pt x="11163343" y="985366"/>
+                  <a:pt x="11050704" y="1046017"/>
+                </a:cubicBezTo>
+                <a:cubicBezTo>
+                  <a:pt x="11088251" y="1089339"/>
+                  <a:pt x="11169119" y="1037353"/>
+                  <a:pt x="11195112" y="1103780"/>
+                </a:cubicBezTo>
+                <a:cubicBezTo>
+                  <a:pt x="10987166" y="1216419"/>
+                  <a:pt x="10796548" y="1357938"/>
+                  <a:pt x="10553944" y="1441695"/>
+                </a:cubicBezTo>
+                <a:cubicBezTo>
+                  <a:pt x="10753226" y="1381043"/>
+                  <a:pt x="10952508" y="1409925"/>
+                  <a:pt x="11148902" y="1383932"/>
+                </a:cubicBezTo>
+                <a:cubicBezTo>
+                  <a:pt x="11174895" y="1418589"/>
+                  <a:pt x="11131573" y="1418589"/>
+                  <a:pt x="11117132" y="1430142"/>
+                </a:cubicBezTo>
+                <a:cubicBezTo>
+                  <a:pt x="11102692" y="1441695"/>
+                  <a:pt x="11082474" y="1450359"/>
+                  <a:pt x="11085363" y="1476352"/>
+                </a:cubicBezTo>
+                <a:cubicBezTo>
+                  <a:pt x="11174895" y="1487905"/>
+                  <a:pt x="11273092" y="1447471"/>
+                  <a:pt x="11365513" y="1447471"/>
+                </a:cubicBezTo>
+                <a:lnTo>
+                  <a:pt x="11365513" y="1496569"/>
+                </a:lnTo>
+                <a:cubicBezTo>
+                  <a:pt x="11333743" y="1513898"/>
+                  <a:pt x="11293310" y="1519674"/>
+                  <a:pt x="11278869" y="1554332"/>
+                </a:cubicBezTo>
+                <a:cubicBezTo>
+                  <a:pt x="11307750" y="1548556"/>
+                  <a:pt x="11336632" y="1545668"/>
+                  <a:pt x="11365513" y="1539891"/>
+                </a:cubicBezTo>
+                <a:lnTo>
+                  <a:pt x="11377066" y="1539891"/>
+                </a:lnTo>
+                <a:lnTo>
+                  <a:pt x="11377066" y="1765167"/>
+                </a:lnTo>
+                <a:cubicBezTo>
+                  <a:pt x="9482441" y="3362313"/>
+                  <a:pt x="4945162" y="3324767"/>
+                  <a:pt x="4624577" y="3342096"/>
+                </a:cubicBezTo>
+                <a:cubicBezTo>
+                  <a:pt x="4523492" y="3347872"/>
+                  <a:pt x="4098935" y="3339207"/>
+                  <a:pt x="4000738" y="3313214"/>
+                </a:cubicBezTo>
+                <a:cubicBezTo>
+                  <a:pt x="3867883" y="3281444"/>
+                  <a:pt x="3853443" y="3217905"/>
+                  <a:pt x="3853443" y="3217905"/>
+                </a:cubicBezTo>
+                <a:cubicBezTo>
+                  <a:pt x="3853443" y="3217905"/>
+                  <a:pt x="3919869" y="3191912"/>
+                  <a:pt x="4003625" y="3171695"/>
+                </a:cubicBezTo>
+                <a:cubicBezTo>
+                  <a:pt x="4165361" y="3131261"/>
+                  <a:pt x="4298217" y="3056169"/>
+                  <a:pt x="4465729" y="3024399"/>
+                </a:cubicBezTo>
+                <a:cubicBezTo>
+                  <a:pt x="4315546" y="3033064"/>
+                  <a:pt x="4165361" y="3038840"/>
+                  <a:pt x="4015179" y="3047505"/>
+                </a:cubicBezTo>
+                <a:cubicBezTo>
+                  <a:pt x="4223124" y="2969524"/>
+                  <a:pt x="4442625" y="2957972"/>
+                  <a:pt x="4656346" y="2926202"/>
+                </a:cubicBezTo>
+                <a:cubicBezTo>
+                  <a:pt x="4725662" y="2917538"/>
+                  <a:pt x="4841188" y="2943531"/>
+                  <a:pt x="4841188" y="2862663"/>
+                </a:cubicBezTo>
+                <a:cubicBezTo>
+                  <a:pt x="4838300" y="2810676"/>
+                  <a:pt x="4725662" y="2833782"/>
+                  <a:pt x="4659236" y="2836670"/>
+                </a:cubicBezTo>
+                <a:cubicBezTo>
+                  <a:pt x="4364644" y="2845334"/>
+                  <a:pt x="4072941" y="2882880"/>
+                  <a:pt x="3778351" y="2914650"/>
+                </a:cubicBezTo>
+                <a:cubicBezTo>
+                  <a:pt x="3749468" y="2917538"/>
+                  <a:pt x="3714811" y="2931979"/>
+                  <a:pt x="3694595" y="2923314"/>
+                </a:cubicBezTo>
+                <a:cubicBezTo>
+                  <a:pt x="3527082" y="2865551"/>
+                  <a:pt x="3336463" y="2879992"/>
+                  <a:pt x="3119852" y="2862663"/>
+                </a:cubicBezTo>
+                <a:cubicBezTo>
+                  <a:pt x="3238266" y="2796236"/>
+                  <a:pt x="3339351" y="2842446"/>
+                  <a:pt x="3440437" y="2799124"/>
+                </a:cubicBezTo>
+                <a:cubicBezTo>
+                  <a:pt x="3316246" y="2752913"/>
+                  <a:pt x="3189168" y="2773131"/>
+                  <a:pt x="3070753" y="2761578"/>
+                </a:cubicBezTo>
+                <a:cubicBezTo>
+                  <a:pt x="2984109" y="2752913"/>
+                  <a:pt x="2672189" y="2741361"/>
+                  <a:pt x="2623091" y="2726920"/>
+                </a:cubicBezTo>
+                <a:cubicBezTo>
+                  <a:pt x="2472907" y="2683598"/>
+                  <a:pt x="2293842" y="2689374"/>
+                  <a:pt x="2160987" y="2611394"/>
+                </a:cubicBezTo>
+                <a:cubicBezTo>
+                  <a:pt x="2065678" y="2556519"/>
+                  <a:pt x="1938600" y="2602730"/>
+                  <a:pt x="1837515" y="2573848"/>
+                </a:cubicBezTo>
+                <a:cubicBezTo>
+                  <a:pt x="1794192" y="2533414"/>
+                  <a:pt x="1854843" y="2504533"/>
+                  <a:pt x="1869284" y="2472763"/>
+                </a:cubicBezTo>
+                <a:cubicBezTo>
+                  <a:pt x="1889502" y="2432329"/>
+                  <a:pt x="1834626" y="2423665"/>
+                  <a:pt x="1808633" y="2386119"/>
+                </a:cubicBezTo>
+                <a:cubicBezTo>
+                  <a:pt x="1987698" y="2389007"/>
+                  <a:pt x="2158099" y="2377454"/>
+                  <a:pt x="2354493" y="2342797"/>
+                </a:cubicBezTo>
+                <a:cubicBezTo>
+                  <a:pt x="2273625" y="2290810"/>
+                  <a:pt x="2204309" y="2339908"/>
+                  <a:pt x="2146546" y="2328356"/>
+                </a:cubicBezTo>
+                <a:cubicBezTo>
+                  <a:pt x="2106113" y="2319691"/>
+                  <a:pt x="2054126" y="2328356"/>
+                  <a:pt x="2054126" y="2285034"/>
+                </a:cubicBezTo>
+                <a:cubicBezTo>
+                  <a:pt x="2054126" y="2250376"/>
+                  <a:pt x="2100336" y="2244599"/>
+                  <a:pt x="2132106" y="2238823"/>
+                </a:cubicBezTo>
+                <a:cubicBezTo>
+                  <a:pt x="2256296" y="2218606"/>
+                  <a:pt x="2377599" y="2192613"/>
+                  <a:pt x="2478684" y="2085751"/>
+                </a:cubicBezTo>
+                <a:cubicBezTo>
+                  <a:pt x="2152323" y="2051094"/>
+                  <a:pt x="1817297" y="2186837"/>
+                  <a:pt x="1511154" y="2094416"/>
+                </a:cubicBezTo>
+                <a:cubicBezTo>
+                  <a:pt x="1537147" y="2033765"/>
+                  <a:pt x="1597798" y="2045317"/>
+                  <a:pt x="1638232" y="2042429"/>
+                </a:cubicBezTo>
+                <a:cubicBezTo>
+                  <a:pt x="1909718" y="2016436"/>
+                  <a:pt x="2825261" y="1701628"/>
+                  <a:pt x="2972556" y="1718957"/>
+                </a:cubicBezTo>
+                <a:cubicBezTo>
+                  <a:pt x="3062089" y="1727621"/>
+                  <a:pt x="3154510" y="1721845"/>
+                  <a:pt x="3238266" y="1678523"/>
+                </a:cubicBezTo>
+                <a:cubicBezTo>
+                  <a:pt x="3339351" y="1626536"/>
+                  <a:pt x="2695295" y="1736286"/>
+                  <a:pt x="2522005" y="1664082"/>
+                </a:cubicBezTo>
+                <a:cubicBezTo>
+                  <a:pt x="2438249" y="1629424"/>
+                  <a:pt x="1730654" y="1528339"/>
+                  <a:pt x="1421621" y="1522563"/>
+                </a:cubicBezTo>
+                <a:cubicBezTo>
+                  <a:pt x="1450503" y="1467688"/>
+                  <a:pt x="1557364" y="1470576"/>
+                  <a:pt x="1525595" y="1392596"/>
+                </a:cubicBezTo>
+                <a:cubicBezTo>
+                  <a:pt x="1358082" y="1386820"/>
+                  <a:pt x="1179017" y="1435918"/>
+                  <a:pt x="982623" y="1415701"/>
+                </a:cubicBezTo>
+                <a:cubicBezTo>
+                  <a:pt x="1051938" y="1346386"/>
+                  <a:pt x="1153023" y="1352162"/>
+                  <a:pt x="1231003" y="1314616"/>
+                </a:cubicBezTo>
+                <a:cubicBezTo>
+                  <a:pt x="1170352" y="1262629"/>
+                  <a:pt x="1095261" y="1294399"/>
+                  <a:pt x="1025945" y="1297287"/>
+                </a:cubicBezTo>
+                <a:cubicBezTo>
+                  <a:pt x="965294" y="1300175"/>
+                  <a:pt x="812222" y="1227972"/>
+                  <a:pt x="841104" y="1225083"/>
+                </a:cubicBezTo>
+                <a:cubicBezTo>
+                  <a:pt x="1101037" y="1207755"/>
+                  <a:pt x="1352306" y="1129775"/>
+                  <a:pt x="1612239" y="1112445"/>
+                </a:cubicBezTo>
+                <a:cubicBezTo>
+                  <a:pt x="1698883" y="1106668"/>
+                  <a:pt x="1797081" y="1112445"/>
+                  <a:pt x="1814409" y="1008471"/>
+                </a:cubicBezTo>
+                <a:cubicBezTo>
+                  <a:pt x="1817297" y="979590"/>
+                  <a:pt x="1808633" y="973814"/>
+                  <a:pt x="1932824" y="979590"/>
+                </a:cubicBezTo>
+                <a:cubicBezTo>
+                  <a:pt x="1981922" y="982478"/>
+                  <a:pt x="2045461" y="982478"/>
+                  <a:pt x="2083007" y="936268"/>
+                </a:cubicBezTo>
+                <a:cubicBezTo>
+                  <a:pt x="2045461" y="898722"/>
+                  <a:pt x="1990587" y="927603"/>
+                  <a:pt x="1947265" y="924715"/>
+                </a:cubicBezTo>
+                <a:cubicBezTo>
+                  <a:pt x="1828850" y="921827"/>
+                  <a:pt x="1386963" y="904498"/>
+                  <a:pt x="1271438" y="895834"/>
+                </a:cubicBezTo>
+                <a:cubicBezTo>
+                  <a:pt x="1031721" y="875617"/>
+                  <a:pt x="901755" y="933380"/>
+                  <a:pt x="659150" y="907386"/>
+                </a:cubicBezTo>
+                <a:cubicBezTo>
+                  <a:pt x="734242" y="890057"/>
+                  <a:pt x="705361" y="866952"/>
+                  <a:pt x="780453" y="846735"/>
+                </a:cubicBezTo>
+                <a:cubicBezTo>
+                  <a:pt x="815110" y="838071"/>
+                  <a:pt x="849768" y="820742"/>
+                  <a:pt x="841104" y="788972"/>
+                </a:cubicBezTo>
+                <a:cubicBezTo>
+                  <a:pt x="835327" y="757202"/>
+                  <a:pt x="396329" y="690775"/>
+                  <a:pt x="448316" y="659006"/>
+                </a:cubicBezTo>
+                <a:cubicBezTo>
+                  <a:pt x="592723" y="575249"/>
+                  <a:pt x="1020169" y="607019"/>
+                  <a:pt x="910419" y="569473"/>
+                </a:cubicBezTo>
+                <a:cubicBezTo>
+                  <a:pt x="742907" y="511710"/>
+                  <a:pt x="716913" y="500157"/>
+                  <a:pt x="604275" y="514598"/>
+                </a:cubicBezTo>
+                <a:cubicBezTo>
+                  <a:pt x="506079" y="529039"/>
+                  <a:pt x="113290" y="349974"/>
+                  <a:pt x="15093" y="352862"/>
+                </a:cubicBezTo>
+                <a:cubicBezTo>
+                  <a:pt x="-71551" y="352862"/>
+                  <a:pt x="234593" y="211343"/>
+                  <a:pt x="430987" y="136251"/>
+                </a:cubicBezTo>
+                <a:cubicBezTo>
+                  <a:pt x="571784" y="82098"/>
+                  <a:pt x="732076" y="70184"/>
+                  <a:pt x="874092" y="17656"/>
+                </a:cubicBezTo>
+                <a:close/>
+              </a:path>
+            </a:pathLst>
+          </a:custGeom>
+          <a:solidFill>
+            <a:schemeClr val="bg2">
+              <a:alpha val="50000"/>
+            </a:schemeClr>
+          </a:solidFill>
+          <a:ln w="32707" cap="flat">
+            <a:noFill/>
+            <a:prstDash val="solid"/>
+            <a:miter/>
+          </a:ln>
+        </p:spPr>
+        <p:txBody>
+          <a:bodyPr wrap="square" rtlCol="0" anchor="ctr">
+            <a:noAutofit/>
+          </a:bodyPr>
+          <a:lstStyle/>
+          <a:p>
+            <a:endParaRPr lang="en-US">
+              <a:solidFill>
+                <a:schemeClr val="tx1"/>
+              </a:solidFill>
+            </a:endParaRPr>
+          </a:p>
+        </p:txBody>
+      </p:sp>
+      <p:sp>
+        <p:nvSpPr>
+          <p:cNvPr id="2" name="Title 1">
+            <a:extLst>
+              <a:ext uri="{FF2B5EF4-FFF2-40B4-BE49-F238E27FC236}">
+                <a16:creationId xmlns:a16="http://schemas.microsoft.com/office/drawing/2014/main" id="{17B2E28A-2184-C132-339A-5B5E2747BAD3}"/>
+              </a:ext>
+            </a:extLst>
+          </p:cNvPr>
+          <p:cNvSpPr>
+            <a:spLocks noGrp="1"/>
+          </p:cNvSpPr>
+          <p:nvPr>
+            <p:ph type="title"/>
+          </p:nvPr>
+        </p:nvSpPr>
+        <p:spPr>
+          <a:xfrm>
+            <a:off x="778735" y="1226962"/>
+            <a:ext cx="4482111" cy="3527214"/>
+          </a:xfrm>
+        </p:spPr>
+        <p:txBody>
+          <a:bodyPr anchor="t">
+            <a:normAutofit/>
+          </a:bodyPr>
+          <a:lstStyle/>
+          <a:p>
+            <a:r>
+              <a:rPr lang="en-US" b="1" dirty="0"/>
+              <a:t>Agenda</a:t>
+            </a:r>
+          </a:p>
+        </p:txBody>
+      </p:sp>
+      <p:sp>
+        <p:nvSpPr>
+          <p:cNvPr id="12" name="Freeform: Shape 11">
+            <a:extLst>
+              <a:ext uri="{FF2B5EF4-FFF2-40B4-BE49-F238E27FC236}">
+                <a16:creationId xmlns:a16="http://schemas.microsoft.com/office/drawing/2014/main" id="{C6BFDF0B-6325-416D-926F-7141006DDBD0}"/>
+              </a:ext>
+              <a:ext uri="{C183D7F6-B498-43B3-948B-1728B52AA6E4}">
+                <adec:decorative xmlns:adec="http://schemas.microsoft.com/office/drawing/2017/decorative" val="1"/>
+              </a:ext>
+            </a:extLst>
+          </p:cNvPr>
+          <p:cNvSpPr>
+            <a:spLocks noGrp="1" noRot="1" noChangeAspect="1" noMove="1" noResize="1" noEditPoints="1" noAdjustHandles="1" noChangeArrowheads="1" noChangeShapeType="1" noTextEdit="1"/>
+          </p:cNvSpPr>
+          <p:nvPr>
+            <p:extLst>
+              <p:ext uri="{386F3935-93C4-4BCD-93E2-E3B085C9AB24}">
+                <p16:designElem xmlns:p16="http://schemas.microsoft.com/office/powerpoint/2015/main" val="1"/>
+              </p:ext>
+            </p:extLst>
+          </p:nvPr>
+        </p:nvSpPr>
+        <p:spPr>
+          <a:xfrm flipV="1">
+            <a:off x="5693668" y="5127460"/>
+            <a:ext cx="6498333" cy="1730540"/>
+          </a:xfrm>
+          <a:custGeom>
+            <a:avLst/>
+            <a:gdLst>
+              <a:gd name="connsiteX0" fmla="*/ 2987112 w 6498333"/>
+              <a:gd name="connsiteY0" fmla="*/ 1730384 h 1730540"/>
+              <a:gd name="connsiteX1" fmla="*/ 3113423 w 6498333"/>
+              <a:gd name="connsiteY1" fmla="*/ 1728494 h 1730540"/>
+              <a:gd name="connsiteX2" fmla="*/ 6436159 w 6498333"/>
+              <a:gd name="connsiteY2" fmla="*/ 1396018 h 1730540"/>
+              <a:gd name="connsiteX3" fmla="*/ 6498333 w 6498333"/>
+              <a:gd name="connsiteY3" fmla="*/ 1381988 h 1730540"/>
+              <a:gd name="connsiteX4" fmla="*/ 6498333 w 6498333"/>
+              <a:gd name="connsiteY4" fmla="*/ 0 h 1730540"/>
+              <a:gd name="connsiteX5" fmla="*/ 723703 w 6498333"/>
+              <a:gd name="connsiteY5" fmla="*/ 0 h 1730540"/>
+              <a:gd name="connsiteX6" fmla="*/ 629735 w 6498333"/>
+              <a:gd name="connsiteY6" fmla="*/ 31770 h 1730540"/>
+              <a:gd name="connsiteX7" fmla="*/ 127078 w 6498333"/>
+              <a:gd name="connsiteY7" fmla="*/ 173371 h 1730540"/>
+              <a:gd name="connsiteX8" fmla="*/ 0 w 6498333"/>
+              <a:gd name="connsiteY8" fmla="*/ 235577 h 1730540"/>
+              <a:gd name="connsiteX9" fmla="*/ 967530 w 6498333"/>
+              <a:gd name="connsiteY9" fmla="*/ 225208 h 1730540"/>
+              <a:gd name="connsiteX10" fmla="*/ 620954 w 6498333"/>
+              <a:gd name="connsiteY10" fmla="*/ 408367 h 1730540"/>
+              <a:gd name="connsiteX11" fmla="*/ 542972 w 6498333"/>
+              <a:gd name="connsiteY11" fmla="*/ 463661 h 1730540"/>
+              <a:gd name="connsiteX12" fmla="*/ 635392 w 6498333"/>
+              <a:gd name="connsiteY12" fmla="*/ 515499 h 1730540"/>
+              <a:gd name="connsiteX13" fmla="*/ 843339 w 6498333"/>
+              <a:gd name="connsiteY13" fmla="*/ 532778 h 1730540"/>
+              <a:gd name="connsiteX14" fmla="*/ 297479 w 6498333"/>
+              <a:gd name="connsiteY14" fmla="*/ 584615 h 1730540"/>
+              <a:gd name="connsiteX15" fmla="*/ 358130 w 6498333"/>
+              <a:gd name="connsiteY15" fmla="*/ 688289 h 1730540"/>
+              <a:gd name="connsiteX16" fmla="*/ 326361 w 6498333"/>
+              <a:gd name="connsiteY16" fmla="*/ 809243 h 1730540"/>
+              <a:gd name="connsiteX17" fmla="*/ 649833 w 6498333"/>
+              <a:gd name="connsiteY17" fmla="*/ 854169 h 1730540"/>
+              <a:gd name="connsiteX18" fmla="*/ 1111937 w 6498333"/>
+              <a:gd name="connsiteY18" fmla="*/ 992402 h 1730540"/>
+              <a:gd name="connsiteX19" fmla="*/ 1559599 w 6498333"/>
+              <a:gd name="connsiteY19" fmla="*/ 1033872 h 1730540"/>
+              <a:gd name="connsiteX20" fmla="*/ 1929284 w 6498333"/>
+              <a:gd name="connsiteY20" fmla="*/ 1078798 h 1730540"/>
+              <a:gd name="connsiteX21" fmla="*/ 1608698 w 6498333"/>
+              <a:gd name="connsiteY21" fmla="*/ 1154826 h 1730540"/>
+              <a:gd name="connsiteX22" fmla="*/ 2183442 w 6498333"/>
+              <a:gd name="connsiteY22" fmla="*/ 1227398 h 1730540"/>
+              <a:gd name="connsiteX23" fmla="*/ 2267197 w 6498333"/>
+              <a:gd name="connsiteY23" fmla="*/ 1217031 h 1730540"/>
+              <a:gd name="connsiteX24" fmla="*/ 3148082 w 6498333"/>
+              <a:gd name="connsiteY24" fmla="*/ 1123724 h 1730540"/>
+              <a:gd name="connsiteX25" fmla="*/ 3330034 w 6498333"/>
+              <a:gd name="connsiteY25" fmla="*/ 1154826 h 1730540"/>
+              <a:gd name="connsiteX26" fmla="*/ 3145192 w 6498333"/>
+              <a:gd name="connsiteY26" fmla="*/ 1230854 h 1730540"/>
+              <a:gd name="connsiteX27" fmla="*/ 2504025 w 6498333"/>
+              <a:gd name="connsiteY27" fmla="*/ 1376000 h 1730540"/>
+              <a:gd name="connsiteX28" fmla="*/ 2954575 w 6498333"/>
+              <a:gd name="connsiteY28" fmla="*/ 1348352 h 1730540"/>
+              <a:gd name="connsiteX29" fmla="*/ 2492471 w 6498333"/>
+              <a:gd name="connsiteY29" fmla="*/ 1524600 h 1730540"/>
+              <a:gd name="connsiteX30" fmla="*/ 2342289 w 6498333"/>
+              <a:gd name="connsiteY30" fmla="*/ 1579893 h 1730540"/>
+              <a:gd name="connsiteX31" fmla="*/ 2489584 w 6498333"/>
+              <a:gd name="connsiteY31" fmla="*/ 1693935 h 1730540"/>
+              <a:gd name="connsiteX32" fmla="*/ 2987112 w 6498333"/>
+              <a:gd name="connsiteY32" fmla="*/ 1730384 h 1730540"/>
+            </a:gdLst>
+            <a:ahLst/>
+            <a:cxnLst>
+              <a:cxn ang="0">
+                <a:pos x="connsiteX0" y="connsiteY0"/>
+              </a:cxn>
+              <a:cxn ang="0">
+                <a:pos x="connsiteX1" y="connsiteY1"/>
+              </a:cxn>
+              <a:cxn ang="0">
+                <a:pos x="connsiteX2" y="connsiteY2"/>
+              </a:cxn>
+              <a:cxn ang="0">
+                <a:pos x="connsiteX3" y="connsiteY3"/>
+              </a:cxn>
+              <a:cxn ang="0">
+                <a:pos x="connsiteX4" y="connsiteY4"/>
+              </a:cxn>
+              <a:cxn ang="0">
+                <a:pos x="connsiteX5" y="connsiteY5"/>
+              </a:cxn>
+              <a:cxn ang="0">
+                <a:pos x="connsiteX6" y="connsiteY6"/>
+              </a:cxn>
+              <a:cxn ang="0">
+                <a:pos x="connsiteX7" y="connsiteY7"/>
+              </a:cxn>
+              <a:cxn ang="0">
+                <a:pos x="connsiteX8" y="connsiteY8"/>
+              </a:cxn>
+              <a:cxn ang="0">
+                <a:pos x="connsiteX9" y="connsiteY9"/>
+              </a:cxn>
+              <a:cxn ang="0">
+                <a:pos x="connsiteX10" y="connsiteY10"/>
+              </a:cxn>
+              <a:cxn ang="0">
+                <a:pos x="connsiteX11" y="connsiteY11"/>
+              </a:cxn>
+              <a:cxn ang="0">
+                <a:pos x="connsiteX12" y="connsiteY12"/>
+              </a:cxn>
+              <a:cxn ang="0">
+                <a:pos x="connsiteX13" y="connsiteY13"/>
+              </a:cxn>
+              <a:cxn ang="0">
+                <a:pos x="connsiteX14" y="connsiteY14"/>
+              </a:cxn>
+              <a:cxn ang="0">
+                <a:pos x="connsiteX15" y="connsiteY15"/>
+              </a:cxn>
+              <a:cxn ang="0">
+                <a:pos x="connsiteX16" y="connsiteY16"/>
+              </a:cxn>
+              <a:cxn ang="0">
+                <a:pos x="connsiteX17" y="connsiteY17"/>
+              </a:cxn>
+              <a:cxn ang="0">
+                <a:pos x="connsiteX18" y="connsiteY18"/>
+              </a:cxn>
+              <a:cxn ang="0">
+                <a:pos x="connsiteX19" y="connsiteY19"/>
+              </a:cxn>
+              <a:cxn ang="0">
+                <a:pos x="connsiteX20" y="connsiteY20"/>
+              </a:cxn>
+              <a:cxn ang="0">
+                <a:pos x="connsiteX21" y="connsiteY21"/>
+              </a:cxn>
+              <a:cxn ang="0">
+                <a:pos x="connsiteX22" y="connsiteY22"/>
+              </a:cxn>
+              <a:cxn ang="0">
+                <a:pos x="connsiteX23" y="connsiteY23"/>
+              </a:cxn>
+              <a:cxn ang="0">
+                <a:pos x="connsiteX24" y="connsiteY24"/>
+              </a:cxn>
+              <a:cxn ang="0">
+                <a:pos x="connsiteX25" y="connsiteY25"/>
+              </a:cxn>
+              <a:cxn ang="0">
+                <a:pos x="connsiteX26" y="connsiteY26"/>
+              </a:cxn>
+              <a:cxn ang="0">
+                <a:pos x="connsiteX27" y="connsiteY27"/>
+              </a:cxn>
+              <a:cxn ang="0">
+                <a:pos x="connsiteX28" y="connsiteY28"/>
+              </a:cxn>
+              <a:cxn ang="0">
+                <a:pos x="connsiteX29" y="connsiteY29"/>
+              </a:cxn>
+              <a:cxn ang="0">
+                <a:pos x="connsiteX30" y="connsiteY30"/>
+              </a:cxn>
+              <a:cxn ang="0">
+                <a:pos x="connsiteX31" y="connsiteY31"/>
+              </a:cxn>
+              <a:cxn ang="0">
+                <a:pos x="connsiteX32" y="connsiteY32"/>
+              </a:cxn>
+            </a:cxnLst>
+            <a:rect l="l" t="t" r="r" b="b"/>
+            <a:pathLst>
+              <a:path w="6498333" h="1730540">
+                <a:moveTo>
+                  <a:pt x="2987112" y="1730384"/>
+                </a:moveTo>
+                <a:cubicBezTo>
+                  <a:pt x="3042664" y="1730870"/>
+                  <a:pt x="3088152" y="1730222"/>
+                  <a:pt x="3113423" y="1728494"/>
+                </a:cubicBezTo>
+                <a:cubicBezTo>
+                  <a:pt x="3293752" y="1716831"/>
+                  <a:pt x="4808270" y="1725943"/>
+                  <a:pt x="6436159" y="1396018"/>
+                </a:cubicBezTo>
+                <a:lnTo>
+                  <a:pt x="6498333" y="1381988"/>
+                </a:lnTo>
+                <a:lnTo>
+                  <a:pt x="6498333" y="0"/>
+                </a:lnTo>
+                <a:lnTo>
+                  <a:pt x="723703" y="0"/>
+                </a:lnTo>
+                <a:lnTo>
+                  <a:pt x="629735" y="31770"/>
+                </a:lnTo>
+                <a:cubicBezTo>
+                  <a:pt x="421263" y="101447"/>
+                  <a:pt x="228886" y="161708"/>
+                  <a:pt x="127078" y="173371"/>
+                </a:cubicBezTo>
+                <a:cubicBezTo>
+                  <a:pt x="86644" y="176827"/>
+                  <a:pt x="25993" y="163004"/>
+                  <a:pt x="0" y="235577"/>
+                </a:cubicBezTo>
+                <a:cubicBezTo>
+                  <a:pt x="306144" y="346163"/>
+                  <a:pt x="641170" y="183739"/>
+                  <a:pt x="967530" y="225208"/>
+                </a:cubicBezTo>
+                <a:cubicBezTo>
+                  <a:pt x="866445" y="353075"/>
+                  <a:pt x="745142" y="384177"/>
+                  <a:pt x="620954" y="408367"/>
+                </a:cubicBezTo>
+                <a:cubicBezTo>
+                  <a:pt x="589182" y="415279"/>
+                  <a:pt x="542972" y="422191"/>
+                  <a:pt x="542972" y="463661"/>
+                </a:cubicBezTo>
+                <a:cubicBezTo>
+                  <a:pt x="542972" y="515499"/>
+                  <a:pt x="594959" y="505130"/>
+                  <a:pt x="635392" y="515499"/>
+                </a:cubicBezTo>
+                <a:cubicBezTo>
+                  <a:pt x="693155" y="529321"/>
+                  <a:pt x="762471" y="470573"/>
+                  <a:pt x="843339" y="532778"/>
+                </a:cubicBezTo>
+                <a:cubicBezTo>
+                  <a:pt x="646945" y="574247"/>
+                  <a:pt x="476544" y="588071"/>
+                  <a:pt x="297479" y="584615"/>
+                </a:cubicBezTo>
+                <a:cubicBezTo>
+                  <a:pt x="323472" y="629541"/>
+                  <a:pt x="378348" y="639908"/>
+                  <a:pt x="358130" y="688289"/>
+                </a:cubicBezTo>
+                <a:cubicBezTo>
+                  <a:pt x="343689" y="726304"/>
+                  <a:pt x="283038" y="760862"/>
+                  <a:pt x="326361" y="809243"/>
+                </a:cubicBezTo>
+                <a:cubicBezTo>
+                  <a:pt x="427447" y="843802"/>
+                  <a:pt x="554524" y="788508"/>
+                  <a:pt x="649833" y="854169"/>
+                </a:cubicBezTo>
+                <a:cubicBezTo>
+                  <a:pt x="782688" y="947476"/>
+                  <a:pt x="961753" y="940565"/>
+                  <a:pt x="1111937" y="992402"/>
+                </a:cubicBezTo>
+                <a:cubicBezTo>
+                  <a:pt x="1161035" y="1009682"/>
+                  <a:pt x="1472955" y="1023504"/>
+                  <a:pt x="1559599" y="1033872"/>
+                </a:cubicBezTo>
+                <a:cubicBezTo>
+                  <a:pt x="1678015" y="1047696"/>
+                  <a:pt x="1805093" y="1023504"/>
+                  <a:pt x="1929284" y="1078798"/>
+                </a:cubicBezTo>
+                <a:cubicBezTo>
+                  <a:pt x="1828198" y="1130635"/>
+                  <a:pt x="1727113" y="1075343"/>
+                  <a:pt x="1608698" y="1154826"/>
+                </a:cubicBezTo>
+                <a:cubicBezTo>
+                  <a:pt x="1825309" y="1175561"/>
+                  <a:pt x="2015928" y="1158282"/>
+                  <a:pt x="2183442" y="1227398"/>
+                </a:cubicBezTo>
+                <a:cubicBezTo>
+                  <a:pt x="2203658" y="1237767"/>
+                  <a:pt x="2238314" y="1220487"/>
+                  <a:pt x="2267197" y="1217031"/>
+                </a:cubicBezTo>
+                <a:cubicBezTo>
+                  <a:pt x="2561787" y="1179017"/>
+                  <a:pt x="2853490" y="1134091"/>
+                  <a:pt x="3148082" y="1123724"/>
+                </a:cubicBezTo>
+                <a:cubicBezTo>
+                  <a:pt x="3214508" y="1120268"/>
+                  <a:pt x="3327146" y="1092621"/>
+                  <a:pt x="3330034" y="1154826"/>
+                </a:cubicBezTo>
+                <a:cubicBezTo>
+                  <a:pt x="3330034" y="1251589"/>
+                  <a:pt x="3214508" y="1220487"/>
+                  <a:pt x="3145192" y="1230854"/>
+                </a:cubicBezTo>
+                <a:cubicBezTo>
+                  <a:pt x="2931471" y="1268869"/>
+                  <a:pt x="2711970" y="1282691"/>
+                  <a:pt x="2504025" y="1376000"/>
+                </a:cubicBezTo>
+                <a:cubicBezTo>
+                  <a:pt x="2654207" y="1365632"/>
+                  <a:pt x="2804392" y="1358720"/>
+                  <a:pt x="2954575" y="1348352"/>
+                </a:cubicBezTo>
+                <a:cubicBezTo>
+                  <a:pt x="2787063" y="1386367"/>
+                  <a:pt x="2654207" y="1476218"/>
+                  <a:pt x="2492471" y="1524600"/>
+                </a:cubicBezTo>
+                <a:cubicBezTo>
+                  <a:pt x="2408715" y="1548791"/>
+                  <a:pt x="2342289" y="1579893"/>
+                  <a:pt x="2342289" y="1579893"/>
+                </a:cubicBezTo>
+                <a:cubicBezTo>
+                  <a:pt x="2342289" y="1579893"/>
+                  <a:pt x="2356730" y="1655921"/>
+                  <a:pt x="2489584" y="1693935"/>
+                </a:cubicBezTo>
+                <a:cubicBezTo>
+                  <a:pt x="2563232" y="1717262"/>
+                  <a:pt x="2820457" y="1728925"/>
+                  <a:pt x="2987112" y="1730384"/>
+                </a:cubicBezTo>
+                <a:close/>
+              </a:path>
+            </a:pathLst>
+          </a:custGeom>
+          <a:solidFill>
+            <a:schemeClr val="bg2">
+              <a:alpha val="50000"/>
+            </a:schemeClr>
+          </a:solidFill>
+          <a:ln w="32707" cap="flat">
+            <a:noFill/>
+            <a:prstDash val="solid"/>
+            <a:miter/>
+          </a:ln>
+        </p:spPr>
+        <p:txBody>
+          <a:bodyPr wrap="square" rtlCol="0" anchor="ctr">
+            <a:noAutofit/>
+          </a:bodyPr>
+          <a:lstStyle/>
+          <a:p>
+            <a:endParaRPr lang="en-US">
+              <a:solidFill>
+                <a:schemeClr val="tx1"/>
+              </a:solidFill>
+            </a:endParaRPr>
+          </a:p>
+        </p:txBody>
+      </p:sp>
+      <p:sp>
+        <p:nvSpPr>
+          <p:cNvPr id="3" name="Content Placeholder 2">
+            <a:extLst>
+              <a:ext uri="{FF2B5EF4-FFF2-40B4-BE49-F238E27FC236}">
+                <a16:creationId xmlns:a16="http://schemas.microsoft.com/office/drawing/2014/main" id="{B550C824-7E13-4EDE-A68C-2C35B4FEB815}"/>
+              </a:ext>
+            </a:extLst>
+          </p:cNvPr>
+          <p:cNvSpPr>
+            <a:spLocks noGrp="1"/>
+          </p:cNvSpPr>
+          <p:nvPr>
+            <p:ph idx="1"/>
+          </p:nvPr>
+        </p:nvSpPr>
+        <p:spPr>
+          <a:xfrm>
+            <a:off x="1820559" y="2499709"/>
+            <a:ext cx="5257804" cy="3929186"/>
+          </a:xfrm>
+        </p:spPr>
+        <p:txBody>
+          <a:bodyPr anchor="t">
+            <a:normAutofit/>
+          </a:bodyPr>
+          <a:lstStyle/>
+          <a:p>
+            <a:pPr rtl="0" fontAlgn="base">
+              <a:spcBef>
+                <a:spcPts val="0"/>
+              </a:spcBef>
+              <a:spcAft>
+                <a:spcPts val="1200"/>
+              </a:spcAft>
+              <a:buFont typeface="Wingdings" pitchFamily="2" charset="2"/>
+              <a:buChar char="Ø"/>
+            </a:pPr>
+            <a:r>
+              <a:rPr lang="en-GB" sz="3200" b="0" i="0" u="none" strike="noStrike" dirty="0">
+                <a:effectLst/>
+                <a:latin typeface="Lato" panose="020F0502020204030203" pitchFamily="34" charset="0"/>
+              </a:rPr>
+              <a:t>Maven 4 - what’s new</a:t>
+            </a:r>
+          </a:p>
+          <a:p>
+            <a:pPr rtl="0" fontAlgn="base">
+              <a:spcBef>
+                <a:spcPts val="0"/>
+              </a:spcBef>
+              <a:spcAft>
+                <a:spcPts val="1200"/>
+              </a:spcAft>
+              <a:buFont typeface="Wingdings" pitchFamily="2" charset="2"/>
+              <a:buChar char="Ø"/>
+            </a:pPr>
+            <a:endParaRPr lang="en-GB" sz="3200" b="0" i="0" u="none" strike="noStrike" dirty="0">
+              <a:effectLst/>
+              <a:latin typeface="Lato" panose="020F0502020204030203" pitchFamily="34" charset="0"/>
+            </a:endParaRPr>
+          </a:p>
+          <a:p>
+            <a:pPr rtl="0" fontAlgn="base">
+              <a:spcBef>
+                <a:spcPts val="0"/>
+              </a:spcBef>
+              <a:spcAft>
+                <a:spcPts val="0"/>
+              </a:spcAft>
+              <a:buFont typeface="Wingdings" pitchFamily="2" charset="2"/>
+              <a:buChar char="Ø"/>
+            </a:pPr>
+            <a:r>
+              <a:rPr lang="en-GB" sz="3200" b="0" i="0" u="none" strike="noStrike" dirty="0">
+                <a:effectLst/>
+                <a:latin typeface="Lato" panose="020F0502020204030203" pitchFamily="34" charset="0"/>
+              </a:rPr>
+              <a:t>Java 21 – goodies</a:t>
+            </a:r>
+          </a:p>
+          <a:p>
+            <a:pPr marL="0" indent="0" rtl="0" fontAlgn="base">
+              <a:spcBef>
+                <a:spcPts val="0"/>
+              </a:spcBef>
+              <a:spcAft>
+                <a:spcPts val="0"/>
+              </a:spcAft>
+              <a:buNone/>
+            </a:pPr>
+            <a:endParaRPr lang="en-GB" sz="3200" b="0" i="0" u="none" strike="noStrike" dirty="0">
+              <a:effectLst/>
+              <a:latin typeface="Lato" panose="020F0502020204030203" pitchFamily="34" charset="0"/>
+            </a:endParaRPr>
+          </a:p>
+          <a:p>
+            <a:pPr rtl="0" fontAlgn="base">
+              <a:spcBef>
+                <a:spcPts val="0"/>
+              </a:spcBef>
+              <a:spcAft>
+                <a:spcPts val="0"/>
+              </a:spcAft>
+              <a:buFont typeface="Wingdings" pitchFamily="2" charset="2"/>
+              <a:buChar char="Ø"/>
+            </a:pPr>
+            <a:endParaRPr lang="en-GB" sz="3200" dirty="0">
+              <a:latin typeface="Lato" panose="020F0502020204030203" pitchFamily="34" charset="0"/>
+            </a:endParaRPr>
+          </a:p>
+          <a:p>
+            <a:pPr rtl="0" fontAlgn="base">
+              <a:spcBef>
+                <a:spcPts val="0"/>
+              </a:spcBef>
+              <a:spcAft>
+                <a:spcPts val="0"/>
+              </a:spcAft>
+              <a:buFont typeface="Wingdings" pitchFamily="2" charset="2"/>
+              <a:buChar char="Ø"/>
+            </a:pPr>
+            <a:r>
+              <a:rPr lang="en-GB" sz="3200" b="0" i="0" u="none" strike="noStrike" dirty="0">
+                <a:effectLst/>
+                <a:latin typeface="Lato" panose="020F0502020204030203" pitchFamily="34" charset="0"/>
+              </a:rPr>
+              <a:t>Play time</a:t>
+            </a:r>
+          </a:p>
+        </p:txBody>
+      </p:sp>
+    </p:spTree>
+    <p:extLst>
+      <p:ext uri="{BB962C8B-B14F-4D97-AF65-F5344CB8AC3E}">
+        <p14:creationId xmlns:p14="http://schemas.microsoft.com/office/powerpoint/2010/main" val="3704788612"/>
+      </p:ext>
+    </p:extLst>
+  </p:cSld>
+  <p:clrMapOvr>
+    <a:masterClrMapping/>
+  </p:clrMapOvr>
+</p:sld>
+</file>
+
+<file path=ppt/slides/slide20.xml><?xml version="1.0" encoding="utf-8"?>
 <p:sld xmlns:a="http://schemas.openxmlformats.org/drawingml/2006/main" xmlns:r="http://schemas.openxmlformats.org/officeDocument/2006/relationships" xmlns:p="http://schemas.openxmlformats.org/presentationml/2006/main">
   <p:cSld>
     <p:bg>
@@ -15155,1363 +16818,6 @@
     <p:extLst>
       <p:ext uri="{BB962C8B-B14F-4D97-AF65-F5344CB8AC3E}">
         <p14:creationId xmlns:p14="http://schemas.microsoft.com/office/powerpoint/2010/main" val="2597553"/>
-      </p:ext>
-    </p:extLst>
-  </p:cSld>
-  <p:clrMapOvr>
-    <a:masterClrMapping/>
-  </p:clrMapOvr>
-</p:sld>
-</file>
-
-<file path=ppt/slides/slide2.xml><?xml version="1.0" encoding="utf-8"?>
-<p:sld xmlns:a="http://schemas.openxmlformats.org/drawingml/2006/main" xmlns:r="http://schemas.openxmlformats.org/officeDocument/2006/relationships" xmlns:p="http://schemas.openxmlformats.org/presentationml/2006/main">
-  <p:cSld>
-    <p:bg>
-      <p:bgPr>
-        <a:solidFill>
-          <a:schemeClr val="bg1"/>
-        </a:solidFill>
-        <a:effectLst/>
-      </p:bgPr>
-    </p:bg>
-    <p:spTree>
-      <p:nvGrpSpPr>
-        <p:cNvPr id="1" name=""/>
-        <p:cNvGrpSpPr/>
-        <p:nvPr/>
-      </p:nvGrpSpPr>
-      <p:grpSpPr>
-        <a:xfrm>
-          <a:off x="0" y="0"/>
-          <a:ext cx="0" cy="0"/>
-          <a:chOff x="0" y="0"/>
-          <a:chExt cx="0" cy="0"/>
-        </a:xfrm>
-      </p:grpSpPr>
-      <p:sp useBgFill="1">
-        <p:nvSpPr>
-          <p:cNvPr id="8" name="Rectangle 7">
-            <a:extLst>
-              <a:ext uri="{FF2B5EF4-FFF2-40B4-BE49-F238E27FC236}">
-                <a16:creationId xmlns:a16="http://schemas.microsoft.com/office/drawing/2014/main" id="{B20EED73-1494-4E89-869B-E501A02B2408}"/>
-              </a:ext>
-              <a:ext uri="{C183D7F6-B498-43B3-948B-1728B52AA6E4}">
-                <adec:decorative xmlns:adec="http://schemas.microsoft.com/office/drawing/2017/decorative" val="1"/>
-              </a:ext>
-            </a:extLst>
-          </p:cNvPr>
-          <p:cNvSpPr>
-            <a:spLocks noGrp="1" noRot="1" noChangeAspect="1" noMove="1" noResize="1" noEditPoints="1" noAdjustHandles="1" noChangeArrowheads="1" noChangeShapeType="1" noTextEdit="1"/>
-          </p:cNvSpPr>
-          <p:nvPr>
-            <p:extLst>
-              <p:ext uri="{386F3935-93C4-4BCD-93E2-E3B085C9AB24}">
-                <p16:designElem xmlns:p16="http://schemas.microsoft.com/office/powerpoint/2015/main" val="1"/>
-              </p:ext>
-            </p:extLst>
-          </p:nvPr>
-        </p:nvSpPr>
-        <p:spPr>
-          <a:xfrm>
-            <a:off x="0" y="0"/>
-            <a:ext cx="12188952" cy="6858000"/>
-          </a:xfrm>
-          <a:prstGeom prst="rect">
-            <a:avLst/>
-          </a:prstGeom>
-          <a:ln>
-            <a:noFill/>
-          </a:ln>
-        </p:spPr>
-        <p:style>
-          <a:lnRef idx="2">
-            <a:schemeClr val="accent1">
-              <a:shade val="50000"/>
-            </a:schemeClr>
-          </a:lnRef>
-          <a:fillRef idx="1">
-            <a:schemeClr val="accent1"/>
-          </a:fillRef>
-          <a:effectRef idx="0">
-            <a:schemeClr val="accent1"/>
-          </a:effectRef>
-          <a:fontRef idx="minor">
-            <a:schemeClr val="lt1"/>
-          </a:fontRef>
-        </p:style>
-        <p:txBody>
-          <a:bodyPr rtlCol="0" anchor="ctr"/>
-          <a:lstStyle/>
-          <a:p>
-            <a:pPr algn="ctr"/>
-            <a:endParaRPr lang="en-US"/>
-          </a:p>
-        </p:txBody>
-      </p:sp>
-      <p:sp>
-        <p:nvSpPr>
-          <p:cNvPr id="10" name="Freeform: Shape 9">
-            <a:extLst>
-              <a:ext uri="{FF2B5EF4-FFF2-40B4-BE49-F238E27FC236}">
-                <a16:creationId xmlns:a16="http://schemas.microsoft.com/office/drawing/2014/main" id="{E9D7A3A2-205A-4FD7-89D2-24FA8A54EA12}"/>
-              </a:ext>
-              <a:ext uri="{C183D7F6-B498-43B3-948B-1728B52AA6E4}">
-                <adec:decorative xmlns:adec="http://schemas.microsoft.com/office/drawing/2017/decorative" val="1"/>
-              </a:ext>
-            </a:extLst>
-          </p:cNvPr>
-          <p:cNvSpPr>
-            <a:spLocks noGrp="1" noRot="1" noChangeAspect="1" noMove="1" noResize="1" noEditPoints="1" noAdjustHandles="1" noChangeArrowheads="1" noChangeShapeType="1" noTextEdit="1"/>
-          </p:cNvSpPr>
-          <p:nvPr>
-            <p:extLst>
-              <p:ext uri="{386F3935-93C4-4BCD-93E2-E3B085C9AB24}">
-                <p16:designElem xmlns:p16="http://schemas.microsoft.com/office/powerpoint/2015/main" val="1"/>
-              </p:ext>
-            </p:extLst>
-          </p:nvPr>
-        </p:nvSpPr>
-        <p:spPr>
-          <a:xfrm>
-            <a:off x="814934" y="0"/>
-            <a:ext cx="11377066" cy="4001047"/>
-          </a:xfrm>
-          <a:custGeom>
-            <a:avLst/>
-            <a:gdLst>
-              <a:gd name="connsiteX0" fmla="*/ 914840 w 11377066"/>
-              <a:gd name="connsiteY0" fmla="*/ 0 h 3343806"/>
-              <a:gd name="connsiteX1" fmla="*/ 11365513 w 11377066"/>
-              <a:gd name="connsiteY1" fmla="*/ 0 h 3343806"/>
-              <a:gd name="connsiteX2" fmla="*/ 11365513 w 11377066"/>
-              <a:gd name="connsiteY2" fmla="*/ 846735 h 3343806"/>
-              <a:gd name="connsiteX3" fmla="*/ 11050704 w 11377066"/>
-              <a:gd name="connsiteY3" fmla="*/ 1046017 h 3343806"/>
-              <a:gd name="connsiteX4" fmla="*/ 11195112 w 11377066"/>
-              <a:gd name="connsiteY4" fmla="*/ 1103780 h 3343806"/>
-              <a:gd name="connsiteX5" fmla="*/ 10553944 w 11377066"/>
-              <a:gd name="connsiteY5" fmla="*/ 1441695 h 3343806"/>
-              <a:gd name="connsiteX6" fmla="*/ 11148902 w 11377066"/>
-              <a:gd name="connsiteY6" fmla="*/ 1383932 h 3343806"/>
-              <a:gd name="connsiteX7" fmla="*/ 11117132 w 11377066"/>
-              <a:gd name="connsiteY7" fmla="*/ 1430142 h 3343806"/>
-              <a:gd name="connsiteX8" fmla="*/ 11085363 w 11377066"/>
-              <a:gd name="connsiteY8" fmla="*/ 1476352 h 3343806"/>
-              <a:gd name="connsiteX9" fmla="*/ 11365513 w 11377066"/>
-              <a:gd name="connsiteY9" fmla="*/ 1447471 h 3343806"/>
-              <a:gd name="connsiteX10" fmla="*/ 11365513 w 11377066"/>
-              <a:gd name="connsiteY10" fmla="*/ 1496569 h 3343806"/>
-              <a:gd name="connsiteX11" fmla="*/ 11278869 w 11377066"/>
-              <a:gd name="connsiteY11" fmla="*/ 1554332 h 3343806"/>
-              <a:gd name="connsiteX12" fmla="*/ 11365513 w 11377066"/>
-              <a:gd name="connsiteY12" fmla="*/ 1539891 h 3343806"/>
-              <a:gd name="connsiteX13" fmla="*/ 11377066 w 11377066"/>
-              <a:gd name="connsiteY13" fmla="*/ 1539891 h 3343806"/>
-              <a:gd name="connsiteX14" fmla="*/ 11377066 w 11377066"/>
-              <a:gd name="connsiteY14" fmla="*/ 1765167 h 3343806"/>
-              <a:gd name="connsiteX15" fmla="*/ 4624577 w 11377066"/>
-              <a:gd name="connsiteY15" fmla="*/ 3342096 h 3343806"/>
-              <a:gd name="connsiteX16" fmla="*/ 4000738 w 11377066"/>
-              <a:gd name="connsiteY16" fmla="*/ 3313214 h 3343806"/>
-              <a:gd name="connsiteX17" fmla="*/ 3853443 w 11377066"/>
-              <a:gd name="connsiteY17" fmla="*/ 3217905 h 3343806"/>
-              <a:gd name="connsiteX18" fmla="*/ 4003625 w 11377066"/>
-              <a:gd name="connsiteY18" fmla="*/ 3171695 h 3343806"/>
-              <a:gd name="connsiteX19" fmla="*/ 4465729 w 11377066"/>
-              <a:gd name="connsiteY19" fmla="*/ 3024399 h 3343806"/>
-              <a:gd name="connsiteX20" fmla="*/ 4015179 w 11377066"/>
-              <a:gd name="connsiteY20" fmla="*/ 3047505 h 3343806"/>
-              <a:gd name="connsiteX21" fmla="*/ 4656346 w 11377066"/>
-              <a:gd name="connsiteY21" fmla="*/ 2926202 h 3343806"/>
-              <a:gd name="connsiteX22" fmla="*/ 4841188 w 11377066"/>
-              <a:gd name="connsiteY22" fmla="*/ 2862663 h 3343806"/>
-              <a:gd name="connsiteX23" fmla="*/ 4659236 w 11377066"/>
-              <a:gd name="connsiteY23" fmla="*/ 2836670 h 3343806"/>
-              <a:gd name="connsiteX24" fmla="*/ 3778351 w 11377066"/>
-              <a:gd name="connsiteY24" fmla="*/ 2914650 h 3343806"/>
-              <a:gd name="connsiteX25" fmla="*/ 3694595 w 11377066"/>
-              <a:gd name="connsiteY25" fmla="*/ 2923314 h 3343806"/>
-              <a:gd name="connsiteX26" fmla="*/ 3119852 w 11377066"/>
-              <a:gd name="connsiteY26" fmla="*/ 2862663 h 3343806"/>
-              <a:gd name="connsiteX27" fmla="*/ 3440437 w 11377066"/>
-              <a:gd name="connsiteY27" fmla="*/ 2799124 h 3343806"/>
-              <a:gd name="connsiteX28" fmla="*/ 3070753 w 11377066"/>
-              <a:gd name="connsiteY28" fmla="*/ 2761578 h 3343806"/>
-              <a:gd name="connsiteX29" fmla="*/ 2623091 w 11377066"/>
-              <a:gd name="connsiteY29" fmla="*/ 2726920 h 3343806"/>
-              <a:gd name="connsiteX30" fmla="*/ 2160987 w 11377066"/>
-              <a:gd name="connsiteY30" fmla="*/ 2611394 h 3343806"/>
-              <a:gd name="connsiteX31" fmla="*/ 1837515 w 11377066"/>
-              <a:gd name="connsiteY31" fmla="*/ 2573848 h 3343806"/>
-              <a:gd name="connsiteX32" fmla="*/ 1869284 w 11377066"/>
-              <a:gd name="connsiteY32" fmla="*/ 2472763 h 3343806"/>
-              <a:gd name="connsiteX33" fmla="*/ 1808633 w 11377066"/>
-              <a:gd name="connsiteY33" fmla="*/ 2386119 h 3343806"/>
-              <a:gd name="connsiteX34" fmla="*/ 2354493 w 11377066"/>
-              <a:gd name="connsiteY34" fmla="*/ 2342797 h 3343806"/>
-              <a:gd name="connsiteX35" fmla="*/ 2146546 w 11377066"/>
-              <a:gd name="connsiteY35" fmla="*/ 2328356 h 3343806"/>
-              <a:gd name="connsiteX36" fmla="*/ 2054126 w 11377066"/>
-              <a:gd name="connsiteY36" fmla="*/ 2285034 h 3343806"/>
-              <a:gd name="connsiteX37" fmla="*/ 2132106 w 11377066"/>
-              <a:gd name="connsiteY37" fmla="*/ 2238823 h 3343806"/>
-              <a:gd name="connsiteX38" fmla="*/ 2478684 w 11377066"/>
-              <a:gd name="connsiteY38" fmla="*/ 2085751 h 3343806"/>
-              <a:gd name="connsiteX39" fmla="*/ 1511154 w 11377066"/>
-              <a:gd name="connsiteY39" fmla="*/ 2094416 h 3343806"/>
-              <a:gd name="connsiteX40" fmla="*/ 1638232 w 11377066"/>
-              <a:gd name="connsiteY40" fmla="*/ 2042429 h 3343806"/>
-              <a:gd name="connsiteX41" fmla="*/ 2972556 w 11377066"/>
-              <a:gd name="connsiteY41" fmla="*/ 1718957 h 3343806"/>
-              <a:gd name="connsiteX42" fmla="*/ 3238266 w 11377066"/>
-              <a:gd name="connsiteY42" fmla="*/ 1678523 h 3343806"/>
-              <a:gd name="connsiteX43" fmla="*/ 2522005 w 11377066"/>
-              <a:gd name="connsiteY43" fmla="*/ 1664082 h 3343806"/>
-              <a:gd name="connsiteX44" fmla="*/ 1421621 w 11377066"/>
-              <a:gd name="connsiteY44" fmla="*/ 1522563 h 3343806"/>
-              <a:gd name="connsiteX45" fmla="*/ 1525595 w 11377066"/>
-              <a:gd name="connsiteY45" fmla="*/ 1392596 h 3343806"/>
-              <a:gd name="connsiteX46" fmla="*/ 982623 w 11377066"/>
-              <a:gd name="connsiteY46" fmla="*/ 1415701 h 3343806"/>
-              <a:gd name="connsiteX47" fmla="*/ 1231003 w 11377066"/>
-              <a:gd name="connsiteY47" fmla="*/ 1314616 h 3343806"/>
-              <a:gd name="connsiteX48" fmla="*/ 1025945 w 11377066"/>
-              <a:gd name="connsiteY48" fmla="*/ 1297287 h 3343806"/>
-              <a:gd name="connsiteX49" fmla="*/ 841104 w 11377066"/>
-              <a:gd name="connsiteY49" fmla="*/ 1225083 h 3343806"/>
-              <a:gd name="connsiteX50" fmla="*/ 1612239 w 11377066"/>
-              <a:gd name="connsiteY50" fmla="*/ 1112445 h 3343806"/>
-              <a:gd name="connsiteX51" fmla="*/ 1814409 w 11377066"/>
-              <a:gd name="connsiteY51" fmla="*/ 1008471 h 3343806"/>
-              <a:gd name="connsiteX52" fmla="*/ 1932824 w 11377066"/>
-              <a:gd name="connsiteY52" fmla="*/ 979590 h 3343806"/>
-              <a:gd name="connsiteX53" fmla="*/ 2083007 w 11377066"/>
-              <a:gd name="connsiteY53" fmla="*/ 936268 h 3343806"/>
-              <a:gd name="connsiteX54" fmla="*/ 1947265 w 11377066"/>
-              <a:gd name="connsiteY54" fmla="*/ 924715 h 3343806"/>
-              <a:gd name="connsiteX55" fmla="*/ 1271438 w 11377066"/>
-              <a:gd name="connsiteY55" fmla="*/ 895834 h 3343806"/>
-              <a:gd name="connsiteX56" fmla="*/ 659150 w 11377066"/>
-              <a:gd name="connsiteY56" fmla="*/ 907386 h 3343806"/>
-              <a:gd name="connsiteX57" fmla="*/ 780453 w 11377066"/>
-              <a:gd name="connsiteY57" fmla="*/ 846735 h 3343806"/>
-              <a:gd name="connsiteX58" fmla="*/ 841104 w 11377066"/>
-              <a:gd name="connsiteY58" fmla="*/ 788972 h 3343806"/>
-              <a:gd name="connsiteX59" fmla="*/ 448316 w 11377066"/>
-              <a:gd name="connsiteY59" fmla="*/ 659006 h 3343806"/>
-              <a:gd name="connsiteX60" fmla="*/ 910419 w 11377066"/>
-              <a:gd name="connsiteY60" fmla="*/ 569473 h 3343806"/>
-              <a:gd name="connsiteX61" fmla="*/ 604275 w 11377066"/>
-              <a:gd name="connsiteY61" fmla="*/ 514598 h 3343806"/>
-              <a:gd name="connsiteX62" fmla="*/ 15093 w 11377066"/>
-              <a:gd name="connsiteY62" fmla="*/ 352862 h 3343806"/>
-              <a:gd name="connsiteX63" fmla="*/ 430987 w 11377066"/>
-              <a:gd name="connsiteY63" fmla="*/ 136251 h 3343806"/>
-              <a:gd name="connsiteX64" fmla="*/ 874092 w 11377066"/>
-              <a:gd name="connsiteY64" fmla="*/ 17656 h 3343806"/>
-            </a:gdLst>
-            <a:ahLst/>
-            <a:cxnLst>
-              <a:cxn ang="0">
-                <a:pos x="connsiteX0" y="connsiteY0"/>
-              </a:cxn>
-              <a:cxn ang="0">
-                <a:pos x="connsiteX1" y="connsiteY1"/>
-              </a:cxn>
-              <a:cxn ang="0">
-                <a:pos x="connsiteX2" y="connsiteY2"/>
-              </a:cxn>
-              <a:cxn ang="0">
-                <a:pos x="connsiteX3" y="connsiteY3"/>
-              </a:cxn>
-              <a:cxn ang="0">
-                <a:pos x="connsiteX4" y="connsiteY4"/>
-              </a:cxn>
-              <a:cxn ang="0">
-                <a:pos x="connsiteX5" y="connsiteY5"/>
-              </a:cxn>
-              <a:cxn ang="0">
-                <a:pos x="connsiteX6" y="connsiteY6"/>
-              </a:cxn>
-              <a:cxn ang="0">
-                <a:pos x="connsiteX7" y="connsiteY7"/>
-              </a:cxn>
-              <a:cxn ang="0">
-                <a:pos x="connsiteX8" y="connsiteY8"/>
-              </a:cxn>
-              <a:cxn ang="0">
-                <a:pos x="connsiteX9" y="connsiteY9"/>
-              </a:cxn>
-              <a:cxn ang="0">
-                <a:pos x="connsiteX10" y="connsiteY10"/>
-              </a:cxn>
-              <a:cxn ang="0">
-                <a:pos x="connsiteX11" y="connsiteY11"/>
-              </a:cxn>
-              <a:cxn ang="0">
-                <a:pos x="connsiteX12" y="connsiteY12"/>
-              </a:cxn>
-              <a:cxn ang="0">
-                <a:pos x="connsiteX13" y="connsiteY13"/>
-              </a:cxn>
-              <a:cxn ang="0">
-                <a:pos x="connsiteX14" y="connsiteY14"/>
-              </a:cxn>
-              <a:cxn ang="0">
-                <a:pos x="connsiteX15" y="connsiteY15"/>
-              </a:cxn>
-              <a:cxn ang="0">
-                <a:pos x="connsiteX16" y="connsiteY16"/>
-              </a:cxn>
-              <a:cxn ang="0">
-                <a:pos x="connsiteX17" y="connsiteY17"/>
-              </a:cxn>
-              <a:cxn ang="0">
-                <a:pos x="connsiteX18" y="connsiteY18"/>
-              </a:cxn>
-              <a:cxn ang="0">
-                <a:pos x="connsiteX19" y="connsiteY19"/>
-              </a:cxn>
-              <a:cxn ang="0">
-                <a:pos x="connsiteX20" y="connsiteY20"/>
-              </a:cxn>
-              <a:cxn ang="0">
-                <a:pos x="connsiteX21" y="connsiteY21"/>
-              </a:cxn>
-              <a:cxn ang="0">
-                <a:pos x="connsiteX22" y="connsiteY22"/>
-              </a:cxn>
-              <a:cxn ang="0">
-                <a:pos x="connsiteX23" y="connsiteY23"/>
-              </a:cxn>
-              <a:cxn ang="0">
-                <a:pos x="connsiteX24" y="connsiteY24"/>
-              </a:cxn>
-              <a:cxn ang="0">
-                <a:pos x="connsiteX25" y="connsiteY25"/>
-              </a:cxn>
-              <a:cxn ang="0">
-                <a:pos x="connsiteX26" y="connsiteY26"/>
-              </a:cxn>
-              <a:cxn ang="0">
-                <a:pos x="connsiteX27" y="connsiteY27"/>
-              </a:cxn>
-              <a:cxn ang="0">
-                <a:pos x="connsiteX28" y="connsiteY28"/>
-              </a:cxn>
-              <a:cxn ang="0">
-                <a:pos x="connsiteX29" y="connsiteY29"/>
-              </a:cxn>
-              <a:cxn ang="0">
-                <a:pos x="connsiteX30" y="connsiteY30"/>
-              </a:cxn>
-              <a:cxn ang="0">
-                <a:pos x="connsiteX31" y="connsiteY31"/>
-              </a:cxn>
-              <a:cxn ang="0">
-                <a:pos x="connsiteX32" y="connsiteY32"/>
-              </a:cxn>
-              <a:cxn ang="0">
-                <a:pos x="connsiteX33" y="connsiteY33"/>
-              </a:cxn>
-              <a:cxn ang="0">
-                <a:pos x="connsiteX34" y="connsiteY34"/>
-              </a:cxn>
-              <a:cxn ang="0">
-                <a:pos x="connsiteX35" y="connsiteY35"/>
-              </a:cxn>
-              <a:cxn ang="0">
-                <a:pos x="connsiteX36" y="connsiteY36"/>
-              </a:cxn>
-              <a:cxn ang="0">
-                <a:pos x="connsiteX37" y="connsiteY37"/>
-              </a:cxn>
-              <a:cxn ang="0">
-                <a:pos x="connsiteX38" y="connsiteY38"/>
-              </a:cxn>
-              <a:cxn ang="0">
-                <a:pos x="connsiteX39" y="connsiteY39"/>
-              </a:cxn>
-              <a:cxn ang="0">
-                <a:pos x="connsiteX40" y="connsiteY40"/>
-              </a:cxn>
-              <a:cxn ang="0">
-                <a:pos x="connsiteX41" y="connsiteY41"/>
-              </a:cxn>
-              <a:cxn ang="0">
-                <a:pos x="connsiteX42" y="connsiteY42"/>
-              </a:cxn>
-              <a:cxn ang="0">
-                <a:pos x="connsiteX43" y="connsiteY43"/>
-              </a:cxn>
-              <a:cxn ang="0">
-                <a:pos x="connsiteX44" y="connsiteY44"/>
-              </a:cxn>
-              <a:cxn ang="0">
-                <a:pos x="connsiteX45" y="connsiteY45"/>
-              </a:cxn>
-              <a:cxn ang="0">
-                <a:pos x="connsiteX46" y="connsiteY46"/>
-              </a:cxn>
-              <a:cxn ang="0">
-                <a:pos x="connsiteX47" y="connsiteY47"/>
-              </a:cxn>
-              <a:cxn ang="0">
-                <a:pos x="connsiteX48" y="connsiteY48"/>
-              </a:cxn>
-              <a:cxn ang="0">
-                <a:pos x="connsiteX49" y="connsiteY49"/>
-              </a:cxn>
-              <a:cxn ang="0">
-                <a:pos x="connsiteX50" y="connsiteY50"/>
-              </a:cxn>
-              <a:cxn ang="0">
-                <a:pos x="connsiteX51" y="connsiteY51"/>
-              </a:cxn>
-              <a:cxn ang="0">
-                <a:pos x="connsiteX52" y="connsiteY52"/>
-              </a:cxn>
-              <a:cxn ang="0">
-                <a:pos x="connsiteX53" y="connsiteY53"/>
-              </a:cxn>
-              <a:cxn ang="0">
-                <a:pos x="connsiteX54" y="connsiteY54"/>
-              </a:cxn>
-              <a:cxn ang="0">
-                <a:pos x="connsiteX55" y="connsiteY55"/>
-              </a:cxn>
-              <a:cxn ang="0">
-                <a:pos x="connsiteX56" y="connsiteY56"/>
-              </a:cxn>
-              <a:cxn ang="0">
-                <a:pos x="connsiteX57" y="connsiteY57"/>
-              </a:cxn>
-              <a:cxn ang="0">
-                <a:pos x="connsiteX58" y="connsiteY58"/>
-              </a:cxn>
-              <a:cxn ang="0">
-                <a:pos x="connsiteX59" y="connsiteY59"/>
-              </a:cxn>
-              <a:cxn ang="0">
-                <a:pos x="connsiteX60" y="connsiteY60"/>
-              </a:cxn>
-              <a:cxn ang="0">
-                <a:pos x="connsiteX61" y="connsiteY61"/>
-              </a:cxn>
-              <a:cxn ang="0">
-                <a:pos x="connsiteX62" y="connsiteY62"/>
-              </a:cxn>
-              <a:cxn ang="0">
-                <a:pos x="connsiteX63" y="connsiteY63"/>
-              </a:cxn>
-              <a:cxn ang="0">
-                <a:pos x="connsiteX64" y="connsiteY64"/>
-              </a:cxn>
-            </a:cxnLst>
-            <a:rect l="l" t="t" r="r" b="b"/>
-            <a:pathLst>
-              <a:path w="11377066" h="3343806">
-                <a:moveTo>
-                  <a:pt x="914840" y="0"/>
-                </a:moveTo>
-                <a:lnTo>
-                  <a:pt x="11365513" y="0"/>
-                </a:lnTo>
-                <a:lnTo>
-                  <a:pt x="11365513" y="846735"/>
-                </a:lnTo>
-                <a:cubicBezTo>
-                  <a:pt x="11273092" y="924715"/>
-                  <a:pt x="11163343" y="985366"/>
-                  <a:pt x="11050704" y="1046017"/>
-                </a:cubicBezTo>
-                <a:cubicBezTo>
-                  <a:pt x="11088251" y="1089339"/>
-                  <a:pt x="11169119" y="1037353"/>
-                  <a:pt x="11195112" y="1103780"/>
-                </a:cubicBezTo>
-                <a:cubicBezTo>
-                  <a:pt x="10987166" y="1216419"/>
-                  <a:pt x="10796548" y="1357938"/>
-                  <a:pt x="10553944" y="1441695"/>
-                </a:cubicBezTo>
-                <a:cubicBezTo>
-                  <a:pt x="10753226" y="1381043"/>
-                  <a:pt x="10952508" y="1409925"/>
-                  <a:pt x="11148902" y="1383932"/>
-                </a:cubicBezTo>
-                <a:cubicBezTo>
-                  <a:pt x="11174895" y="1418589"/>
-                  <a:pt x="11131573" y="1418589"/>
-                  <a:pt x="11117132" y="1430142"/>
-                </a:cubicBezTo>
-                <a:cubicBezTo>
-                  <a:pt x="11102692" y="1441695"/>
-                  <a:pt x="11082474" y="1450359"/>
-                  <a:pt x="11085363" y="1476352"/>
-                </a:cubicBezTo>
-                <a:cubicBezTo>
-                  <a:pt x="11174895" y="1487905"/>
-                  <a:pt x="11273092" y="1447471"/>
-                  <a:pt x="11365513" y="1447471"/>
-                </a:cubicBezTo>
-                <a:lnTo>
-                  <a:pt x="11365513" y="1496569"/>
-                </a:lnTo>
-                <a:cubicBezTo>
-                  <a:pt x="11333743" y="1513898"/>
-                  <a:pt x="11293310" y="1519674"/>
-                  <a:pt x="11278869" y="1554332"/>
-                </a:cubicBezTo>
-                <a:cubicBezTo>
-                  <a:pt x="11307750" y="1548556"/>
-                  <a:pt x="11336632" y="1545668"/>
-                  <a:pt x="11365513" y="1539891"/>
-                </a:cubicBezTo>
-                <a:lnTo>
-                  <a:pt x="11377066" y="1539891"/>
-                </a:lnTo>
-                <a:lnTo>
-                  <a:pt x="11377066" y="1765167"/>
-                </a:lnTo>
-                <a:cubicBezTo>
-                  <a:pt x="9482441" y="3362313"/>
-                  <a:pt x="4945162" y="3324767"/>
-                  <a:pt x="4624577" y="3342096"/>
-                </a:cubicBezTo>
-                <a:cubicBezTo>
-                  <a:pt x="4523492" y="3347872"/>
-                  <a:pt x="4098935" y="3339207"/>
-                  <a:pt x="4000738" y="3313214"/>
-                </a:cubicBezTo>
-                <a:cubicBezTo>
-                  <a:pt x="3867883" y="3281444"/>
-                  <a:pt x="3853443" y="3217905"/>
-                  <a:pt x="3853443" y="3217905"/>
-                </a:cubicBezTo>
-                <a:cubicBezTo>
-                  <a:pt x="3853443" y="3217905"/>
-                  <a:pt x="3919869" y="3191912"/>
-                  <a:pt x="4003625" y="3171695"/>
-                </a:cubicBezTo>
-                <a:cubicBezTo>
-                  <a:pt x="4165361" y="3131261"/>
-                  <a:pt x="4298217" y="3056169"/>
-                  <a:pt x="4465729" y="3024399"/>
-                </a:cubicBezTo>
-                <a:cubicBezTo>
-                  <a:pt x="4315546" y="3033064"/>
-                  <a:pt x="4165361" y="3038840"/>
-                  <a:pt x="4015179" y="3047505"/>
-                </a:cubicBezTo>
-                <a:cubicBezTo>
-                  <a:pt x="4223124" y="2969524"/>
-                  <a:pt x="4442625" y="2957972"/>
-                  <a:pt x="4656346" y="2926202"/>
-                </a:cubicBezTo>
-                <a:cubicBezTo>
-                  <a:pt x="4725662" y="2917538"/>
-                  <a:pt x="4841188" y="2943531"/>
-                  <a:pt x="4841188" y="2862663"/>
-                </a:cubicBezTo>
-                <a:cubicBezTo>
-                  <a:pt x="4838300" y="2810676"/>
-                  <a:pt x="4725662" y="2833782"/>
-                  <a:pt x="4659236" y="2836670"/>
-                </a:cubicBezTo>
-                <a:cubicBezTo>
-                  <a:pt x="4364644" y="2845334"/>
-                  <a:pt x="4072941" y="2882880"/>
-                  <a:pt x="3778351" y="2914650"/>
-                </a:cubicBezTo>
-                <a:cubicBezTo>
-                  <a:pt x="3749468" y="2917538"/>
-                  <a:pt x="3714811" y="2931979"/>
-                  <a:pt x="3694595" y="2923314"/>
-                </a:cubicBezTo>
-                <a:cubicBezTo>
-                  <a:pt x="3527082" y="2865551"/>
-                  <a:pt x="3336463" y="2879992"/>
-                  <a:pt x="3119852" y="2862663"/>
-                </a:cubicBezTo>
-                <a:cubicBezTo>
-                  <a:pt x="3238266" y="2796236"/>
-                  <a:pt x="3339351" y="2842446"/>
-                  <a:pt x="3440437" y="2799124"/>
-                </a:cubicBezTo>
-                <a:cubicBezTo>
-                  <a:pt x="3316246" y="2752913"/>
-                  <a:pt x="3189168" y="2773131"/>
-                  <a:pt x="3070753" y="2761578"/>
-                </a:cubicBezTo>
-                <a:cubicBezTo>
-                  <a:pt x="2984109" y="2752913"/>
-                  <a:pt x="2672189" y="2741361"/>
-                  <a:pt x="2623091" y="2726920"/>
-                </a:cubicBezTo>
-                <a:cubicBezTo>
-                  <a:pt x="2472907" y="2683598"/>
-                  <a:pt x="2293842" y="2689374"/>
-                  <a:pt x="2160987" y="2611394"/>
-                </a:cubicBezTo>
-                <a:cubicBezTo>
-                  <a:pt x="2065678" y="2556519"/>
-                  <a:pt x="1938600" y="2602730"/>
-                  <a:pt x="1837515" y="2573848"/>
-                </a:cubicBezTo>
-                <a:cubicBezTo>
-                  <a:pt x="1794192" y="2533414"/>
-                  <a:pt x="1854843" y="2504533"/>
-                  <a:pt x="1869284" y="2472763"/>
-                </a:cubicBezTo>
-                <a:cubicBezTo>
-                  <a:pt x="1889502" y="2432329"/>
-                  <a:pt x="1834626" y="2423665"/>
-                  <a:pt x="1808633" y="2386119"/>
-                </a:cubicBezTo>
-                <a:cubicBezTo>
-                  <a:pt x="1987698" y="2389007"/>
-                  <a:pt x="2158099" y="2377454"/>
-                  <a:pt x="2354493" y="2342797"/>
-                </a:cubicBezTo>
-                <a:cubicBezTo>
-                  <a:pt x="2273625" y="2290810"/>
-                  <a:pt x="2204309" y="2339908"/>
-                  <a:pt x="2146546" y="2328356"/>
-                </a:cubicBezTo>
-                <a:cubicBezTo>
-                  <a:pt x="2106113" y="2319691"/>
-                  <a:pt x="2054126" y="2328356"/>
-                  <a:pt x="2054126" y="2285034"/>
-                </a:cubicBezTo>
-                <a:cubicBezTo>
-                  <a:pt x="2054126" y="2250376"/>
-                  <a:pt x="2100336" y="2244599"/>
-                  <a:pt x="2132106" y="2238823"/>
-                </a:cubicBezTo>
-                <a:cubicBezTo>
-                  <a:pt x="2256296" y="2218606"/>
-                  <a:pt x="2377599" y="2192613"/>
-                  <a:pt x="2478684" y="2085751"/>
-                </a:cubicBezTo>
-                <a:cubicBezTo>
-                  <a:pt x="2152323" y="2051094"/>
-                  <a:pt x="1817297" y="2186837"/>
-                  <a:pt x="1511154" y="2094416"/>
-                </a:cubicBezTo>
-                <a:cubicBezTo>
-                  <a:pt x="1537147" y="2033765"/>
-                  <a:pt x="1597798" y="2045317"/>
-                  <a:pt x="1638232" y="2042429"/>
-                </a:cubicBezTo>
-                <a:cubicBezTo>
-                  <a:pt x="1909718" y="2016436"/>
-                  <a:pt x="2825261" y="1701628"/>
-                  <a:pt x="2972556" y="1718957"/>
-                </a:cubicBezTo>
-                <a:cubicBezTo>
-                  <a:pt x="3062089" y="1727621"/>
-                  <a:pt x="3154510" y="1721845"/>
-                  <a:pt x="3238266" y="1678523"/>
-                </a:cubicBezTo>
-                <a:cubicBezTo>
-                  <a:pt x="3339351" y="1626536"/>
-                  <a:pt x="2695295" y="1736286"/>
-                  <a:pt x="2522005" y="1664082"/>
-                </a:cubicBezTo>
-                <a:cubicBezTo>
-                  <a:pt x="2438249" y="1629424"/>
-                  <a:pt x="1730654" y="1528339"/>
-                  <a:pt x="1421621" y="1522563"/>
-                </a:cubicBezTo>
-                <a:cubicBezTo>
-                  <a:pt x="1450503" y="1467688"/>
-                  <a:pt x="1557364" y="1470576"/>
-                  <a:pt x="1525595" y="1392596"/>
-                </a:cubicBezTo>
-                <a:cubicBezTo>
-                  <a:pt x="1358082" y="1386820"/>
-                  <a:pt x="1179017" y="1435918"/>
-                  <a:pt x="982623" y="1415701"/>
-                </a:cubicBezTo>
-                <a:cubicBezTo>
-                  <a:pt x="1051938" y="1346386"/>
-                  <a:pt x="1153023" y="1352162"/>
-                  <a:pt x="1231003" y="1314616"/>
-                </a:cubicBezTo>
-                <a:cubicBezTo>
-                  <a:pt x="1170352" y="1262629"/>
-                  <a:pt x="1095261" y="1294399"/>
-                  <a:pt x="1025945" y="1297287"/>
-                </a:cubicBezTo>
-                <a:cubicBezTo>
-                  <a:pt x="965294" y="1300175"/>
-                  <a:pt x="812222" y="1227972"/>
-                  <a:pt x="841104" y="1225083"/>
-                </a:cubicBezTo>
-                <a:cubicBezTo>
-                  <a:pt x="1101037" y="1207755"/>
-                  <a:pt x="1352306" y="1129775"/>
-                  <a:pt x="1612239" y="1112445"/>
-                </a:cubicBezTo>
-                <a:cubicBezTo>
-                  <a:pt x="1698883" y="1106668"/>
-                  <a:pt x="1797081" y="1112445"/>
-                  <a:pt x="1814409" y="1008471"/>
-                </a:cubicBezTo>
-                <a:cubicBezTo>
-                  <a:pt x="1817297" y="979590"/>
-                  <a:pt x="1808633" y="973814"/>
-                  <a:pt x="1932824" y="979590"/>
-                </a:cubicBezTo>
-                <a:cubicBezTo>
-                  <a:pt x="1981922" y="982478"/>
-                  <a:pt x="2045461" y="982478"/>
-                  <a:pt x="2083007" y="936268"/>
-                </a:cubicBezTo>
-                <a:cubicBezTo>
-                  <a:pt x="2045461" y="898722"/>
-                  <a:pt x="1990587" y="927603"/>
-                  <a:pt x="1947265" y="924715"/>
-                </a:cubicBezTo>
-                <a:cubicBezTo>
-                  <a:pt x="1828850" y="921827"/>
-                  <a:pt x="1386963" y="904498"/>
-                  <a:pt x="1271438" y="895834"/>
-                </a:cubicBezTo>
-                <a:cubicBezTo>
-                  <a:pt x="1031721" y="875617"/>
-                  <a:pt x="901755" y="933380"/>
-                  <a:pt x="659150" y="907386"/>
-                </a:cubicBezTo>
-                <a:cubicBezTo>
-                  <a:pt x="734242" y="890057"/>
-                  <a:pt x="705361" y="866952"/>
-                  <a:pt x="780453" y="846735"/>
-                </a:cubicBezTo>
-                <a:cubicBezTo>
-                  <a:pt x="815110" y="838071"/>
-                  <a:pt x="849768" y="820742"/>
-                  <a:pt x="841104" y="788972"/>
-                </a:cubicBezTo>
-                <a:cubicBezTo>
-                  <a:pt x="835327" y="757202"/>
-                  <a:pt x="396329" y="690775"/>
-                  <a:pt x="448316" y="659006"/>
-                </a:cubicBezTo>
-                <a:cubicBezTo>
-                  <a:pt x="592723" y="575249"/>
-                  <a:pt x="1020169" y="607019"/>
-                  <a:pt x="910419" y="569473"/>
-                </a:cubicBezTo>
-                <a:cubicBezTo>
-                  <a:pt x="742907" y="511710"/>
-                  <a:pt x="716913" y="500157"/>
-                  <a:pt x="604275" y="514598"/>
-                </a:cubicBezTo>
-                <a:cubicBezTo>
-                  <a:pt x="506079" y="529039"/>
-                  <a:pt x="113290" y="349974"/>
-                  <a:pt x="15093" y="352862"/>
-                </a:cubicBezTo>
-                <a:cubicBezTo>
-                  <a:pt x="-71551" y="352862"/>
-                  <a:pt x="234593" y="211343"/>
-                  <a:pt x="430987" y="136251"/>
-                </a:cubicBezTo>
-                <a:cubicBezTo>
-                  <a:pt x="571784" y="82098"/>
-                  <a:pt x="732076" y="70184"/>
-                  <a:pt x="874092" y="17656"/>
-                </a:cubicBezTo>
-                <a:close/>
-              </a:path>
-            </a:pathLst>
-          </a:custGeom>
-          <a:solidFill>
-            <a:schemeClr val="bg2">
-              <a:alpha val="50000"/>
-            </a:schemeClr>
-          </a:solidFill>
-          <a:ln w="32707" cap="flat">
-            <a:noFill/>
-            <a:prstDash val="solid"/>
-            <a:miter/>
-          </a:ln>
-        </p:spPr>
-        <p:txBody>
-          <a:bodyPr wrap="square" rtlCol="0" anchor="ctr">
-            <a:noAutofit/>
-          </a:bodyPr>
-          <a:lstStyle/>
-          <a:p>
-            <a:endParaRPr lang="en-US">
-              <a:solidFill>
-                <a:schemeClr val="tx1"/>
-              </a:solidFill>
-            </a:endParaRPr>
-          </a:p>
-        </p:txBody>
-      </p:sp>
-      <p:sp>
-        <p:nvSpPr>
-          <p:cNvPr id="2" name="Title 1">
-            <a:extLst>
-              <a:ext uri="{FF2B5EF4-FFF2-40B4-BE49-F238E27FC236}">
-                <a16:creationId xmlns:a16="http://schemas.microsoft.com/office/drawing/2014/main" id="{17B2E28A-2184-C132-339A-5B5E2747BAD3}"/>
-              </a:ext>
-            </a:extLst>
-          </p:cNvPr>
-          <p:cNvSpPr>
-            <a:spLocks noGrp="1"/>
-          </p:cNvSpPr>
-          <p:nvPr>
-            <p:ph type="title"/>
-          </p:nvPr>
-        </p:nvSpPr>
-        <p:spPr>
-          <a:xfrm>
-            <a:off x="778735" y="1226962"/>
-            <a:ext cx="4482111" cy="3527214"/>
-          </a:xfrm>
-        </p:spPr>
-        <p:txBody>
-          <a:bodyPr anchor="t">
-            <a:normAutofit/>
-          </a:bodyPr>
-          <a:lstStyle/>
-          <a:p>
-            <a:r>
-              <a:rPr lang="en-US" b="1" dirty="0"/>
-              <a:t>Agenda</a:t>
-            </a:r>
-          </a:p>
-        </p:txBody>
-      </p:sp>
-      <p:sp>
-        <p:nvSpPr>
-          <p:cNvPr id="12" name="Freeform: Shape 11">
-            <a:extLst>
-              <a:ext uri="{FF2B5EF4-FFF2-40B4-BE49-F238E27FC236}">
-                <a16:creationId xmlns:a16="http://schemas.microsoft.com/office/drawing/2014/main" id="{C6BFDF0B-6325-416D-926F-7141006DDBD0}"/>
-              </a:ext>
-              <a:ext uri="{C183D7F6-B498-43B3-948B-1728B52AA6E4}">
-                <adec:decorative xmlns:adec="http://schemas.microsoft.com/office/drawing/2017/decorative" val="1"/>
-              </a:ext>
-            </a:extLst>
-          </p:cNvPr>
-          <p:cNvSpPr>
-            <a:spLocks noGrp="1" noRot="1" noChangeAspect="1" noMove="1" noResize="1" noEditPoints="1" noAdjustHandles="1" noChangeArrowheads="1" noChangeShapeType="1" noTextEdit="1"/>
-          </p:cNvSpPr>
-          <p:nvPr>
-            <p:extLst>
-              <p:ext uri="{386F3935-93C4-4BCD-93E2-E3B085C9AB24}">
-                <p16:designElem xmlns:p16="http://schemas.microsoft.com/office/powerpoint/2015/main" val="1"/>
-              </p:ext>
-            </p:extLst>
-          </p:nvPr>
-        </p:nvSpPr>
-        <p:spPr>
-          <a:xfrm flipV="1">
-            <a:off x="5693668" y="5127460"/>
-            <a:ext cx="6498333" cy="1730540"/>
-          </a:xfrm>
-          <a:custGeom>
-            <a:avLst/>
-            <a:gdLst>
-              <a:gd name="connsiteX0" fmla="*/ 2987112 w 6498333"/>
-              <a:gd name="connsiteY0" fmla="*/ 1730384 h 1730540"/>
-              <a:gd name="connsiteX1" fmla="*/ 3113423 w 6498333"/>
-              <a:gd name="connsiteY1" fmla="*/ 1728494 h 1730540"/>
-              <a:gd name="connsiteX2" fmla="*/ 6436159 w 6498333"/>
-              <a:gd name="connsiteY2" fmla="*/ 1396018 h 1730540"/>
-              <a:gd name="connsiteX3" fmla="*/ 6498333 w 6498333"/>
-              <a:gd name="connsiteY3" fmla="*/ 1381988 h 1730540"/>
-              <a:gd name="connsiteX4" fmla="*/ 6498333 w 6498333"/>
-              <a:gd name="connsiteY4" fmla="*/ 0 h 1730540"/>
-              <a:gd name="connsiteX5" fmla="*/ 723703 w 6498333"/>
-              <a:gd name="connsiteY5" fmla="*/ 0 h 1730540"/>
-              <a:gd name="connsiteX6" fmla="*/ 629735 w 6498333"/>
-              <a:gd name="connsiteY6" fmla="*/ 31770 h 1730540"/>
-              <a:gd name="connsiteX7" fmla="*/ 127078 w 6498333"/>
-              <a:gd name="connsiteY7" fmla="*/ 173371 h 1730540"/>
-              <a:gd name="connsiteX8" fmla="*/ 0 w 6498333"/>
-              <a:gd name="connsiteY8" fmla="*/ 235577 h 1730540"/>
-              <a:gd name="connsiteX9" fmla="*/ 967530 w 6498333"/>
-              <a:gd name="connsiteY9" fmla="*/ 225208 h 1730540"/>
-              <a:gd name="connsiteX10" fmla="*/ 620954 w 6498333"/>
-              <a:gd name="connsiteY10" fmla="*/ 408367 h 1730540"/>
-              <a:gd name="connsiteX11" fmla="*/ 542972 w 6498333"/>
-              <a:gd name="connsiteY11" fmla="*/ 463661 h 1730540"/>
-              <a:gd name="connsiteX12" fmla="*/ 635392 w 6498333"/>
-              <a:gd name="connsiteY12" fmla="*/ 515499 h 1730540"/>
-              <a:gd name="connsiteX13" fmla="*/ 843339 w 6498333"/>
-              <a:gd name="connsiteY13" fmla="*/ 532778 h 1730540"/>
-              <a:gd name="connsiteX14" fmla="*/ 297479 w 6498333"/>
-              <a:gd name="connsiteY14" fmla="*/ 584615 h 1730540"/>
-              <a:gd name="connsiteX15" fmla="*/ 358130 w 6498333"/>
-              <a:gd name="connsiteY15" fmla="*/ 688289 h 1730540"/>
-              <a:gd name="connsiteX16" fmla="*/ 326361 w 6498333"/>
-              <a:gd name="connsiteY16" fmla="*/ 809243 h 1730540"/>
-              <a:gd name="connsiteX17" fmla="*/ 649833 w 6498333"/>
-              <a:gd name="connsiteY17" fmla="*/ 854169 h 1730540"/>
-              <a:gd name="connsiteX18" fmla="*/ 1111937 w 6498333"/>
-              <a:gd name="connsiteY18" fmla="*/ 992402 h 1730540"/>
-              <a:gd name="connsiteX19" fmla="*/ 1559599 w 6498333"/>
-              <a:gd name="connsiteY19" fmla="*/ 1033872 h 1730540"/>
-              <a:gd name="connsiteX20" fmla="*/ 1929284 w 6498333"/>
-              <a:gd name="connsiteY20" fmla="*/ 1078798 h 1730540"/>
-              <a:gd name="connsiteX21" fmla="*/ 1608698 w 6498333"/>
-              <a:gd name="connsiteY21" fmla="*/ 1154826 h 1730540"/>
-              <a:gd name="connsiteX22" fmla="*/ 2183442 w 6498333"/>
-              <a:gd name="connsiteY22" fmla="*/ 1227398 h 1730540"/>
-              <a:gd name="connsiteX23" fmla="*/ 2267197 w 6498333"/>
-              <a:gd name="connsiteY23" fmla="*/ 1217031 h 1730540"/>
-              <a:gd name="connsiteX24" fmla="*/ 3148082 w 6498333"/>
-              <a:gd name="connsiteY24" fmla="*/ 1123724 h 1730540"/>
-              <a:gd name="connsiteX25" fmla="*/ 3330034 w 6498333"/>
-              <a:gd name="connsiteY25" fmla="*/ 1154826 h 1730540"/>
-              <a:gd name="connsiteX26" fmla="*/ 3145192 w 6498333"/>
-              <a:gd name="connsiteY26" fmla="*/ 1230854 h 1730540"/>
-              <a:gd name="connsiteX27" fmla="*/ 2504025 w 6498333"/>
-              <a:gd name="connsiteY27" fmla="*/ 1376000 h 1730540"/>
-              <a:gd name="connsiteX28" fmla="*/ 2954575 w 6498333"/>
-              <a:gd name="connsiteY28" fmla="*/ 1348352 h 1730540"/>
-              <a:gd name="connsiteX29" fmla="*/ 2492471 w 6498333"/>
-              <a:gd name="connsiteY29" fmla="*/ 1524600 h 1730540"/>
-              <a:gd name="connsiteX30" fmla="*/ 2342289 w 6498333"/>
-              <a:gd name="connsiteY30" fmla="*/ 1579893 h 1730540"/>
-              <a:gd name="connsiteX31" fmla="*/ 2489584 w 6498333"/>
-              <a:gd name="connsiteY31" fmla="*/ 1693935 h 1730540"/>
-              <a:gd name="connsiteX32" fmla="*/ 2987112 w 6498333"/>
-              <a:gd name="connsiteY32" fmla="*/ 1730384 h 1730540"/>
-            </a:gdLst>
-            <a:ahLst/>
-            <a:cxnLst>
-              <a:cxn ang="0">
-                <a:pos x="connsiteX0" y="connsiteY0"/>
-              </a:cxn>
-              <a:cxn ang="0">
-                <a:pos x="connsiteX1" y="connsiteY1"/>
-              </a:cxn>
-              <a:cxn ang="0">
-                <a:pos x="connsiteX2" y="connsiteY2"/>
-              </a:cxn>
-              <a:cxn ang="0">
-                <a:pos x="connsiteX3" y="connsiteY3"/>
-              </a:cxn>
-              <a:cxn ang="0">
-                <a:pos x="connsiteX4" y="connsiteY4"/>
-              </a:cxn>
-              <a:cxn ang="0">
-                <a:pos x="connsiteX5" y="connsiteY5"/>
-              </a:cxn>
-              <a:cxn ang="0">
-                <a:pos x="connsiteX6" y="connsiteY6"/>
-              </a:cxn>
-              <a:cxn ang="0">
-                <a:pos x="connsiteX7" y="connsiteY7"/>
-              </a:cxn>
-              <a:cxn ang="0">
-                <a:pos x="connsiteX8" y="connsiteY8"/>
-              </a:cxn>
-              <a:cxn ang="0">
-                <a:pos x="connsiteX9" y="connsiteY9"/>
-              </a:cxn>
-              <a:cxn ang="0">
-                <a:pos x="connsiteX10" y="connsiteY10"/>
-              </a:cxn>
-              <a:cxn ang="0">
-                <a:pos x="connsiteX11" y="connsiteY11"/>
-              </a:cxn>
-              <a:cxn ang="0">
-                <a:pos x="connsiteX12" y="connsiteY12"/>
-              </a:cxn>
-              <a:cxn ang="0">
-                <a:pos x="connsiteX13" y="connsiteY13"/>
-              </a:cxn>
-              <a:cxn ang="0">
-                <a:pos x="connsiteX14" y="connsiteY14"/>
-              </a:cxn>
-              <a:cxn ang="0">
-                <a:pos x="connsiteX15" y="connsiteY15"/>
-              </a:cxn>
-              <a:cxn ang="0">
-                <a:pos x="connsiteX16" y="connsiteY16"/>
-              </a:cxn>
-              <a:cxn ang="0">
-                <a:pos x="connsiteX17" y="connsiteY17"/>
-              </a:cxn>
-              <a:cxn ang="0">
-                <a:pos x="connsiteX18" y="connsiteY18"/>
-              </a:cxn>
-              <a:cxn ang="0">
-                <a:pos x="connsiteX19" y="connsiteY19"/>
-              </a:cxn>
-              <a:cxn ang="0">
-                <a:pos x="connsiteX20" y="connsiteY20"/>
-              </a:cxn>
-              <a:cxn ang="0">
-                <a:pos x="connsiteX21" y="connsiteY21"/>
-              </a:cxn>
-              <a:cxn ang="0">
-                <a:pos x="connsiteX22" y="connsiteY22"/>
-              </a:cxn>
-              <a:cxn ang="0">
-                <a:pos x="connsiteX23" y="connsiteY23"/>
-              </a:cxn>
-              <a:cxn ang="0">
-                <a:pos x="connsiteX24" y="connsiteY24"/>
-              </a:cxn>
-              <a:cxn ang="0">
-                <a:pos x="connsiteX25" y="connsiteY25"/>
-              </a:cxn>
-              <a:cxn ang="0">
-                <a:pos x="connsiteX26" y="connsiteY26"/>
-              </a:cxn>
-              <a:cxn ang="0">
-                <a:pos x="connsiteX27" y="connsiteY27"/>
-              </a:cxn>
-              <a:cxn ang="0">
-                <a:pos x="connsiteX28" y="connsiteY28"/>
-              </a:cxn>
-              <a:cxn ang="0">
-                <a:pos x="connsiteX29" y="connsiteY29"/>
-              </a:cxn>
-              <a:cxn ang="0">
-                <a:pos x="connsiteX30" y="connsiteY30"/>
-              </a:cxn>
-              <a:cxn ang="0">
-                <a:pos x="connsiteX31" y="connsiteY31"/>
-              </a:cxn>
-              <a:cxn ang="0">
-                <a:pos x="connsiteX32" y="connsiteY32"/>
-              </a:cxn>
-            </a:cxnLst>
-            <a:rect l="l" t="t" r="r" b="b"/>
-            <a:pathLst>
-              <a:path w="6498333" h="1730540">
-                <a:moveTo>
-                  <a:pt x="2987112" y="1730384"/>
-                </a:moveTo>
-                <a:cubicBezTo>
-                  <a:pt x="3042664" y="1730870"/>
-                  <a:pt x="3088152" y="1730222"/>
-                  <a:pt x="3113423" y="1728494"/>
-                </a:cubicBezTo>
-                <a:cubicBezTo>
-                  <a:pt x="3293752" y="1716831"/>
-                  <a:pt x="4808270" y="1725943"/>
-                  <a:pt x="6436159" y="1396018"/>
-                </a:cubicBezTo>
-                <a:lnTo>
-                  <a:pt x="6498333" y="1381988"/>
-                </a:lnTo>
-                <a:lnTo>
-                  <a:pt x="6498333" y="0"/>
-                </a:lnTo>
-                <a:lnTo>
-                  <a:pt x="723703" y="0"/>
-                </a:lnTo>
-                <a:lnTo>
-                  <a:pt x="629735" y="31770"/>
-                </a:lnTo>
-                <a:cubicBezTo>
-                  <a:pt x="421263" y="101447"/>
-                  <a:pt x="228886" y="161708"/>
-                  <a:pt x="127078" y="173371"/>
-                </a:cubicBezTo>
-                <a:cubicBezTo>
-                  <a:pt x="86644" y="176827"/>
-                  <a:pt x="25993" y="163004"/>
-                  <a:pt x="0" y="235577"/>
-                </a:cubicBezTo>
-                <a:cubicBezTo>
-                  <a:pt x="306144" y="346163"/>
-                  <a:pt x="641170" y="183739"/>
-                  <a:pt x="967530" y="225208"/>
-                </a:cubicBezTo>
-                <a:cubicBezTo>
-                  <a:pt x="866445" y="353075"/>
-                  <a:pt x="745142" y="384177"/>
-                  <a:pt x="620954" y="408367"/>
-                </a:cubicBezTo>
-                <a:cubicBezTo>
-                  <a:pt x="589182" y="415279"/>
-                  <a:pt x="542972" y="422191"/>
-                  <a:pt x="542972" y="463661"/>
-                </a:cubicBezTo>
-                <a:cubicBezTo>
-                  <a:pt x="542972" y="515499"/>
-                  <a:pt x="594959" y="505130"/>
-                  <a:pt x="635392" y="515499"/>
-                </a:cubicBezTo>
-                <a:cubicBezTo>
-                  <a:pt x="693155" y="529321"/>
-                  <a:pt x="762471" y="470573"/>
-                  <a:pt x="843339" y="532778"/>
-                </a:cubicBezTo>
-                <a:cubicBezTo>
-                  <a:pt x="646945" y="574247"/>
-                  <a:pt x="476544" y="588071"/>
-                  <a:pt x="297479" y="584615"/>
-                </a:cubicBezTo>
-                <a:cubicBezTo>
-                  <a:pt x="323472" y="629541"/>
-                  <a:pt x="378348" y="639908"/>
-                  <a:pt x="358130" y="688289"/>
-                </a:cubicBezTo>
-                <a:cubicBezTo>
-                  <a:pt x="343689" y="726304"/>
-                  <a:pt x="283038" y="760862"/>
-                  <a:pt x="326361" y="809243"/>
-                </a:cubicBezTo>
-                <a:cubicBezTo>
-                  <a:pt x="427447" y="843802"/>
-                  <a:pt x="554524" y="788508"/>
-                  <a:pt x="649833" y="854169"/>
-                </a:cubicBezTo>
-                <a:cubicBezTo>
-                  <a:pt x="782688" y="947476"/>
-                  <a:pt x="961753" y="940565"/>
-                  <a:pt x="1111937" y="992402"/>
-                </a:cubicBezTo>
-                <a:cubicBezTo>
-                  <a:pt x="1161035" y="1009682"/>
-                  <a:pt x="1472955" y="1023504"/>
-                  <a:pt x="1559599" y="1033872"/>
-                </a:cubicBezTo>
-                <a:cubicBezTo>
-                  <a:pt x="1678015" y="1047696"/>
-                  <a:pt x="1805093" y="1023504"/>
-                  <a:pt x="1929284" y="1078798"/>
-                </a:cubicBezTo>
-                <a:cubicBezTo>
-                  <a:pt x="1828198" y="1130635"/>
-                  <a:pt x="1727113" y="1075343"/>
-                  <a:pt x="1608698" y="1154826"/>
-                </a:cubicBezTo>
-                <a:cubicBezTo>
-                  <a:pt x="1825309" y="1175561"/>
-                  <a:pt x="2015928" y="1158282"/>
-                  <a:pt x="2183442" y="1227398"/>
-                </a:cubicBezTo>
-                <a:cubicBezTo>
-                  <a:pt x="2203658" y="1237767"/>
-                  <a:pt x="2238314" y="1220487"/>
-                  <a:pt x="2267197" y="1217031"/>
-                </a:cubicBezTo>
-                <a:cubicBezTo>
-                  <a:pt x="2561787" y="1179017"/>
-                  <a:pt x="2853490" y="1134091"/>
-                  <a:pt x="3148082" y="1123724"/>
-                </a:cubicBezTo>
-                <a:cubicBezTo>
-                  <a:pt x="3214508" y="1120268"/>
-                  <a:pt x="3327146" y="1092621"/>
-                  <a:pt x="3330034" y="1154826"/>
-                </a:cubicBezTo>
-                <a:cubicBezTo>
-                  <a:pt x="3330034" y="1251589"/>
-                  <a:pt x="3214508" y="1220487"/>
-                  <a:pt x="3145192" y="1230854"/>
-                </a:cubicBezTo>
-                <a:cubicBezTo>
-                  <a:pt x="2931471" y="1268869"/>
-                  <a:pt x="2711970" y="1282691"/>
-                  <a:pt x="2504025" y="1376000"/>
-                </a:cubicBezTo>
-                <a:cubicBezTo>
-                  <a:pt x="2654207" y="1365632"/>
-                  <a:pt x="2804392" y="1358720"/>
-                  <a:pt x="2954575" y="1348352"/>
-                </a:cubicBezTo>
-                <a:cubicBezTo>
-                  <a:pt x="2787063" y="1386367"/>
-                  <a:pt x="2654207" y="1476218"/>
-                  <a:pt x="2492471" y="1524600"/>
-                </a:cubicBezTo>
-                <a:cubicBezTo>
-                  <a:pt x="2408715" y="1548791"/>
-                  <a:pt x="2342289" y="1579893"/>
-                  <a:pt x="2342289" y="1579893"/>
-                </a:cubicBezTo>
-                <a:cubicBezTo>
-                  <a:pt x="2342289" y="1579893"/>
-                  <a:pt x="2356730" y="1655921"/>
-                  <a:pt x="2489584" y="1693935"/>
-                </a:cubicBezTo>
-                <a:cubicBezTo>
-                  <a:pt x="2563232" y="1717262"/>
-                  <a:pt x="2820457" y="1728925"/>
-                  <a:pt x="2987112" y="1730384"/>
-                </a:cubicBezTo>
-                <a:close/>
-              </a:path>
-            </a:pathLst>
-          </a:custGeom>
-          <a:solidFill>
-            <a:schemeClr val="bg2">
-              <a:alpha val="50000"/>
-            </a:schemeClr>
-          </a:solidFill>
-          <a:ln w="32707" cap="flat">
-            <a:noFill/>
-            <a:prstDash val="solid"/>
-            <a:miter/>
-          </a:ln>
-        </p:spPr>
-        <p:txBody>
-          <a:bodyPr wrap="square" rtlCol="0" anchor="ctr">
-            <a:noAutofit/>
-          </a:bodyPr>
-          <a:lstStyle/>
-          <a:p>
-            <a:endParaRPr lang="en-US">
-              <a:solidFill>
-                <a:schemeClr val="tx1"/>
-              </a:solidFill>
-            </a:endParaRPr>
-          </a:p>
-        </p:txBody>
-      </p:sp>
-      <p:sp>
-        <p:nvSpPr>
-          <p:cNvPr id="3" name="Content Placeholder 2">
-            <a:extLst>
-              <a:ext uri="{FF2B5EF4-FFF2-40B4-BE49-F238E27FC236}">
-                <a16:creationId xmlns:a16="http://schemas.microsoft.com/office/drawing/2014/main" id="{B550C824-7E13-4EDE-A68C-2C35B4FEB815}"/>
-              </a:ext>
-            </a:extLst>
-          </p:cNvPr>
-          <p:cNvSpPr>
-            <a:spLocks noGrp="1"/>
-          </p:cNvSpPr>
-          <p:nvPr>
-            <p:ph idx="1"/>
-          </p:nvPr>
-        </p:nvSpPr>
-        <p:spPr>
-          <a:xfrm>
-            <a:off x="1820559" y="2499709"/>
-            <a:ext cx="5257804" cy="3929186"/>
-          </a:xfrm>
-        </p:spPr>
-        <p:txBody>
-          <a:bodyPr anchor="t">
-            <a:normAutofit/>
-          </a:bodyPr>
-          <a:lstStyle/>
-          <a:p>
-            <a:pPr rtl="0" fontAlgn="base">
-              <a:spcBef>
-                <a:spcPts val="0"/>
-              </a:spcBef>
-              <a:spcAft>
-                <a:spcPts val="1200"/>
-              </a:spcAft>
-              <a:buFont typeface="Wingdings" pitchFamily="2" charset="2"/>
-              <a:buChar char="Ø"/>
-            </a:pPr>
-            <a:r>
-              <a:rPr lang="en-GB" sz="3200" b="0" i="0" u="none" strike="noStrike" dirty="0">
-                <a:effectLst/>
-                <a:latin typeface="Lato" panose="020F0502020204030203" pitchFamily="34" charset="0"/>
-              </a:rPr>
-              <a:t>Maven 4 - what’s new</a:t>
-            </a:r>
-          </a:p>
-          <a:p>
-            <a:pPr rtl="0" fontAlgn="base">
-              <a:spcBef>
-                <a:spcPts val="0"/>
-              </a:spcBef>
-              <a:spcAft>
-                <a:spcPts val="1200"/>
-              </a:spcAft>
-              <a:buFont typeface="Wingdings" pitchFamily="2" charset="2"/>
-              <a:buChar char="Ø"/>
-            </a:pPr>
-            <a:endParaRPr lang="en-GB" sz="3200" b="0" i="0" u="none" strike="noStrike" dirty="0">
-              <a:effectLst/>
-              <a:latin typeface="Lato" panose="020F0502020204030203" pitchFamily="34" charset="0"/>
-            </a:endParaRPr>
-          </a:p>
-          <a:p>
-            <a:pPr rtl="0" fontAlgn="base">
-              <a:spcBef>
-                <a:spcPts val="0"/>
-              </a:spcBef>
-              <a:spcAft>
-                <a:spcPts val="0"/>
-              </a:spcAft>
-              <a:buFont typeface="Wingdings" pitchFamily="2" charset="2"/>
-              <a:buChar char="Ø"/>
-            </a:pPr>
-            <a:r>
-              <a:rPr lang="en-GB" sz="3200" b="0" i="0" u="none" strike="noStrike" dirty="0">
-                <a:effectLst/>
-                <a:latin typeface="Lato" panose="020F0502020204030203" pitchFamily="34" charset="0"/>
-              </a:rPr>
-              <a:t>Java 21 – goodies</a:t>
-            </a:r>
-          </a:p>
-          <a:p>
-            <a:pPr marL="0" indent="0" rtl="0" fontAlgn="base">
-              <a:spcBef>
-                <a:spcPts val="0"/>
-              </a:spcBef>
-              <a:spcAft>
-                <a:spcPts val="0"/>
-              </a:spcAft>
-              <a:buNone/>
-            </a:pPr>
-            <a:endParaRPr lang="en-GB" sz="3200" b="0" i="0" u="none" strike="noStrike" dirty="0">
-              <a:effectLst/>
-              <a:latin typeface="Lato" panose="020F0502020204030203" pitchFamily="34" charset="0"/>
-            </a:endParaRPr>
-          </a:p>
-          <a:p>
-            <a:pPr rtl="0" fontAlgn="base">
-              <a:spcBef>
-                <a:spcPts val="0"/>
-              </a:spcBef>
-              <a:spcAft>
-                <a:spcPts val="0"/>
-              </a:spcAft>
-              <a:buFont typeface="Wingdings" pitchFamily="2" charset="2"/>
-              <a:buChar char="Ø"/>
-            </a:pPr>
-            <a:endParaRPr lang="en-GB" sz="3200" dirty="0">
-              <a:latin typeface="Lato" panose="020F0502020204030203" pitchFamily="34" charset="0"/>
-            </a:endParaRPr>
-          </a:p>
-          <a:p>
-            <a:pPr rtl="0" fontAlgn="base">
-              <a:spcBef>
-                <a:spcPts val="0"/>
-              </a:spcBef>
-              <a:spcAft>
-                <a:spcPts val="0"/>
-              </a:spcAft>
-              <a:buFont typeface="Wingdings" pitchFamily="2" charset="2"/>
-              <a:buChar char="Ø"/>
-            </a:pPr>
-            <a:r>
-              <a:rPr lang="en-GB" sz="3200" b="0" i="0" u="none" strike="noStrike" dirty="0">
-                <a:effectLst/>
-                <a:latin typeface="Lato" panose="020F0502020204030203" pitchFamily="34" charset="0"/>
-              </a:rPr>
-              <a:t>Play time</a:t>
-            </a:r>
-          </a:p>
-        </p:txBody>
-      </p:sp>
-    </p:spTree>
-    <p:extLst>
-      <p:ext uri="{BB962C8B-B14F-4D97-AF65-F5344CB8AC3E}">
-        <p14:creationId xmlns:p14="http://schemas.microsoft.com/office/powerpoint/2010/main" val="3704788612"/>
       </p:ext>
     </p:extLst>
   </p:cSld>

</xml_diff>

<commit_message>
started working on the memory jep
</commit_message>
<xml_diff>
--- a/Java21-Presentation.pptx
+++ b/Java21-Presentation.pptx
@@ -223,7 +223,7 @@
           <a:p>
             <a:fld id="{7DCE309A-7A60-DC46-A116-E07ABADAD367}" type="datetimeFigureOut">
               <a:rPr lang="en-US" smtClean="0"/>
-              <a:t>11/14/23</a:t>
+              <a:t>11/15/23</a:t>
             </a:fld>
             <a:endParaRPr lang="en-US"/>
           </a:p>
@@ -1091,7 +1091,7 @@
           <a:p>
             <a:fld id="{97338A82-0D20-3D4A-B4B7-58B5112FF922}" type="slidenum">
               <a:rPr lang="en-US" smtClean="0"/>
-              <a:t>19</a:t>
+              <a:t>15</a:t>
             </a:fld>
             <a:endParaRPr lang="en-US"/>
           </a:p>
@@ -1100,7 +1100,7 @@
     </p:spTree>
     <p:extLst>
       <p:ext uri="{BB962C8B-B14F-4D97-AF65-F5344CB8AC3E}">
-        <p14:creationId xmlns:p14="http://schemas.microsoft.com/office/powerpoint/2010/main" val="3086876158"/>
+        <p14:creationId xmlns:p14="http://schemas.microsoft.com/office/powerpoint/2010/main" val="507114277"/>
       </p:ext>
     </p:extLst>
   </p:cSld>
@@ -1175,7 +1175,7 @@
           <a:p>
             <a:fld id="{97338A82-0D20-3D4A-B4B7-58B5112FF922}" type="slidenum">
               <a:rPr lang="en-US" smtClean="0"/>
-              <a:t>22</a:t>
+              <a:t>19</a:t>
             </a:fld>
             <a:endParaRPr lang="en-US"/>
           </a:p>
@@ -1184,7 +1184,7 @@
     </p:spTree>
     <p:extLst>
       <p:ext uri="{BB962C8B-B14F-4D97-AF65-F5344CB8AC3E}">
-        <p14:creationId xmlns:p14="http://schemas.microsoft.com/office/powerpoint/2010/main" val="672745388"/>
+        <p14:creationId xmlns:p14="http://schemas.microsoft.com/office/powerpoint/2010/main" val="3086876158"/>
       </p:ext>
     </p:extLst>
   </p:cSld>
@@ -1259,7 +1259,7 @@
           <a:p>
             <a:fld id="{97338A82-0D20-3D4A-B4B7-58B5112FF922}" type="slidenum">
               <a:rPr lang="en-US" smtClean="0"/>
-              <a:t>23</a:t>
+              <a:t>22</a:t>
             </a:fld>
             <a:endParaRPr lang="en-US"/>
           </a:p>
@@ -1268,7 +1268,7 @@
     </p:spTree>
     <p:extLst>
       <p:ext uri="{BB962C8B-B14F-4D97-AF65-F5344CB8AC3E}">
-        <p14:creationId xmlns:p14="http://schemas.microsoft.com/office/powerpoint/2010/main" val="1449500572"/>
+        <p14:creationId xmlns:p14="http://schemas.microsoft.com/office/powerpoint/2010/main" val="672745388"/>
       </p:ext>
     </p:extLst>
   </p:cSld>
@@ -1343,6 +1343,90 @@
           <a:p>
             <a:fld id="{97338A82-0D20-3D4A-B4B7-58B5112FF922}" type="slidenum">
               <a:rPr lang="en-US" smtClean="0"/>
+              <a:t>23</a:t>
+            </a:fld>
+            <a:endParaRPr lang="en-US"/>
+          </a:p>
+        </p:txBody>
+      </p:sp>
+    </p:spTree>
+    <p:extLst>
+      <p:ext uri="{BB962C8B-B14F-4D97-AF65-F5344CB8AC3E}">
+        <p14:creationId xmlns:p14="http://schemas.microsoft.com/office/powerpoint/2010/main" val="1449500572"/>
+      </p:ext>
+    </p:extLst>
+  </p:cSld>
+  <p:clrMapOvr>
+    <a:masterClrMapping/>
+  </p:clrMapOvr>
+</p:notes>
+</file>
+
+<file path=ppt/notesSlides/notesSlide17.xml><?xml version="1.0" encoding="utf-8"?>
+<p:notes xmlns:a="http://schemas.openxmlformats.org/drawingml/2006/main" xmlns:r="http://schemas.openxmlformats.org/officeDocument/2006/relationships" xmlns:p="http://schemas.openxmlformats.org/presentationml/2006/main">
+  <p:cSld>
+    <p:spTree>
+      <p:nvGrpSpPr>
+        <p:cNvPr id="1" name=""/>
+        <p:cNvGrpSpPr/>
+        <p:nvPr/>
+      </p:nvGrpSpPr>
+      <p:grpSpPr>
+        <a:xfrm>
+          <a:off x="0" y="0"/>
+          <a:ext cx="0" cy="0"/>
+          <a:chOff x="0" y="0"/>
+          <a:chExt cx="0" cy="0"/>
+        </a:xfrm>
+      </p:grpSpPr>
+      <p:sp>
+        <p:nvSpPr>
+          <p:cNvPr id="2" name="Slide Image Placeholder 1"/>
+          <p:cNvSpPr>
+            <a:spLocks noGrp="1" noRot="1" noChangeAspect="1"/>
+          </p:cNvSpPr>
+          <p:nvPr>
+            <p:ph type="sldImg"/>
+          </p:nvPr>
+        </p:nvSpPr>
+        <p:spPr/>
+      </p:sp>
+      <p:sp>
+        <p:nvSpPr>
+          <p:cNvPr id="3" name="Notes Placeholder 2"/>
+          <p:cNvSpPr>
+            <a:spLocks noGrp="1"/>
+          </p:cNvSpPr>
+          <p:nvPr>
+            <p:ph type="body" idx="1"/>
+          </p:nvPr>
+        </p:nvSpPr>
+        <p:spPr/>
+        <p:txBody>
+          <a:bodyPr/>
+          <a:lstStyle/>
+          <a:p>
+            <a:endParaRPr lang="en-US" dirty="0"/>
+          </a:p>
+        </p:txBody>
+      </p:sp>
+      <p:sp>
+        <p:nvSpPr>
+          <p:cNvPr id="4" name="Slide Number Placeholder 3"/>
+          <p:cNvSpPr>
+            <a:spLocks noGrp="1"/>
+          </p:cNvSpPr>
+          <p:nvPr>
+            <p:ph type="sldNum" sz="quarter" idx="5"/>
+          </p:nvPr>
+        </p:nvSpPr>
+        <p:spPr/>
+        <p:txBody>
+          <a:bodyPr/>
+          <a:lstStyle/>
+          <a:p>
+            <a:fld id="{97338A82-0D20-3D4A-B4B7-58B5112FF922}" type="slidenum">
+              <a:rPr lang="en-US" smtClean="0"/>
               <a:t>25</a:t>
             </a:fld>
             <a:endParaRPr lang="en-US"/>
@@ -1362,7 +1446,7 @@
 </p:notes>
 </file>
 
-<file path=ppt/notesSlides/notesSlide17.xml><?xml version="1.0" encoding="utf-8"?>
+<file path=ppt/notesSlides/notesSlide18.xml><?xml version="1.0" encoding="utf-8"?>
 <p:notes xmlns:a="http://schemas.openxmlformats.org/drawingml/2006/main" xmlns:r="http://schemas.openxmlformats.org/officeDocument/2006/relationships" xmlns:p="http://schemas.openxmlformats.org/presentationml/2006/main">
   <p:cSld>
     <p:spTree>
@@ -2457,7 +2541,7 @@
           <a:p>
             <a:fld id="{00B59761-C2A7-844A-B0A4-477EF3BF3F07}" type="datetimeFigureOut">
               <a:rPr lang="en-US" smtClean="0"/>
-              <a:t>11/14/23</a:t>
+              <a:t>11/15/23</a:t>
             </a:fld>
             <a:endParaRPr lang="en-US"/>
           </a:p>
@@ -2657,7 +2741,7 @@
           <a:p>
             <a:fld id="{00B59761-C2A7-844A-B0A4-477EF3BF3F07}" type="datetimeFigureOut">
               <a:rPr lang="en-US" smtClean="0"/>
-              <a:t>11/14/23</a:t>
+              <a:t>11/15/23</a:t>
             </a:fld>
             <a:endParaRPr lang="en-US"/>
           </a:p>
@@ -2867,7 +2951,7 @@
           <a:p>
             <a:fld id="{00B59761-C2A7-844A-B0A4-477EF3BF3F07}" type="datetimeFigureOut">
               <a:rPr lang="en-US" smtClean="0"/>
-              <a:t>11/14/23</a:t>
+              <a:t>11/15/23</a:t>
             </a:fld>
             <a:endParaRPr lang="en-US"/>
           </a:p>
@@ -3067,7 +3151,7 @@
           <a:p>
             <a:fld id="{00B59761-C2A7-844A-B0A4-477EF3BF3F07}" type="datetimeFigureOut">
               <a:rPr lang="en-US" smtClean="0"/>
-              <a:t>11/14/23</a:t>
+              <a:t>11/15/23</a:t>
             </a:fld>
             <a:endParaRPr lang="en-US"/>
           </a:p>
@@ -3343,7 +3427,7 @@
           <a:p>
             <a:fld id="{00B59761-C2A7-844A-B0A4-477EF3BF3F07}" type="datetimeFigureOut">
               <a:rPr lang="en-US" smtClean="0"/>
-              <a:t>11/14/23</a:t>
+              <a:t>11/15/23</a:t>
             </a:fld>
             <a:endParaRPr lang="en-US"/>
           </a:p>
@@ -3611,7 +3695,7 @@
           <a:p>
             <a:fld id="{00B59761-C2A7-844A-B0A4-477EF3BF3F07}" type="datetimeFigureOut">
               <a:rPr lang="en-US" smtClean="0"/>
-              <a:t>11/14/23</a:t>
+              <a:t>11/15/23</a:t>
             </a:fld>
             <a:endParaRPr lang="en-US"/>
           </a:p>
@@ -4026,7 +4110,7 @@
           <a:p>
             <a:fld id="{00B59761-C2A7-844A-B0A4-477EF3BF3F07}" type="datetimeFigureOut">
               <a:rPr lang="en-US" smtClean="0"/>
-              <a:t>11/14/23</a:t>
+              <a:t>11/15/23</a:t>
             </a:fld>
             <a:endParaRPr lang="en-US"/>
           </a:p>
@@ -4168,7 +4252,7 @@
           <a:p>
             <a:fld id="{00B59761-C2A7-844A-B0A4-477EF3BF3F07}" type="datetimeFigureOut">
               <a:rPr lang="en-US" smtClean="0"/>
-              <a:t>11/14/23</a:t>
+              <a:t>11/15/23</a:t>
             </a:fld>
             <a:endParaRPr lang="en-US"/>
           </a:p>
@@ -4281,7 +4365,7 @@
           <a:p>
             <a:fld id="{00B59761-C2A7-844A-B0A4-477EF3BF3F07}" type="datetimeFigureOut">
               <a:rPr lang="en-US" smtClean="0"/>
-              <a:t>11/14/23</a:t>
+              <a:t>11/15/23</a:t>
             </a:fld>
             <a:endParaRPr lang="en-US"/>
           </a:p>
@@ -4594,7 +4678,7 @@
           <a:p>
             <a:fld id="{00B59761-C2A7-844A-B0A4-477EF3BF3F07}" type="datetimeFigureOut">
               <a:rPr lang="en-US" smtClean="0"/>
-              <a:t>11/14/23</a:t>
+              <a:t>11/15/23</a:t>
             </a:fld>
             <a:endParaRPr lang="en-US"/>
           </a:p>
@@ -4883,7 +4967,7 @@
           <a:p>
             <a:fld id="{00B59761-C2A7-844A-B0A4-477EF3BF3F07}" type="datetimeFigureOut">
               <a:rPr lang="en-US" smtClean="0"/>
-              <a:t>11/14/23</a:t>
+              <a:t>11/15/23</a:t>
             </a:fld>
             <a:endParaRPr lang="en-US"/>
           </a:p>
@@ -5126,7 +5210,7 @@
           <a:p>
             <a:fld id="{00B59761-C2A7-844A-B0A4-477EF3BF3F07}" type="datetimeFigureOut">
               <a:rPr lang="en-US" smtClean="0"/>
-              <a:t>11/14/23</a:t>
+              <a:t>11/15/23</a:t>
             </a:fld>
             <a:endParaRPr lang="en-US"/>
           </a:p>
@@ -7831,6 +7915,52 @@
           </a:prstGeom>
         </p:spPr>
       </p:pic>
+      <p:sp>
+        <p:nvSpPr>
+          <p:cNvPr id="3" name="TextBox 2">
+            <a:extLst>
+              <a:ext uri="{FF2B5EF4-FFF2-40B4-BE49-F238E27FC236}">
+                <a16:creationId xmlns:a16="http://schemas.microsoft.com/office/drawing/2014/main" id="{969B82DB-2B2E-4906-2EAE-CD57B854FE18}"/>
+              </a:ext>
+            </a:extLst>
+          </p:cNvPr>
+          <p:cNvSpPr txBox="1"/>
+          <p:nvPr/>
+        </p:nvSpPr>
+        <p:spPr>
+          <a:xfrm>
+            <a:off x="5054888" y="4462206"/>
+            <a:ext cx="2714036" cy="461665"/>
+          </a:xfrm>
+          <a:prstGeom prst="rect">
+            <a:avLst/>
+          </a:prstGeom>
+          <a:noFill/>
+        </p:spPr>
+        <p:txBody>
+          <a:bodyPr wrap="square" rtlCol="0">
+            <a:spAutoFit/>
+          </a:bodyPr>
+          <a:lstStyle/>
+          <a:p>
+            <a:r>
+              <a:rPr lang="en-GB" sz="2400" i="1" dirty="0" err="1">
+                <a:solidFill>
+                  <a:srgbClr val="002060"/>
+                </a:solidFill>
+                <a:effectLst/>
+              </a:rPr>
+              <a:t>java.util</a:t>
+            </a:r>
+            <a:endParaRPr lang="en-GB" sz="2400" i="1" dirty="0">
+              <a:solidFill>
+                <a:srgbClr val="002060"/>
+              </a:solidFill>
+              <a:effectLst/>
+            </a:endParaRPr>
+          </a:p>
+        </p:txBody>
+      </p:sp>
     </p:spTree>
     <p:extLst>
       <p:ext uri="{BB962C8B-B14F-4D97-AF65-F5344CB8AC3E}">
@@ -9295,7 +9425,7 @@
           <p:nvPr/>
         </p:nvPicPr>
         <p:blipFill>
-          <a:blip r:embed="rId2"/>
+          <a:blip r:embed="rId3"/>
           <a:stretch>
             <a:fillRect/>
           </a:stretch>
@@ -9352,6 +9482,52 @@
             <a:endParaRPr lang="en-US" sz="2800" dirty="0">
               <a:latin typeface="Calibri" panose="020F0502020204030204" pitchFamily="34" charset="0"/>
               <a:cs typeface="Calibri" panose="020F0502020204030204" pitchFamily="34" charset="0"/>
+            </a:endParaRPr>
+          </a:p>
+        </p:txBody>
+      </p:sp>
+      <p:sp>
+        <p:nvSpPr>
+          <p:cNvPr id="2" name="TextBox 1">
+            <a:extLst>
+              <a:ext uri="{FF2B5EF4-FFF2-40B4-BE49-F238E27FC236}">
+                <a16:creationId xmlns:a16="http://schemas.microsoft.com/office/drawing/2014/main" id="{CD4BDA28-BA2C-CE5D-B10C-6F0DC8D5D698}"/>
+              </a:ext>
+            </a:extLst>
+          </p:cNvPr>
+          <p:cNvSpPr txBox="1"/>
+          <p:nvPr/>
+        </p:nvSpPr>
+        <p:spPr>
+          <a:xfrm>
+            <a:off x="5071064" y="6245776"/>
+            <a:ext cx="2714036" cy="461665"/>
+          </a:xfrm>
+          <a:prstGeom prst="rect">
+            <a:avLst/>
+          </a:prstGeom>
+          <a:noFill/>
+        </p:spPr>
+        <p:txBody>
+          <a:bodyPr wrap="square" rtlCol="0">
+            <a:spAutoFit/>
+          </a:bodyPr>
+          <a:lstStyle/>
+          <a:p>
+            <a:r>
+              <a:rPr lang="en-GB" sz="2400" i="1" dirty="0" err="1">
+                <a:solidFill>
+                  <a:srgbClr val="002060"/>
+                </a:solidFill>
+                <a:effectLst/>
+              </a:rPr>
+              <a:t>javax.crypto</a:t>
+            </a:r>
+            <a:endParaRPr lang="en-GB" sz="2400" i="1" dirty="0">
+              <a:solidFill>
+                <a:srgbClr val="002060"/>
+              </a:solidFill>
+              <a:effectLst/>
             </a:endParaRPr>
           </a:p>
         </p:txBody>
@@ -16661,6 +16837,15 @@
           <a:lstStyle/>
           <a:p>
             <a:r>
+              <a:rPr lang="en-GB" dirty="0">
+                <a:solidFill>
+                  <a:srgbClr val="0033B3"/>
+                </a:solidFill>
+                <a:effectLst/>
+              </a:rPr>
+              <a:t>JEP 442.</a:t>
+            </a:r>
+            <a:r>
               <a:rPr lang="en-GB" b="1" i="0" dirty="0">
                 <a:effectLst/>
                 <a:latin typeface="Calibri" panose="020F0502020204030204" pitchFamily="34" charset="0"/>
@@ -16716,11 +16901,88 @@
               <a:t> to invoke code from outside the JVM (e.g. C Libraries)</a:t>
             </a:r>
           </a:p>
-          <a:p>
-            <a:r>
-              <a:rPr lang="en-US" sz="2000" b="1" i="1" dirty="0"/>
-              <a:t>To be continued …</a:t>
-            </a:r>
+        </p:txBody>
+      </p:sp>
+      <p:pic>
+        <p:nvPicPr>
+          <p:cNvPr id="3" name="Picture 2" descr="A screenshot of a computer program&#10;&#10;Description automatically generated">
+            <a:extLst>
+              <a:ext uri="{FF2B5EF4-FFF2-40B4-BE49-F238E27FC236}">
+                <a16:creationId xmlns:a16="http://schemas.microsoft.com/office/drawing/2014/main" id="{3C4A0F01-E219-C6F6-DCCE-0A70907D57D7}"/>
+              </a:ext>
+            </a:extLst>
+          </p:cNvPr>
+          <p:cNvPicPr>
+            <a:picLocks noChangeAspect="1"/>
+          </p:cNvPicPr>
+          <p:nvPr/>
+        </p:nvPicPr>
+        <p:blipFill>
+          <a:blip r:embed="rId2"/>
+          <a:stretch>
+            <a:fillRect/>
+          </a:stretch>
+        </p:blipFill>
+        <p:spPr>
+          <a:xfrm>
+            <a:off x="2433917" y="2349103"/>
+            <a:ext cx="9222096" cy="4143771"/>
+          </a:xfrm>
+          <a:prstGeom prst="rect">
+            <a:avLst/>
+          </a:prstGeom>
+        </p:spPr>
+      </p:pic>
+      <p:sp>
+        <p:nvSpPr>
+          <p:cNvPr id="6" name="TextBox 5">
+            <a:extLst>
+              <a:ext uri="{FF2B5EF4-FFF2-40B4-BE49-F238E27FC236}">
+                <a16:creationId xmlns:a16="http://schemas.microsoft.com/office/drawing/2014/main" id="{46E1260F-6F3B-39D2-A285-CA6E0356A2E0}"/>
+              </a:ext>
+            </a:extLst>
+          </p:cNvPr>
+          <p:cNvSpPr txBox="1"/>
+          <p:nvPr/>
+        </p:nvSpPr>
+        <p:spPr>
+          <a:xfrm>
+            <a:off x="2528794" y="6325054"/>
+            <a:ext cx="3173506" cy="830997"/>
+          </a:xfrm>
+          <a:prstGeom prst="rect">
+            <a:avLst/>
+          </a:prstGeom>
+          <a:noFill/>
+        </p:spPr>
+        <p:txBody>
+          <a:bodyPr wrap="square" rtlCol="0">
+            <a:spAutoFit/>
+          </a:bodyPr>
+          <a:lstStyle/>
+          <a:p>
+            <a:r>
+              <a:rPr lang="en-GB" sz="2400" i="1" dirty="0" err="1">
+                <a:solidFill>
+                  <a:srgbClr val="002060"/>
+                </a:solidFill>
+                <a:effectLst/>
+              </a:rPr>
+              <a:t>java.lang.foreign</a:t>
+            </a:r>
+            <a:endParaRPr lang="en-GB" sz="2400" i="1" dirty="0">
+              <a:solidFill>
+                <a:srgbClr val="002060"/>
+              </a:solidFill>
+              <a:effectLst/>
+            </a:endParaRPr>
+          </a:p>
+          <a:p>
+            <a:endParaRPr lang="en-US" sz="2400" i="1" dirty="0">
+              <a:solidFill>
+                <a:srgbClr val="002060"/>
+              </a:solidFill>
+            </a:endParaRPr>
           </a:p>
         </p:txBody>
       </p:sp>
@@ -25410,7 +25672,7 @@
         <p:spPr>
           <a:xfrm>
             <a:off x="443754" y="2429499"/>
-            <a:ext cx="4607708" cy="2677656"/>
+            <a:ext cx="4607708" cy="3416320"/>
           </a:xfrm>
           <a:prstGeom prst="rect">
             <a:avLst/>
@@ -25450,6 +25712,16 @@
             <a:r>
               <a:rPr lang="en-US" sz="2400" dirty="0"/>
               <a:t>JVM Design changes</a:t>
+            </a:r>
+          </a:p>
+          <a:p>
+            <a:pPr marL="342900" indent="-342900">
+              <a:buFont typeface="Arial" panose="020B0604020202020204" pitchFamily="34" charset="0"/>
+              <a:buChar char="•"/>
+            </a:pPr>
+            <a:r>
+              <a:rPr lang="en-US" sz="2400" dirty="0"/>
+              <a:t>Pseudo Random Number Generator Improvements</a:t>
             </a:r>
           </a:p>
           <a:p>

</xml_diff>